<commit_message>
Terminado presentacion exposicion asesor uno
</commit_message>
<xml_diff>
--- a/Presentacion asesor uno.pptx
+++ b/Presentacion asesor uno.pptx
@@ -5,15 +5,14 @@
     <p:sldMasterId id="2147483660" r:id="rId1"/>
   </p:sldMasterIdLst>
   <p:sldIdLst>
-    <p:sldId id="258" r:id="rId2"/>
-    <p:sldId id="257" r:id="rId3"/>
-    <p:sldId id="259" r:id="rId4"/>
-    <p:sldId id="260" r:id="rId5"/>
-    <p:sldId id="261" r:id="rId6"/>
-    <p:sldId id="265" r:id="rId7"/>
-    <p:sldId id="262" r:id="rId8"/>
-    <p:sldId id="263" r:id="rId9"/>
-    <p:sldId id="264" r:id="rId10"/>
+    <p:sldId id="257" r:id="rId2"/>
+    <p:sldId id="259" r:id="rId3"/>
+    <p:sldId id="260" r:id="rId4"/>
+    <p:sldId id="261" r:id="rId5"/>
+    <p:sldId id="265" r:id="rId6"/>
+    <p:sldId id="262" r:id="rId7"/>
+    <p:sldId id="263" r:id="rId8"/>
+    <p:sldId id="264" r:id="rId9"/>
   </p:sldIdLst>
   <p:sldSz cx="12192000" cy="6858000"/>
   <p:notesSz cx="6858000" cy="9144000"/>
@@ -124,19 +123,89 @@
 <pc:chgInfo xmlns:a="http://schemas.openxmlformats.org/drawingml/2006/main" xmlns:r="http://schemas.openxmlformats.org/officeDocument/2006/relationships" xmlns:ac="http://schemas.microsoft.com/office/drawing/2013/main/command" xmlns:pc="http://schemas.microsoft.com/office/powerpoint/2013/main/command">
   <pc:docChgLst>
     <pc:chgData name="adelaida.molinar1997@gmail.com" userId="73a9b2cc98479d66" providerId="LiveId" clId="{2F3BDEE8-1B09-4329-B241-C1265B3CF150}"/>
-    <pc:docChg chg="addSld delSld modSld">
-      <pc:chgData name="adelaida.molinar1997@gmail.com" userId="73a9b2cc98479d66" providerId="LiveId" clId="{2F3BDEE8-1B09-4329-B241-C1265B3CF150}" dt="2020-11-23T14:59:25.113" v="68" actId="1076"/>
+    <pc:docChg chg="undo custSel addSld delSld modSld sldOrd">
+      <pc:chgData name="adelaida.molinar1997@gmail.com" userId="73a9b2cc98479d66" providerId="LiveId" clId="{2F3BDEE8-1B09-4329-B241-C1265B3CF150}" dt="2020-11-23T19:51:11.232" v="354"/>
       <pc:docMkLst>
         <pc:docMk/>
       </pc:docMkLst>
-      <pc:sldChg chg="addSp modSp mod">
-        <pc:chgData name="adelaida.molinar1997@gmail.com" userId="73a9b2cc98479d66" providerId="LiveId" clId="{2F3BDEE8-1B09-4329-B241-C1265B3CF150}" dt="2020-11-23T14:59:25.113" v="68" actId="1076"/>
+      <pc:sldChg chg="addSp delSp modSp mod modTransition">
+        <pc:chgData name="adelaida.molinar1997@gmail.com" userId="73a9b2cc98479d66" providerId="LiveId" clId="{2F3BDEE8-1B09-4329-B241-C1265B3CF150}" dt="2020-11-23T19:51:11.232" v="354"/>
+        <pc:sldMkLst>
+          <pc:docMk/>
+          <pc:sldMk cId="4136787870" sldId="257"/>
+        </pc:sldMkLst>
+        <pc:spChg chg="mod">
+          <ac:chgData name="adelaida.molinar1997@gmail.com" userId="73a9b2cc98479d66" providerId="LiveId" clId="{2F3BDEE8-1B09-4329-B241-C1265B3CF150}" dt="2020-11-23T18:44:23.741" v="125" actId="1076"/>
+          <ac:spMkLst>
+            <pc:docMk/>
+            <pc:sldMk cId="4136787870" sldId="257"/>
+            <ac:spMk id="3" creationId="{BF9C6B4B-8764-4AD5-8C38-761F78259345}"/>
+          </ac:spMkLst>
+        </pc:spChg>
+        <pc:spChg chg="mod">
+          <ac:chgData name="adelaida.molinar1997@gmail.com" userId="73a9b2cc98479d66" providerId="LiveId" clId="{2F3BDEE8-1B09-4329-B241-C1265B3CF150}" dt="2020-11-23T18:44:28.075" v="126" actId="1076"/>
+          <ac:spMkLst>
+            <pc:docMk/>
+            <pc:sldMk cId="4136787870" sldId="257"/>
+            <ac:spMk id="5" creationId="{0E90F9B3-B225-4DA6-BD10-9C8A73BBA74C}"/>
+          </ac:spMkLst>
+        </pc:spChg>
+        <pc:spChg chg="mod">
+          <ac:chgData name="adelaida.molinar1997@gmail.com" userId="73a9b2cc98479d66" providerId="LiveId" clId="{2F3BDEE8-1B09-4329-B241-C1265B3CF150}" dt="2020-11-23T18:44:18.789" v="124" actId="1076"/>
+          <ac:spMkLst>
+            <pc:docMk/>
+            <pc:sldMk cId="4136787870" sldId="257"/>
+            <ac:spMk id="7" creationId="{E943B60B-78BC-4B37-B6B1-0595582B3189}"/>
+          </ac:spMkLst>
+        </pc:spChg>
+        <pc:picChg chg="add del mod">
+          <ac:chgData name="adelaida.molinar1997@gmail.com" userId="73a9b2cc98479d66" providerId="LiveId" clId="{2F3BDEE8-1B09-4329-B241-C1265B3CF150}" dt="2020-11-23T18:43:08.701" v="114" actId="21"/>
+          <ac:picMkLst>
+            <pc:docMk/>
+            <pc:sldMk cId="4136787870" sldId="257"/>
+            <ac:picMk id="4" creationId="{839215EB-75EA-4B43-997A-591414A0ABAF}"/>
+          </ac:picMkLst>
+        </pc:picChg>
+        <pc:picChg chg="add mod">
+          <ac:chgData name="adelaida.molinar1997@gmail.com" userId="73a9b2cc98479d66" providerId="LiveId" clId="{2F3BDEE8-1B09-4329-B241-C1265B3CF150}" dt="2020-11-23T18:44:33.369" v="128" actId="1076"/>
+          <ac:picMkLst>
+            <pc:docMk/>
+            <pc:sldMk cId="4136787870" sldId="257"/>
+            <ac:picMk id="6" creationId="{45E2AC7F-C625-41BE-A216-44C46F5273BC}"/>
+          </ac:picMkLst>
+        </pc:picChg>
+        <pc:picChg chg="add del mod">
+          <ac:chgData name="adelaida.molinar1997@gmail.com" userId="73a9b2cc98479d66" providerId="LiveId" clId="{2F3BDEE8-1B09-4329-B241-C1265B3CF150}" dt="2020-11-23T18:40:41.307" v="102" actId="478"/>
+          <ac:picMkLst>
+            <pc:docMk/>
+            <pc:sldMk cId="4136787870" sldId="257"/>
+            <ac:picMk id="8" creationId="{CA95247E-1C49-4F81-B45E-F26A25F7F3AB}"/>
+          </ac:picMkLst>
+        </pc:picChg>
+      </pc:sldChg>
+      <pc:sldChg chg="del">
+        <pc:chgData name="adelaida.molinar1997@gmail.com" userId="73a9b2cc98479d66" providerId="LiveId" clId="{2F3BDEE8-1B09-4329-B241-C1265B3CF150}" dt="2020-11-23T18:41:24.913" v="106" actId="47"/>
+        <pc:sldMkLst>
+          <pc:docMk/>
+          <pc:sldMk cId="3063191422" sldId="258"/>
+        </pc:sldMkLst>
+      </pc:sldChg>
+      <pc:sldChg chg="addSp modSp mod modTransition">
+        <pc:chgData name="adelaida.molinar1997@gmail.com" userId="73a9b2cc98479d66" providerId="LiveId" clId="{2F3BDEE8-1B09-4329-B241-C1265B3CF150}" dt="2020-11-23T19:51:11.232" v="354"/>
         <pc:sldMkLst>
           <pc:docMk/>
           <pc:sldMk cId="450291241" sldId="259"/>
         </pc:sldMkLst>
         <pc:spChg chg="mod">
-          <ac:chgData name="adelaida.molinar1997@gmail.com" userId="73a9b2cc98479d66" providerId="LiveId" clId="{2F3BDEE8-1B09-4329-B241-C1265B3CF150}" dt="2020-11-23T14:53:11.279" v="17" actId="20577"/>
+          <ac:chgData name="adelaida.molinar1997@gmail.com" userId="73a9b2cc98479d66" providerId="LiveId" clId="{2F3BDEE8-1B09-4329-B241-C1265B3CF150}" dt="2020-11-23T18:45:51.925" v="137" actId="14100"/>
+          <ac:spMkLst>
+            <pc:docMk/>
+            <pc:sldMk cId="450291241" sldId="259"/>
+            <ac:spMk id="3" creationId="{0F3ED5B2-A25D-4BFD-A271-312EA039A95A}"/>
+          </ac:spMkLst>
+        </pc:spChg>
+        <pc:spChg chg="mod">
+          <ac:chgData name="adelaida.molinar1997@gmail.com" userId="73a9b2cc98479d66" providerId="LiveId" clId="{2F3BDEE8-1B09-4329-B241-C1265B3CF150}" dt="2020-11-23T18:46:34.832" v="141" actId="1076"/>
           <ac:spMkLst>
             <pc:docMk/>
             <pc:sldMk cId="450291241" sldId="259"/>
@@ -144,7 +213,7 @@
           </ac:spMkLst>
         </pc:spChg>
         <pc:spChg chg="mod">
-          <ac:chgData name="adelaida.molinar1997@gmail.com" userId="73a9b2cc98479d66" providerId="LiveId" clId="{2F3BDEE8-1B09-4329-B241-C1265B3CF150}" dt="2020-11-23T14:59:13.482" v="67" actId="20577"/>
+          <ac:chgData name="adelaida.molinar1997@gmail.com" userId="73a9b2cc98479d66" providerId="LiveId" clId="{2F3BDEE8-1B09-4329-B241-C1265B3CF150}" dt="2020-11-23T18:46:34.832" v="141" actId="1076"/>
           <ac:spMkLst>
             <pc:docMk/>
             <pc:sldMk cId="450291241" sldId="259"/>
@@ -152,7 +221,7 @@
           </ac:spMkLst>
         </pc:spChg>
         <pc:spChg chg="add mod">
-          <ac:chgData name="adelaida.molinar1997@gmail.com" userId="73a9b2cc98479d66" providerId="LiveId" clId="{2F3BDEE8-1B09-4329-B241-C1265B3CF150}" dt="2020-11-23T14:57:30.658" v="64" actId="1076"/>
+          <ac:chgData name="adelaida.molinar1997@gmail.com" userId="73a9b2cc98479d66" providerId="LiveId" clId="{2F3BDEE8-1B09-4329-B241-C1265B3CF150}" dt="2020-11-23T18:46:34.832" v="141" actId="1076"/>
           <ac:spMkLst>
             <pc:docMk/>
             <pc:sldMk cId="450291241" sldId="259"/>
@@ -160,7 +229,7 @@
           </ac:spMkLst>
         </pc:spChg>
         <pc:spChg chg="mod">
-          <ac:chgData name="adelaida.molinar1997@gmail.com" userId="73a9b2cc98479d66" providerId="LiveId" clId="{2F3BDEE8-1B09-4329-B241-C1265B3CF150}" dt="2020-11-23T14:59:25.113" v="68" actId="1076"/>
+          <ac:chgData name="adelaida.molinar1997@gmail.com" userId="73a9b2cc98479d66" providerId="LiveId" clId="{2F3BDEE8-1B09-4329-B241-C1265B3CF150}" dt="2020-11-23T18:46:34.832" v="141" actId="1076"/>
           <ac:spMkLst>
             <pc:docMk/>
             <pc:sldMk cId="450291241" sldId="259"/>
@@ -168,13 +237,207 @@
           </ac:spMkLst>
         </pc:spChg>
         <pc:spChg chg="mod">
-          <ac:chgData name="adelaida.molinar1997@gmail.com" userId="73a9b2cc98479d66" providerId="LiveId" clId="{2F3BDEE8-1B09-4329-B241-C1265B3CF150}" dt="2020-11-23T14:57:33.630" v="65" actId="1076"/>
+          <ac:chgData name="adelaida.molinar1997@gmail.com" userId="73a9b2cc98479d66" providerId="LiveId" clId="{2F3BDEE8-1B09-4329-B241-C1265B3CF150}" dt="2020-11-23T18:46:34.832" v="141" actId="1076"/>
           <ac:spMkLst>
             <pc:docMk/>
             <pc:sldMk cId="450291241" sldId="259"/>
             <ac:spMk id="13" creationId="{5FAE1C08-A515-4FD3-A50D-5B1B028D761E}"/>
           </ac:spMkLst>
         </pc:spChg>
+        <pc:picChg chg="add mod">
+          <ac:chgData name="adelaida.molinar1997@gmail.com" userId="73a9b2cc98479d66" providerId="LiveId" clId="{2F3BDEE8-1B09-4329-B241-C1265B3CF150}" dt="2020-11-23T19:39:52.427" v="323" actId="1076"/>
+          <ac:picMkLst>
+            <pc:docMk/>
+            <pc:sldMk cId="450291241" sldId="259"/>
+            <ac:picMk id="10" creationId="{7A21AA2F-6EE3-4245-A7CC-A0185A01C086}"/>
+          </ac:picMkLst>
+        </pc:picChg>
+      </pc:sldChg>
+      <pc:sldChg chg="addSp delSp modSp mod modTransition">
+        <pc:chgData name="adelaida.molinar1997@gmail.com" userId="73a9b2cc98479d66" providerId="LiveId" clId="{2F3BDEE8-1B09-4329-B241-C1265B3CF150}" dt="2020-11-23T19:51:11.232" v="354"/>
+        <pc:sldMkLst>
+          <pc:docMk/>
+          <pc:sldMk cId="2937598698" sldId="260"/>
+        </pc:sldMkLst>
+        <pc:spChg chg="mod">
+          <ac:chgData name="adelaida.molinar1997@gmail.com" userId="73a9b2cc98479d66" providerId="LiveId" clId="{2F3BDEE8-1B09-4329-B241-C1265B3CF150}" dt="2020-11-23T18:48:58.731" v="147" actId="403"/>
+          <ac:spMkLst>
+            <pc:docMk/>
+            <pc:sldMk cId="2937598698" sldId="260"/>
+            <ac:spMk id="4" creationId="{82D9D875-0989-4EC0-A940-D98CDADBE87C}"/>
+          </ac:spMkLst>
+        </pc:spChg>
+        <pc:picChg chg="add del mod modCrop">
+          <ac:chgData name="adelaida.molinar1997@gmail.com" userId="73a9b2cc98479d66" providerId="LiveId" clId="{2F3BDEE8-1B09-4329-B241-C1265B3CF150}" dt="2020-11-23T19:00:44.485" v="177" actId="478"/>
+          <ac:picMkLst>
+            <pc:docMk/>
+            <pc:sldMk cId="2937598698" sldId="260"/>
+            <ac:picMk id="5" creationId="{C9C338D2-AF5A-4829-AF8E-2EFCA2E9C1D8}"/>
+          </ac:picMkLst>
+        </pc:picChg>
+        <pc:picChg chg="add mod modCrop">
+          <ac:chgData name="adelaida.molinar1997@gmail.com" userId="73a9b2cc98479d66" providerId="LiveId" clId="{2F3BDEE8-1B09-4329-B241-C1265B3CF150}" dt="2020-11-23T19:01:58.203" v="186" actId="14100"/>
+          <ac:picMkLst>
+            <pc:docMk/>
+            <pc:sldMk cId="2937598698" sldId="260"/>
+            <ac:picMk id="7" creationId="{D2749865-594C-4543-BF0F-67F6D1600D72}"/>
+          </ac:picMkLst>
+        </pc:picChg>
+      </pc:sldChg>
+      <pc:sldChg chg="addSp modSp mod modTransition">
+        <pc:chgData name="adelaida.molinar1997@gmail.com" userId="73a9b2cc98479d66" providerId="LiveId" clId="{2F3BDEE8-1B09-4329-B241-C1265B3CF150}" dt="2020-11-23T19:51:11.232" v="354"/>
+        <pc:sldMkLst>
+          <pc:docMk/>
+          <pc:sldMk cId="4051917151" sldId="261"/>
+        </pc:sldMkLst>
+        <pc:spChg chg="mod">
+          <ac:chgData name="adelaida.molinar1997@gmail.com" userId="73a9b2cc98479d66" providerId="LiveId" clId="{2F3BDEE8-1B09-4329-B241-C1265B3CF150}" dt="2020-11-23T19:09:50.413" v="224" actId="21"/>
+          <ac:spMkLst>
+            <pc:docMk/>
+            <pc:sldMk cId="4051917151" sldId="261"/>
+            <ac:spMk id="4" creationId="{63D03C20-A84A-44EF-9844-9DFA685C535F}"/>
+          </ac:spMkLst>
+        </pc:spChg>
+        <pc:spChg chg="add mod">
+          <ac:chgData name="adelaida.molinar1997@gmail.com" userId="73a9b2cc98479d66" providerId="LiveId" clId="{2F3BDEE8-1B09-4329-B241-C1265B3CF150}" dt="2020-11-23T19:10:38.420" v="231" actId="14100"/>
+          <ac:spMkLst>
+            <pc:docMk/>
+            <pc:sldMk cId="4051917151" sldId="261"/>
+            <ac:spMk id="5" creationId="{BE05454C-6D82-4E70-840D-A8F57C5DBFF6}"/>
+          </ac:spMkLst>
+        </pc:spChg>
+        <pc:picChg chg="add mod">
+          <ac:chgData name="adelaida.molinar1997@gmail.com" userId="73a9b2cc98479d66" providerId="LiveId" clId="{2F3BDEE8-1B09-4329-B241-C1265B3CF150}" dt="2020-11-23T19:10:29.284" v="230" actId="1076"/>
+          <ac:picMkLst>
+            <pc:docMk/>
+            <pc:sldMk cId="4051917151" sldId="261"/>
+            <ac:picMk id="1026" creationId="{01B2AE57-85B8-4315-97C7-28C8FEAFC3F1}"/>
+          </ac:picMkLst>
+        </pc:picChg>
+      </pc:sldChg>
+      <pc:sldChg chg="modSp mod modTransition">
+        <pc:chgData name="adelaida.molinar1997@gmail.com" userId="73a9b2cc98479d66" providerId="LiveId" clId="{2F3BDEE8-1B09-4329-B241-C1265B3CF150}" dt="2020-11-23T19:51:11.232" v="354"/>
+        <pc:sldMkLst>
+          <pc:docMk/>
+          <pc:sldMk cId="461370616" sldId="262"/>
+        </pc:sldMkLst>
+        <pc:spChg chg="mod">
+          <ac:chgData name="adelaida.molinar1997@gmail.com" userId="73a9b2cc98479d66" providerId="LiveId" clId="{2F3BDEE8-1B09-4329-B241-C1265B3CF150}" dt="2020-11-23T19:39:02.342" v="321" actId="1076"/>
+          <ac:spMkLst>
+            <pc:docMk/>
+            <pc:sldMk cId="461370616" sldId="262"/>
+            <ac:spMk id="3" creationId="{C7E7C02F-835A-468A-B69F-C200520CEC10}"/>
+          </ac:spMkLst>
+        </pc:spChg>
+      </pc:sldChg>
+      <pc:sldChg chg="addSp delSp modSp mod modTransition">
+        <pc:chgData name="adelaida.molinar1997@gmail.com" userId="73a9b2cc98479d66" providerId="LiveId" clId="{2F3BDEE8-1B09-4329-B241-C1265B3CF150}" dt="2020-11-23T19:51:11.232" v="354"/>
+        <pc:sldMkLst>
+          <pc:docMk/>
+          <pc:sldMk cId="4103274064" sldId="263"/>
+        </pc:sldMkLst>
+        <pc:spChg chg="add del mod">
+          <ac:chgData name="adelaida.molinar1997@gmail.com" userId="73a9b2cc98479d66" providerId="LiveId" clId="{2F3BDEE8-1B09-4329-B241-C1265B3CF150}" dt="2020-11-23T19:38:47.093" v="320" actId="14100"/>
+          <ac:spMkLst>
+            <pc:docMk/>
+            <pc:sldMk cId="4103274064" sldId="263"/>
+            <ac:spMk id="3" creationId="{8A49B418-25BE-484D-811D-F7FE21C72C35}"/>
+          </ac:spMkLst>
+        </pc:spChg>
+        <pc:picChg chg="add mod modCrop">
+          <ac:chgData name="adelaida.molinar1997@gmail.com" userId="73a9b2cc98479d66" providerId="LiveId" clId="{2F3BDEE8-1B09-4329-B241-C1265B3CF150}" dt="2020-11-23T19:37:54.353" v="312" actId="1076"/>
+          <ac:picMkLst>
+            <pc:docMk/>
+            <pc:sldMk cId="4103274064" sldId="263"/>
+            <ac:picMk id="4" creationId="{82CD3153-1025-499B-B8F7-BA87A1FB73CC}"/>
+          </ac:picMkLst>
+        </pc:picChg>
+        <pc:picChg chg="add mod ord modCrop">
+          <ac:chgData name="adelaida.molinar1997@gmail.com" userId="73a9b2cc98479d66" providerId="LiveId" clId="{2F3BDEE8-1B09-4329-B241-C1265B3CF150}" dt="2020-11-23T19:37:34.849" v="310" actId="1076"/>
+          <ac:picMkLst>
+            <pc:docMk/>
+            <pc:sldMk cId="4103274064" sldId="263"/>
+            <ac:picMk id="6" creationId="{0D1F5296-B03E-4926-BABA-8AA5EAA0F55F}"/>
+          </ac:picMkLst>
+        </pc:picChg>
+      </pc:sldChg>
+      <pc:sldChg chg="addSp modSp mod ord modTransition">
+        <pc:chgData name="adelaida.molinar1997@gmail.com" userId="73a9b2cc98479d66" providerId="LiveId" clId="{2F3BDEE8-1B09-4329-B241-C1265B3CF150}" dt="2020-11-23T19:51:11.232" v="354"/>
+        <pc:sldMkLst>
+          <pc:docMk/>
+          <pc:sldMk cId="2863035756" sldId="264"/>
+        </pc:sldMkLst>
+        <pc:spChg chg="mod">
+          <ac:chgData name="adelaida.molinar1997@gmail.com" userId="73a9b2cc98479d66" providerId="LiveId" clId="{2F3BDEE8-1B09-4329-B241-C1265B3CF150}" dt="2020-11-23T19:24:06.025" v="280" actId="1076"/>
+          <ac:spMkLst>
+            <pc:docMk/>
+            <pc:sldMk cId="2863035756" sldId="264"/>
+            <ac:spMk id="2" creationId="{00D6F99D-9353-41FE-8F8A-23809FECBD56}"/>
+          </ac:spMkLst>
+        </pc:spChg>
+        <pc:spChg chg="mod">
+          <ac:chgData name="adelaida.molinar1997@gmail.com" userId="73a9b2cc98479d66" providerId="LiveId" clId="{2F3BDEE8-1B09-4329-B241-C1265B3CF150}" dt="2020-11-23T19:23:52.769" v="277" actId="113"/>
+          <ac:spMkLst>
+            <pc:docMk/>
+            <pc:sldMk cId="2863035756" sldId="264"/>
+            <ac:spMk id="3" creationId="{54806B83-4175-47D0-9B67-224E8E28AE01}"/>
+          </ac:spMkLst>
+        </pc:spChg>
+        <pc:spChg chg="mod">
+          <ac:chgData name="adelaida.molinar1997@gmail.com" userId="73a9b2cc98479d66" providerId="LiveId" clId="{2F3BDEE8-1B09-4329-B241-C1265B3CF150}" dt="2020-11-23T19:23:57.356" v="278" actId="113"/>
+          <ac:spMkLst>
+            <pc:docMk/>
+            <pc:sldMk cId="2863035756" sldId="264"/>
+            <ac:spMk id="4" creationId="{A4F5E357-DFEA-49CF-BFED-7E2D775317E5}"/>
+          </ac:spMkLst>
+        </pc:spChg>
+        <pc:picChg chg="add mod">
+          <ac:chgData name="adelaida.molinar1997@gmail.com" userId="73a9b2cc98479d66" providerId="LiveId" clId="{2F3BDEE8-1B09-4329-B241-C1265B3CF150}" dt="2020-11-23T19:41:04.992" v="328" actId="1440"/>
+          <ac:picMkLst>
+            <pc:docMk/>
+            <pc:sldMk cId="2863035756" sldId="264"/>
+            <ac:picMk id="3074" creationId="{917E6468-52AC-4BA0-B47B-F211203853E0}"/>
+          </ac:picMkLst>
+        </pc:picChg>
+        <pc:picChg chg="add mod">
+          <ac:chgData name="adelaida.molinar1997@gmail.com" userId="73a9b2cc98479d66" providerId="LiveId" clId="{2F3BDEE8-1B09-4329-B241-C1265B3CF150}" dt="2020-11-23T19:41:17.577" v="331" actId="14100"/>
+          <ac:picMkLst>
+            <pc:docMk/>
+            <pc:sldMk cId="2863035756" sldId="264"/>
+            <ac:picMk id="3076" creationId="{7248408E-8099-4F9B-8877-3BD0FB2F19B4}"/>
+          </ac:picMkLst>
+        </pc:picChg>
+      </pc:sldChg>
+      <pc:sldChg chg="addSp modSp mod modTransition">
+        <pc:chgData name="adelaida.molinar1997@gmail.com" userId="73a9b2cc98479d66" providerId="LiveId" clId="{2F3BDEE8-1B09-4329-B241-C1265B3CF150}" dt="2020-11-23T19:51:11.232" v="354"/>
+        <pc:sldMkLst>
+          <pc:docMk/>
+          <pc:sldMk cId="1141999583" sldId="265"/>
+        </pc:sldMkLst>
+        <pc:spChg chg="mod">
+          <ac:chgData name="adelaida.molinar1997@gmail.com" userId="73a9b2cc98479d66" providerId="LiveId" clId="{2F3BDEE8-1B09-4329-B241-C1265B3CF150}" dt="2020-11-23T19:46:03.499" v="344" actId="1076"/>
+          <ac:spMkLst>
+            <pc:docMk/>
+            <pc:sldMk cId="1141999583" sldId="265"/>
+            <ac:spMk id="2" creationId="{40E1DCFE-32B2-451C-BE26-BB46845633A2}"/>
+          </ac:spMkLst>
+        </pc:spChg>
+        <pc:spChg chg="add mod">
+          <ac:chgData name="adelaida.molinar1997@gmail.com" userId="73a9b2cc98479d66" providerId="LiveId" clId="{2F3BDEE8-1B09-4329-B241-C1265B3CF150}" dt="2020-11-23T19:46:11.797" v="345" actId="14100"/>
+          <ac:spMkLst>
+            <pc:docMk/>
+            <pc:sldMk cId="1141999583" sldId="265"/>
+            <ac:spMk id="4" creationId="{02BB4AE3-0A83-4DF5-9EA3-CBFCFE05E361}"/>
+          </ac:spMkLst>
+        </pc:spChg>
+        <pc:picChg chg="add mod">
+          <ac:chgData name="adelaida.molinar1997@gmail.com" userId="73a9b2cc98479d66" providerId="LiveId" clId="{2F3BDEE8-1B09-4329-B241-C1265B3CF150}" dt="2020-11-23T19:47:21.319" v="347" actId="14100"/>
+          <ac:picMkLst>
+            <pc:docMk/>
+            <pc:sldMk cId="1141999583" sldId="265"/>
+            <ac:picMk id="2050" creationId="{862DD084-0E93-43C5-B642-E49894D4675F}"/>
+          </ac:picMkLst>
+        </pc:picChg>
       </pc:sldChg>
       <pc:sldChg chg="add del">
         <pc:chgData name="adelaida.molinar1997@gmail.com" userId="73a9b2cc98479d66" providerId="LiveId" clId="{2F3BDEE8-1B09-4329-B241-C1265B3CF150}" dt="2020-11-23T14:57:03.272" v="45"/>
@@ -6212,12 +6475,317 @@
           <a:chExt cx="0" cy="0"/>
         </a:xfrm>
       </p:grpSpPr>
+      <p:sp>
+        <p:nvSpPr>
+          <p:cNvPr id="3" name="CuadroTexto 2">
+            <a:extLst>
+              <a:ext uri="{FF2B5EF4-FFF2-40B4-BE49-F238E27FC236}">
+                <a16:creationId xmlns:a16="http://schemas.microsoft.com/office/drawing/2014/main" id="{BF9C6B4B-8764-4AD5-8C38-761F78259345}"/>
+              </a:ext>
+            </a:extLst>
+          </p:cNvPr>
+          <p:cNvSpPr txBox="1"/>
+          <p:nvPr/>
+        </p:nvSpPr>
+        <p:spPr>
+          <a:xfrm>
+            <a:off x="993912" y="2664181"/>
+            <a:ext cx="9647582" cy="1190134"/>
+          </a:xfrm>
+          <a:prstGeom prst="rect">
+            <a:avLst/>
+          </a:prstGeom>
+          <a:noFill/>
+        </p:spPr>
+        <p:txBody>
+          <a:bodyPr wrap="square">
+            <a:spAutoFit/>
+          </a:bodyPr>
+          <a:lstStyle/>
+          <a:p>
+            <a:pPr algn="ctr">
+              <a:lnSpc>
+                <a:spcPct val="107000"/>
+              </a:lnSpc>
+              <a:spcAft>
+                <a:spcPts val="800"/>
+              </a:spcAft>
+            </a:pPr>
+            <a:r>
+              <a:rPr lang="es-MX" b="1" dirty="0">
+                <a:solidFill>
+                  <a:srgbClr val="000000"/>
+                </a:solidFill>
+                <a:effectLst/>
+                <a:latin typeface="Arial" panose="020B0604020202020204" pitchFamily="34" charset="0"/>
+                <a:ea typeface="Arial" panose="020B0604020202020204" pitchFamily="34" charset="0"/>
+              </a:rPr>
+              <a:t>NOMBRE DEL PROYECTO:</a:t>
+            </a:r>
+            <a:endParaRPr lang="es-MX" sz="1400" dirty="0">
+              <a:effectLst/>
+              <a:latin typeface="Calibri" panose="020F0502020204030204" pitchFamily="34" charset="0"/>
+              <a:ea typeface="Calibri" panose="020F0502020204030204" pitchFamily="34" charset="0"/>
+            </a:endParaRPr>
+          </a:p>
+          <a:p>
+            <a:pPr algn="just">
+              <a:lnSpc>
+                <a:spcPct val="150000"/>
+              </a:lnSpc>
+              <a:spcAft>
+                <a:spcPts val="800"/>
+              </a:spcAft>
+            </a:pPr>
+            <a:r>
+              <a:rPr lang="es-MX" sz="1600" dirty="0">
+                <a:effectLst/>
+                <a:latin typeface="Arial" panose="020B0604020202020204" pitchFamily="34" charset="0"/>
+                <a:ea typeface="Arial" panose="020B0604020202020204" pitchFamily="34" charset="0"/>
+              </a:rPr>
+              <a:t>Sistema de punto de venta y e-</a:t>
+            </a:r>
+            <a:r>
+              <a:rPr lang="es-MX" sz="1600" dirty="0" err="1">
+                <a:effectLst/>
+                <a:latin typeface="Arial" panose="020B0604020202020204" pitchFamily="34" charset="0"/>
+                <a:ea typeface="Arial" panose="020B0604020202020204" pitchFamily="34" charset="0"/>
+              </a:rPr>
+              <a:t>commerce</a:t>
+            </a:r>
+            <a:r>
+              <a:rPr lang="es-MX" sz="1600" dirty="0">
+                <a:effectLst/>
+                <a:latin typeface="Arial" panose="020B0604020202020204" pitchFamily="34" charset="0"/>
+                <a:ea typeface="Arial" panose="020B0604020202020204" pitchFamily="34" charset="0"/>
+              </a:rPr>
+              <a:t> para las sucursales de Farmacias Gi S.A. de C.V, en Zimatlán de Álvarez, Oaxaca</a:t>
+            </a:r>
+            <a:endParaRPr lang="es-MX" sz="1400" dirty="0">
+              <a:effectLst/>
+              <a:latin typeface="Calibri" panose="020F0502020204030204" pitchFamily="34" charset="0"/>
+              <a:ea typeface="Calibri" panose="020F0502020204030204" pitchFamily="34" charset="0"/>
+            </a:endParaRPr>
+          </a:p>
+        </p:txBody>
+      </p:sp>
+      <p:sp>
+        <p:nvSpPr>
+          <p:cNvPr id="5" name="CuadroTexto 4">
+            <a:extLst>
+              <a:ext uri="{FF2B5EF4-FFF2-40B4-BE49-F238E27FC236}">
+                <a16:creationId xmlns:a16="http://schemas.microsoft.com/office/drawing/2014/main" id="{0E90F9B3-B225-4DA6-BD10-9C8A73BBA74C}"/>
+              </a:ext>
+            </a:extLst>
+          </p:cNvPr>
+          <p:cNvSpPr txBox="1"/>
+          <p:nvPr/>
+        </p:nvSpPr>
+        <p:spPr>
+          <a:xfrm>
+            <a:off x="2385389" y="320001"/>
+            <a:ext cx="7421218" cy="1184427"/>
+          </a:xfrm>
+          <a:prstGeom prst="rect">
+            <a:avLst/>
+          </a:prstGeom>
+          <a:noFill/>
+        </p:spPr>
+        <p:txBody>
+          <a:bodyPr wrap="square">
+            <a:spAutoFit/>
+          </a:bodyPr>
+          <a:lstStyle/>
+          <a:p>
+            <a:pPr algn="ctr">
+              <a:lnSpc>
+                <a:spcPct val="107000"/>
+              </a:lnSpc>
+              <a:spcBef>
+                <a:spcPts val="1400"/>
+              </a:spcBef>
+              <a:spcAft>
+                <a:spcPts val="1400"/>
+              </a:spcAft>
+            </a:pPr>
+            <a:r>
+              <a:rPr lang="es-MX" b="1" dirty="0">
+                <a:solidFill>
+                  <a:srgbClr val="000000"/>
+                </a:solidFill>
+                <a:effectLst/>
+                <a:latin typeface="Arial" panose="020B0604020202020204" pitchFamily="34" charset="0"/>
+                <a:ea typeface="Arial" panose="020B0604020202020204" pitchFamily="34" charset="0"/>
+              </a:rPr>
+              <a:t>INSTITUTO TECNOLÓGICO DE OAXACA</a:t>
+            </a:r>
+            <a:endParaRPr lang="es-MX" dirty="0">
+              <a:effectLst/>
+              <a:latin typeface="Calibri" panose="020F0502020204030204" pitchFamily="34" charset="0"/>
+              <a:ea typeface="Calibri" panose="020F0502020204030204" pitchFamily="34" charset="0"/>
+            </a:endParaRPr>
+          </a:p>
+          <a:p>
+            <a:pPr algn="ctr">
+              <a:lnSpc>
+                <a:spcPct val="107000"/>
+              </a:lnSpc>
+              <a:spcAft>
+                <a:spcPts val="800"/>
+              </a:spcAft>
+            </a:pPr>
+            <a:r>
+              <a:rPr lang="es-MX" sz="1600" dirty="0">
+                <a:solidFill>
+                  <a:srgbClr val="000000"/>
+                </a:solidFill>
+                <a:effectLst/>
+                <a:latin typeface="Arial" panose="020B0604020202020204" pitchFamily="34" charset="0"/>
+                <a:ea typeface="Arial" panose="020B0604020202020204" pitchFamily="34" charset="0"/>
+              </a:rPr>
+              <a:t>DEPARTAMENTO DE SISTEMAS Y COMPUTACIÓN</a:t>
+            </a:r>
+            <a:endParaRPr lang="es-MX" sz="1400" dirty="0">
+              <a:effectLst/>
+              <a:latin typeface="Calibri" panose="020F0502020204030204" pitchFamily="34" charset="0"/>
+              <a:ea typeface="Calibri" panose="020F0502020204030204" pitchFamily="34" charset="0"/>
+            </a:endParaRPr>
+          </a:p>
+          <a:p>
+            <a:pPr algn="ctr">
+              <a:lnSpc>
+                <a:spcPct val="107000"/>
+              </a:lnSpc>
+              <a:spcAft>
+                <a:spcPts val="800"/>
+              </a:spcAft>
+            </a:pPr>
+            <a:r>
+              <a:rPr lang="es-MX" sz="1600" dirty="0">
+                <a:solidFill>
+                  <a:srgbClr val="000000"/>
+                </a:solidFill>
+                <a:effectLst/>
+                <a:latin typeface="Arial" panose="020B0604020202020204" pitchFamily="34" charset="0"/>
+                <a:ea typeface="Arial" panose="020B0604020202020204" pitchFamily="34" charset="0"/>
+              </a:rPr>
+              <a:t>CARRERA: INGENIERÍA EN SISTEMAS COMPUTACIONALES</a:t>
+            </a:r>
+            <a:endParaRPr lang="es-MX" sz="1400" dirty="0">
+              <a:effectLst/>
+              <a:latin typeface="Calibri" panose="020F0502020204030204" pitchFamily="34" charset="0"/>
+              <a:ea typeface="Calibri" panose="020F0502020204030204" pitchFamily="34" charset="0"/>
+            </a:endParaRPr>
+          </a:p>
+        </p:txBody>
+      </p:sp>
+      <p:sp>
+        <p:nvSpPr>
+          <p:cNvPr id="7" name="CuadroTexto 6">
+            <a:extLst>
+              <a:ext uri="{FF2B5EF4-FFF2-40B4-BE49-F238E27FC236}">
+                <a16:creationId xmlns:a16="http://schemas.microsoft.com/office/drawing/2014/main" id="{E943B60B-78BC-4B37-B6B1-0595582B3189}"/>
+              </a:ext>
+            </a:extLst>
+          </p:cNvPr>
+          <p:cNvSpPr txBox="1"/>
+          <p:nvPr/>
+        </p:nvSpPr>
+        <p:spPr>
+          <a:xfrm>
+            <a:off x="1550503" y="3854315"/>
+            <a:ext cx="9090991" cy="1499257"/>
+          </a:xfrm>
+          <a:prstGeom prst="rect">
+            <a:avLst/>
+          </a:prstGeom>
+          <a:noFill/>
+        </p:spPr>
+        <p:txBody>
+          <a:bodyPr wrap="square">
+            <a:spAutoFit/>
+          </a:bodyPr>
+          <a:lstStyle/>
+          <a:p>
+            <a:pPr algn="ctr">
+              <a:lnSpc>
+                <a:spcPct val="150000"/>
+              </a:lnSpc>
+              <a:spcAft>
+                <a:spcPts val="800"/>
+              </a:spcAft>
+            </a:pPr>
+            <a:r>
+              <a:rPr lang="es-MX" sz="1800" b="1" dirty="0">
+                <a:solidFill>
+                  <a:srgbClr val="000000"/>
+                </a:solidFill>
+                <a:effectLst/>
+                <a:latin typeface="Arial" panose="020B0604020202020204" pitchFamily="34" charset="0"/>
+                <a:ea typeface="Arial" panose="020B0604020202020204" pitchFamily="34" charset="0"/>
+              </a:rPr>
+              <a:t>PRESENTAN:</a:t>
+            </a:r>
+            <a:endParaRPr lang="es-MX" sz="1600" dirty="0">
+              <a:effectLst/>
+              <a:latin typeface="Calibri" panose="020F0502020204030204" pitchFamily="34" charset="0"/>
+              <a:ea typeface="Calibri" panose="020F0502020204030204" pitchFamily="34" charset="0"/>
+            </a:endParaRPr>
+          </a:p>
+          <a:p>
+            <a:pPr algn="ctr">
+              <a:lnSpc>
+                <a:spcPct val="150000"/>
+              </a:lnSpc>
+              <a:spcAft>
+                <a:spcPts val="800"/>
+              </a:spcAft>
+            </a:pPr>
+            <a:r>
+              <a:rPr lang="es-MX" sz="1800" dirty="0">
+                <a:effectLst/>
+                <a:latin typeface="Arial" panose="020B0604020202020204" pitchFamily="34" charset="0"/>
+                <a:ea typeface="Arial" panose="020B0604020202020204" pitchFamily="34" charset="0"/>
+              </a:rPr>
+              <a:t>Hernández Martínez Heber Zabdiel 		15161317</a:t>
+            </a:r>
+            <a:endParaRPr lang="es-MX" sz="1600" dirty="0">
+              <a:effectLst/>
+              <a:latin typeface="Calibri" panose="020F0502020204030204" pitchFamily="34" charset="0"/>
+              <a:ea typeface="Calibri" panose="020F0502020204030204" pitchFamily="34" charset="0"/>
+            </a:endParaRPr>
+          </a:p>
+          <a:p>
+            <a:pPr algn="ctr">
+              <a:lnSpc>
+                <a:spcPct val="150000"/>
+              </a:lnSpc>
+              <a:spcAft>
+                <a:spcPts val="800"/>
+              </a:spcAft>
+            </a:pPr>
+            <a:r>
+              <a:rPr lang="es-MX" sz="1800" dirty="0">
+                <a:effectLst/>
+                <a:latin typeface="Arial" panose="020B0604020202020204" pitchFamily="34" charset="0"/>
+                <a:ea typeface="Arial" panose="020B0604020202020204" pitchFamily="34" charset="0"/>
+              </a:rPr>
+              <a:t>Molina Reyes Adelaida				15161377</a:t>
+            </a:r>
+            <a:endParaRPr lang="es-MX" sz="1600" dirty="0">
+              <a:effectLst/>
+              <a:latin typeface="Calibri" panose="020F0502020204030204" pitchFamily="34" charset="0"/>
+              <a:ea typeface="Calibri" panose="020F0502020204030204" pitchFamily="34" charset="0"/>
+            </a:endParaRPr>
+          </a:p>
+        </p:txBody>
+      </p:sp>
       <p:pic>
         <p:nvPicPr>
-          <p:cNvPr id="5" name="Imagen 4">
+          <p:cNvPr id="6" name="Imagen 5">
             <a:extLst>
               <a:ext uri="{FF2B5EF4-FFF2-40B4-BE49-F238E27FC236}">
-                <a16:creationId xmlns:a16="http://schemas.microsoft.com/office/drawing/2014/main" id="{4B4FD833-4E7B-4813-948B-6861EB86D65E}"/>
+                <a16:creationId xmlns:a16="http://schemas.microsoft.com/office/drawing/2014/main" id="{45E2AC7F-C625-41BE-A216-44C46F5273BC}"/>
               </a:ext>
             </a:extLst>
           </p:cNvPr>
@@ -6240,44 +6808,8 @@
         </p:blipFill>
         <p:spPr>
           <a:xfrm>
-            <a:off x="1465685" y="1786972"/>
-            <a:ext cx="4395718" cy="1883879"/>
-          </a:xfrm>
-          <a:prstGeom prst="rect">
-            <a:avLst/>
-          </a:prstGeom>
-        </p:spPr>
-      </p:pic>
-      <p:pic>
-        <p:nvPicPr>
-          <p:cNvPr id="7" name="Imagen 6">
-            <a:extLst>
-              <a:ext uri="{FF2B5EF4-FFF2-40B4-BE49-F238E27FC236}">
-                <a16:creationId xmlns:a16="http://schemas.microsoft.com/office/drawing/2014/main" id="{462D50C2-7068-4BA8-952F-36EA8D4A19A1}"/>
-              </a:ext>
-            </a:extLst>
-          </p:cNvPr>
-          <p:cNvPicPr>
-            <a:picLocks noChangeAspect="1"/>
-          </p:cNvPicPr>
-          <p:nvPr/>
-        </p:nvPicPr>
-        <p:blipFill>
-          <a:blip r:embed="rId3">
-            <a:extLst>
-              <a:ext uri="{28A0092B-C50C-407E-A947-70E740481C1C}">
-                <a14:useLocalDpi xmlns:a14="http://schemas.microsoft.com/office/drawing/2010/main" val="0"/>
-              </a:ext>
-            </a:extLst>
-          </a:blip>
-          <a:stretch>
-            <a:fillRect/>
-          </a:stretch>
-        </p:blipFill>
-        <p:spPr>
-          <a:xfrm>
-            <a:off x="6330598" y="1157287"/>
-            <a:ext cx="2825282" cy="2714625"/>
+            <a:off x="5201348" y="1479753"/>
+            <a:ext cx="1232709" cy="1184428"/>
           </a:xfrm>
           <a:prstGeom prst="rect">
             <a:avLst/>
@@ -6287,13 +6819,25 @@
     </p:spTree>
     <p:extLst>
       <p:ext uri="{BB962C8B-B14F-4D97-AF65-F5344CB8AC3E}">
-        <p14:creationId xmlns:p14="http://schemas.microsoft.com/office/powerpoint/2010/main" val="3063191422"/>
+        <p14:creationId xmlns:p14="http://schemas.microsoft.com/office/powerpoint/2010/main" val="4136787870"/>
       </p:ext>
     </p:extLst>
   </p:cSld>
   <p:clrMapOvr>
     <a:masterClrMapping/>
   </p:clrMapOvr>
+  <mc:AlternateContent xmlns:mc="http://schemas.openxmlformats.org/markup-compatibility/2006">
+    <mc:Choice xmlns:p14="http://schemas.microsoft.com/office/powerpoint/2010/main" Requires="p14">
+      <p:transition spd="slow" p14:dur="1500">
+        <p:random/>
+      </p:transition>
+    </mc:Choice>
+    <mc:Fallback>
+      <p:transition spd="slow">
+        <p:random/>
+      </p:transition>
+    </mc:Fallback>
+  </mc:AlternateContent>
 </p:sld>
 </file>
 
@@ -6319,7 +6863,7 @@
           <p:cNvPr id="3" name="CuadroTexto 2">
             <a:extLst>
               <a:ext uri="{FF2B5EF4-FFF2-40B4-BE49-F238E27FC236}">
-                <a16:creationId xmlns:a16="http://schemas.microsoft.com/office/drawing/2014/main" id="{BF9C6B4B-8764-4AD5-8C38-761F78259345}"/>
+                <a16:creationId xmlns:a16="http://schemas.microsoft.com/office/drawing/2014/main" id="{0F3ED5B2-A25D-4BFD-A271-312EA039A95A}"/>
               </a:ext>
             </a:extLst>
           </p:cNvPr>
@@ -6328,8 +6872,8 @@
         </p:nvSpPr>
         <p:spPr>
           <a:xfrm>
-            <a:off x="993913" y="2065343"/>
-            <a:ext cx="9647582" cy="1190134"/>
+            <a:off x="1934817" y="512890"/>
+            <a:ext cx="4558748" cy="400110"/>
           </a:xfrm>
           <a:prstGeom prst="rect">
             <a:avLst/>
@@ -6342,68 +6886,22 @@
           </a:bodyPr>
           <a:lstStyle/>
           <a:p>
-            <a:pPr algn="ctr">
-              <a:lnSpc>
-                <a:spcPct val="107000"/>
-              </a:lnSpc>
-              <a:spcAft>
-                <a:spcPts val="800"/>
-              </a:spcAft>
-            </a:pPr>
-            <a:r>
-              <a:rPr lang="es-MX" b="1" dirty="0">
+            <a:pPr algn="ctr"/>
+            <a:r>
+              <a:rPr lang="es-MX" sz="2000" b="1" dirty="0">
                 <a:solidFill>
                   <a:srgbClr val="000000"/>
                 </a:solidFill>
                 <a:effectLst/>
                 <a:latin typeface="Arial" panose="020B0604020202020204" pitchFamily="34" charset="0"/>
-                <a:ea typeface="Arial" panose="020B0604020202020204" pitchFamily="34" charset="0"/>
+                <a:ea typeface="Times New Roman" panose="02020603050405020304" pitchFamily="18" charset="0"/>
+                <a:cs typeface="Arial" panose="020B0604020202020204" pitchFamily="34" charset="0"/>
               </a:rPr>
-              <a:t>NOMBRE DEL PROYECTO:</a:t>
-            </a:r>
-            <a:endParaRPr lang="es-MX" sz="1400" dirty="0">
-              <a:effectLst/>
-              <a:latin typeface="Calibri" panose="020F0502020204030204" pitchFamily="34" charset="0"/>
-              <a:ea typeface="Calibri" panose="020F0502020204030204" pitchFamily="34" charset="0"/>
-            </a:endParaRPr>
-          </a:p>
-          <a:p>
-            <a:pPr algn="just">
-              <a:lnSpc>
-                <a:spcPct val="150000"/>
-              </a:lnSpc>
-              <a:spcAft>
-                <a:spcPts val="800"/>
-              </a:spcAft>
-            </a:pPr>
-            <a:r>
-              <a:rPr lang="es-MX" sz="1600" dirty="0">
-                <a:effectLst/>
-                <a:latin typeface="Arial" panose="020B0604020202020204" pitchFamily="34" charset="0"/>
-                <a:ea typeface="Arial" panose="020B0604020202020204" pitchFamily="34" charset="0"/>
-              </a:rPr>
-              <a:t>Sistema de punto de venta y e-</a:t>
-            </a:r>
-            <a:r>
-              <a:rPr lang="es-MX" sz="1600" dirty="0" err="1">
-                <a:effectLst/>
-                <a:latin typeface="Arial" panose="020B0604020202020204" pitchFamily="34" charset="0"/>
-                <a:ea typeface="Arial" panose="020B0604020202020204" pitchFamily="34" charset="0"/>
-              </a:rPr>
-              <a:t>commerce</a:t>
-            </a:r>
-            <a:r>
-              <a:rPr lang="es-MX" sz="1600" dirty="0">
-                <a:effectLst/>
-                <a:latin typeface="Arial" panose="020B0604020202020204" pitchFamily="34" charset="0"/>
-                <a:ea typeface="Arial" panose="020B0604020202020204" pitchFamily="34" charset="0"/>
-              </a:rPr>
-              <a:t> para las sucursales de Farmacias Gi S.A. de C.V, en Zimatlán de Álvarez, Oaxaca</a:t>
-            </a:r>
-            <a:endParaRPr lang="es-MX" sz="1400" dirty="0">
-              <a:effectLst/>
-              <a:latin typeface="Calibri" panose="020F0502020204030204" pitchFamily="34" charset="0"/>
-              <a:ea typeface="Calibri" panose="020F0502020204030204" pitchFamily="34" charset="0"/>
+              <a:t>GENERALIDADES DE LA EMPRESA</a:t>
+            </a:r>
+            <a:endParaRPr lang="es-MX" sz="2000" dirty="0">
+              <a:latin typeface="Arial" panose="020B0604020202020204" pitchFamily="34" charset="0"/>
+              <a:cs typeface="Arial" panose="020B0604020202020204" pitchFamily="34" charset="0"/>
             </a:endParaRPr>
           </a:p>
         </p:txBody>
@@ -6413,7 +6911,7 @@
           <p:cNvPr id="5" name="CuadroTexto 4">
             <a:extLst>
               <a:ext uri="{FF2B5EF4-FFF2-40B4-BE49-F238E27FC236}">
-                <a16:creationId xmlns:a16="http://schemas.microsoft.com/office/drawing/2014/main" id="{0E90F9B3-B225-4DA6-BD10-9C8A73BBA74C}"/>
+                <a16:creationId xmlns:a16="http://schemas.microsoft.com/office/drawing/2014/main" id="{9DE9D428-5878-42BE-B3EB-CD1E4597A910}"/>
               </a:ext>
             </a:extLst>
           </p:cNvPr>
@@ -6422,8 +6920,8 @@
         </p:nvSpPr>
         <p:spPr>
           <a:xfrm>
-            <a:off x="2385390" y="566763"/>
-            <a:ext cx="7421218" cy="1184427"/>
+            <a:off x="1934817" y="1592709"/>
+            <a:ext cx="7659756" cy="615553"/>
           </a:xfrm>
           <a:prstGeom prst="rect">
             <a:avLst/>
@@ -6436,124 +6934,6 @@
           </a:bodyPr>
           <a:lstStyle/>
           <a:p>
-            <a:pPr algn="ctr">
-              <a:lnSpc>
-                <a:spcPct val="107000"/>
-              </a:lnSpc>
-              <a:spcBef>
-                <a:spcPts val="1400"/>
-              </a:spcBef>
-              <a:spcAft>
-                <a:spcPts val="1400"/>
-              </a:spcAft>
-            </a:pPr>
-            <a:r>
-              <a:rPr lang="es-MX" b="1" dirty="0">
-                <a:solidFill>
-                  <a:srgbClr val="000000"/>
-                </a:solidFill>
-                <a:effectLst/>
-                <a:latin typeface="Arial" panose="020B0604020202020204" pitchFamily="34" charset="0"/>
-                <a:ea typeface="Arial" panose="020B0604020202020204" pitchFamily="34" charset="0"/>
-              </a:rPr>
-              <a:t>INSTITUTO TECNOLÓGICO DE OAXACA</a:t>
-            </a:r>
-            <a:endParaRPr lang="es-MX" dirty="0">
-              <a:effectLst/>
-              <a:latin typeface="Calibri" panose="020F0502020204030204" pitchFamily="34" charset="0"/>
-              <a:ea typeface="Calibri" panose="020F0502020204030204" pitchFamily="34" charset="0"/>
-            </a:endParaRPr>
-          </a:p>
-          <a:p>
-            <a:pPr algn="ctr">
-              <a:lnSpc>
-                <a:spcPct val="107000"/>
-              </a:lnSpc>
-              <a:spcAft>
-                <a:spcPts val="800"/>
-              </a:spcAft>
-            </a:pPr>
-            <a:r>
-              <a:rPr lang="es-MX" sz="1600" dirty="0">
-                <a:solidFill>
-                  <a:srgbClr val="000000"/>
-                </a:solidFill>
-                <a:effectLst/>
-                <a:latin typeface="Arial" panose="020B0604020202020204" pitchFamily="34" charset="0"/>
-                <a:ea typeface="Arial" panose="020B0604020202020204" pitchFamily="34" charset="0"/>
-              </a:rPr>
-              <a:t>DEPARTAMENTO DE SISTEMAS Y COMPUTACIÓN</a:t>
-            </a:r>
-            <a:endParaRPr lang="es-MX" sz="1400" dirty="0">
-              <a:effectLst/>
-              <a:latin typeface="Calibri" panose="020F0502020204030204" pitchFamily="34" charset="0"/>
-              <a:ea typeface="Calibri" panose="020F0502020204030204" pitchFamily="34" charset="0"/>
-            </a:endParaRPr>
-          </a:p>
-          <a:p>
-            <a:pPr algn="ctr">
-              <a:lnSpc>
-                <a:spcPct val="107000"/>
-              </a:lnSpc>
-              <a:spcAft>
-                <a:spcPts val="800"/>
-              </a:spcAft>
-            </a:pPr>
-            <a:r>
-              <a:rPr lang="es-MX" sz="1600" dirty="0">
-                <a:solidFill>
-                  <a:srgbClr val="000000"/>
-                </a:solidFill>
-                <a:effectLst/>
-                <a:latin typeface="Arial" panose="020B0604020202020204" pitchFamily="34" charset="0"/>
-                <a:ea typeface="Arial" panose="020B0604020202020204" pitchFamily="34" charset="0"/>
-              </a:rPr>
-              <a:t>CARRERA: INGENIERÍA EN SISTEMAS COMPUTACIONALES</a:t>
-            </a:r>
-            <a:endParaRPr lang="es-MX" sz="1400" dirty="0">
-              <a:effectLst/>
-              <a:latin typeface="Calibri" panose="020F0502020204030204" pitchFamily="34" charset="0"/>
-              <a:ea typeface="Calibri" panose="020F0502020204030204" pitchFamily="34" charset="0"/>
-            </a:endParaRPr>
-          </a:p>
-        </p:txBody>
-      </p:sp>
-      <p:sp>
-        <p:nvSpPr>
-          <p:cNvPr id="7" name="CuadroTexto 6">
-            <a:extLst>
-              <a:ext uri="{FF2B5EF4-FFF2-40B4-BE49-F238E27FC236}">
-                <a16:creationId xmlns:a16="http://schemas.microsoft.com/office/drawing/2014/main" id="{E943B60B-78BC-4B37-B6B1-0595582B3189}"/>
-              </a:ext>
-            </a:extLst>
-          </p:cNvPr>
-          <p:cNvSpPr txBox="1"/>
-          <p:nvPr/>
-        </p:nvSpPr>
-        <p:spPr>
-          <a:xfrm>
-            <a:off x="1550503" y="3602523"/>
-            <a:ext cx="9090991" cy="1499257"/>
-          </a:xfrm>
-          <a:prstGeom prst="rect">
-            <a:avLst/>
-          </a:prstGeom>
-          <a:noFill/>
-        </p:spPr>
-        <p:txBody>
-          <a:bodyPr wrap="square">
-            <a:spAutoFit/>
-          </a:bodyPr>
-          <a:lstStyle/>
-          <a:p>
-            <a:pPr algn="ctr">
-              <a:lnSpc>
-                <a:spcPct val="150000"/>
-              </a:lnSpc>
-              <a:spcAft>
-                <a:spcPts val="800"/>
-              </a:spcAft>
-            </a:pPr>
             <a:r>
               <a:rPr lang="es-MX" sz="1800" b="1" dirty="0">
                 <a:solidFill>
@@ -6561,74 +6941,297 @@
                 </a:solidFill>
                 <a:effectLst/>
                 <a:latin typeface="Arial" panose="020B0604020202020204" pitchFamily="34" charset="0"/>
-                <a:ea typeface="Arial" panose="020B0604020202020204" pitchFamily="34" charset="0"/>
+                <a:ea typeface="Times New Roman" panose="02020603050405020304" pitchFamily="18" charset="0"/>
+                <a:cs typeface="Arial" panose="020B0604020202020204" pitchFamily="34" charset="0"/>
               </a:rPr>
-              <a:t>PRESENTAN:</a:t>
-            </a:r>
-            <a:endParaRPr lang="es-MX" sz="1600" dirty="0">
-              <a:effectLst/>
-              <a:latin typeface="Calibri" panose="020F0502020204030204" pitchFamily="34" charset="0"/>
-              <a:ea typeface="Calibri" panose="020F0502020204030204" pitchFamily="34" charset="0"/>
-            </a:endParaRPr>
-          </a:p>
-          <a:p>
-            <a:pPr algn="ctr">
-              <a:lnSpc>
-                <a:spcPct val="150000"/>
-              </a:lnSpc>
-              <a:spcAft>
-                <a:spcPts val="800"/>
-              </a:spcAft>
-            </a:pPr>
-            <a:r>
-              <a:rPr lang="es-MX" sz="1800" dirty="0">
+              <a:t>Nombre de la </a:t>
+            </a:r>
+            <a:r>
+              <a:rPr lang="es-MX" b="1" dirty="0">
+                <a:solidFill>
+                  <a:srgbClr val="000000"/>
+                </a:solidFill>
+                <a:latin typeface="Arial" panose="020B0604020202020204" pitchFamily="34" charset="0"/>
+                <a:ea typeface="Times New Roman" panose="02020603050405020304" pitchFamily="18" charset="0"/>
+                <a:cs typeface="Arial" panose="020B0604020202020204" pitchFamily="34" charset="0"/>
+              </a:rPr>
+              <a:t>E</a:t>
+            </a:r>
+            <a:r>
+              <a:rPr lang="es-MX" sz="1800" b="1" dirty="0">
+                <a:solidFill>
+                  <a:srgbClr val="000000"/>
+                </a:solidFill>
                 <a:effectLst/>
                 <a:latin typeface="Arial" panose="020B0604020202020204" pitchFamily="34" charset="0"/>
-                <a:ea typeface="Arial" panose="020B0604020202020204" pitchFamily="34" charset="0"/>
+                <a:ea typeface="Times New Roman" panose="02020603050405020304" pitchFamily="18" charset="0"/>
+                <a:cs typeface="Arial" panose="020B0604020202020204" pitchFamily="34" charset="0"/>
               </a:rPr>
-              <a:t>Hernández Martínez Heber Zabdiel 		15161317</a:t>
-            </a:r>
-            <a:endParaRPr lang="es-MX" sz="1600" dirty="0">
-              <a:effectLst/>
-              <a:latin typeface="Calibri" panose="020F0502020204030204" pitchFamily="34" charset="0"/>
-              <a:ea typeface="Calibri" panose="020F0502020204030204" pitchFamily="34" charset="0"/>
-            </a:endParaRPr>
-          </a:p>
-          <a:p>
-            <a:pPr algn="ctr">
-              <a:lnSpc>
-                <a:spcPct val="150000"/>
-              </a:lnSpc>
-              <a:spcAft>
-                <a:spcPts val="800"/>
-              </a:spcAft>
-            </a:pPr>
-            <a:r>
-              <a:rPr lang="es-MX" sz="1800" dirty="0">
+              <a:t>mpresa</a:t>
+            </a:r>
+          </a:p>
+          <a:p>
+            <a:r>
+              <a:rPr lang="es-MX" sz="1600" dirty="0">
+                <a:latin typeface="Arial" panose="020B0604020202020204" pitchFamily="34" charset="0"/>
+                <a:cs typeface="Arial" panose="020B0604020202020204" pitchFamily="34" charset="0"/>
+              </a:rPr>
+              <a:t>Farmacias Gi S.A. de C.V. </a:t>
+            </a:r>
+          </a:p>
+        </p:txBody>
+      </p:sp>
+      <p:sp>
+        <p:nvSpPr>
+          <p:cNvPr id="7" name="CuadroTexto 6">
+            <a:extLst>
+              <a:ext uri="{FF2B5EF4-FFF2-40B4-BE49-F238E27FC236}">
+                <a16:creationId xmlns:a16="http://schemas.microsoft.com/office/drawing/2014/main" id="{EBC8294F-964E-461B-9976-B056B5955A30}"/>
+              </a:ext>
+            </a:extLst>
+          </p:cNvPr>
+          <p:cNvSpPr txBox="1"/>
+          <p:nvPr/>
+        </p:nvSpPr>
+        <p:spPr>
+          <a:xfrm>
+            <a:off x="1934817" y="2569212"/>
+            <a:ext cx="7248939" cy="369332"/>
+          </a:xfrm>
+          <a:prstGeom prst="rect">
+            <a:avLst/>
+          </a:prstGeom>
+          <a:noFill/>
+        </p:spPr>
+        <p:txBody>
+          <a:bodyPr wrap="square">
+            <a:spAutoFit/>
+          </a:bodyPr>
+          <a:lstStyle/>
+          <a:p>
+            <a:r>
+              <a:rPr lang="es-MX" sz="1800" b="1" dirty="0">
+                <a:solidFill>
+                  <a:srgbClr val="000000"/>
+                </a:solidFill>
                 <a:effectLst/>
                 <a:latin typeface="Arial" panose="020B0604020202020204" pitchFamily="34" charset="0"/>
-                <a:ea typeface="Arial" panose="020B0604020202020204" pitchFamily="34" charset="0"/>
+                <a:ea typeface="Times New Roman" panose="02020603050405020304" pitchFamily="18" charset="0"/>
+                <a:cs typeface="Arial" panose="020B0604020202020204" pitchFamily="34" charset="0"/>
               </a:rPr>
-              <a:t>Molina Reyes Adelaida				15161377</a:t>
-            </a:r>
-            <a:endParaRPr lang="es-MX" sz="1600" dirty="0">
-              <a:effectLst/>
-              <a:latin typeface="Calibri" panose="020F0502020204030204" pitchFamily="34" charset="0"/>
-              <a:ea typeface="Calibri" panose="020F0502020204030204" pitchFamily="34" charset="0"/>
-            </a:endParaRPr>
-          </a:p>
-        </p:txBody>
-      </p:sp>
+              <a:t>Giro de la Empresa</a:t>
+            </a:r>
+          </a:p>
+        </p:txBody>
+      </p:sp>
+      <p:sp>
+        <p:nvSpPr>
+          <p:cNvPr id="9" name="CuadroTexto 8">
+            <a:extLst>
+              <a:ext uri="{FF2B5EF4-FFF2-40B4-BE49-F238E27FC236}">
+                <a16:creationId xmlns:a16="http://schemas.microsoft.com/office/drawing/2014/main" id="{912287C4-D12D-4FC3-B107-1EAB09A116BA}"/>
+              </a:ext>
+            </a:extLst>
+          </p:cNvPr>
+          <p:cNvSpPr txBox="1"/>
+          <p:nvPr/>
+        </p:nvSpPr>
+        <p:spPr>
+          <a:xfrm>
+            <a:off x="1934817" y="3204238"/>
+            <a:ext cx="7248938" cy="615553"/>
+          </a:xfrm>
+          <a:prstGeom prst="rect">
+            <a:avLst/>
+          </a:prstGeom>
+          <a:noFill/>
+        </p:spPr>
+        <p:txBody>
+          <a:bodyPr wrap="square">
+            <a:spAutoFit/>
+          </a:bodyPr>
+          <a:lstStyle/>
+          <a:p>
+            <a:r>
+              <a:rPr lang="es-MX" sz="1800" b="1" dirty="0">
+                <a:solidFill>
+                  <a:srgbClr val="000000"/>
+                </a:solidFill>
+                <a:effectLst/>
+                <a:latin typeface="Arial" panose="020B0604020202020204" pitchFamily="34" charset="0"/>
+                <a:ea typeface="Times New Roman" panose="02020603050405020304" pitchFamily="18" charset="0"/>
+                <a:cs typeface="Arial" panose="020B0604020202020204" pitchFamily="34" charset="0"/>
+              </a:rPr>
+              <a:t>Dirección (Croquis de ubicación)</a:t>
+            </a:r>
+          </a:p>
+          <a:p>
+            <a:pPr algn="just"/>
+            <a:r>
+              <a:rPr lang="es-MX" sz="1600" dirty="0">
+                <a:latin typeface="Arial" panose="020B0604020202020204" pitchFamily="34" charset="0"/>
+                <a:cs typeface="Arial" panose="020B0604020202020204" pitchFamily="34" charset="0"/>
+              </a:rPr>
+              <a:t>Nicolas Bravo No. 103, Barrio Expiración, Zimatlán de Álvarez, Oaxaca.</a:t>
+            </a:r>
+          </a:p>
+        </p:txBody>
+      </p:sp>
+      <p:sp>
+        <p:nvSpPr>
+          <p:cNvPr id="13" name="CuadroTexto 12">
+            <a:extLst>
+              <a:ext uri="{FF2B5EF4-FFF2-40B4-BE49-F238E27FC236}">
+                <a16:creationId xmlns:a16="http://schemas.microsoft.com/office/drawing/2014/main" id="{5FAE1C08-A515-4FD3-A50D-5B1B028D761E}"/>
+              </a:ext>
+            </a:extLst>
+          </p:cNvPr>
+          <p:cNvSpPr txBox="1"/>
+          <p:nvPr/>
+        </p:nvSpPr>
+        <p:spPr>
+          <a:xfrm>
+            <a:off x="1934817" y="3981848"/>
+            <a:ext cx="7248938" cy="369332"/>
+          </a:xfrm>
+          <a:prstGeom prst="rect">
+            <a:avLst/>
+          </a:prstGeom>
+          <a:noFill/>
+        </p:spPr>
+        <p:txBody>
+          <a:bodyPr wrap="square">
+            <a:spAutoFit/>
+          </a:bodyPr>
+          <a:lstStyle/>
+          <a:p>
+            <a:r>
+              <a:rPr lang="es-MX" sz="1800" b="1" dirty="0">
+                <a:solidFill>
+                  <a:srgbClr val="000000"/>
+                </a:solidFill>
+                <a:effectLst/>
+                <a:latin typeface="Arial" panose="020B0604020202020204" pitchFamily="34" charset="0"/>
+                <a:ea typeface="Times New Roman" panose="02020603050405020304" pitchFamily="18" charset="0"/>
+                <a:cs typeface="Arial" panose="020B0604020202020204" pitchFamily="34" charset="0"/>
+              </a:rPr>
+              <a:t>Breve descripción de los procesos de la Empresa </a:t>
+            </a:r>
+          </a:p>
+        </p:txBody>
+      </p:sp>
+      <p:sp>
+        <p:nvSpPr>
+          <p:cNvPr id="8" name="CuadroTexto 7">
+            <a:extLst>
+              <a:ext uri="{FF2B5EF4-FFF2-40B4-BE49-F238E27FC236}">
+                <a16:creationId xmlns:a16="http://schemas.microsoft.com/office/drawing/2014/main" id="{711964B0-E636-4DFD-987D-0C1F0B6E9A23}"/>
+              </a:ext>
+            </a:extLst>
+          </p:cNvPr>
+          <p:cNvSpPr txBox="1"/>
+          <p:nvPr/>
+        </p:nvSpPr>
+        <p:spPr>
+          <a:xfrm>
+            <a:off x="1934817" y="4539335"/>
+            <a:ext cx="7248938" cy="369332"/>
+          </a:xfrm>
+          <a:prstGeom prst="rect">
+            <a:avLst/>
+          </a:prstGeom>
+          <a:noFill/>
+        </p:spPr>
+        <p:txBody>
+          <a:bodyPr wrap="square">
+            <a:spAutoFit/>
+          </a:bodyPr>
+          <a:lstStyle/>
+          <a:p>
+            <a:r>
+              <a:rPr lang="es-MX" b="1" dirty="0">
+                <a:solidFill>
+                  <a:srgbClr val="000000"/>
+                </a:solidFill>
+                <a:latin typeface="Arial" panose="020B0604020202020204" pitchFamily="34" charset="0"/>
+                <a:ea typeface="Times New Roman" panose="02020603050405020304" pitchFamily="18" charset="0"/>
+                <a:cs typeface="Arial" panose="020B0604020202020204" pitchFamily="34" charset="0"/>
+              </a:rPr>
+              <a:t>Organigrama </a:t>
+            </a:r>
+            <a:r>
+              <a:rPr lang="es-MX" sz="1800" b="1" dirty="0">
+                <a:solidFill>
+                  <a:srgbClr val="000000"/>
+                </a:solidFill>
+                <a:effectLst/>
+                <a:latin typeface="Arial" panose="020B0604020202020204" pitchFamily="34" charset="0"/>
+                <a:ea typeface="Times New Roman" panose="02020603050405020304" pitchFamily="18" charset="0"/>
+                <a:cs typeface="Arial" panose="020B0604020202020204" pitchFamily="34" charset="0"/>
+              </a:rPr>
+              <a:t>de la Empresa </a:t>
+            </a:r>
+          </a:p>
+        </p:txBody>
+      </p:sp>
+      <p:pic>
+        <p:nvPicPr>
+          <p:cNvPr id="10" name="Imagen 9">
+            <a:extLst>
+              <a:ext uri="{FF2B5EF4-FFF2-40B4-BE49-F238E27FC236}">
+                <a16:creationId xmlns:a16="http://schemas.microsoft.com/office/drawing/2014/main" id="{7A21AA2F-6EE3-4245-A7CC-A0185A01C086}"/>
+              </a:ext>
+            </a:extLst>
+          </p:cNvPr>
+          <p:cNvPicPr>
+            <a:picLocks noChangeAspect="1"/>
+          </p:cNvPicPr>
+          <p:nvPr/>
+        </p:nvPicPr>
+        <p:blipFill>
+          <a:blip r:embed="rId2">
+            <a:extLst>
+              <a:ext uri="{28A0092B-C50C-407E-A947-70E740481C1C}">
+                <a14:useLocalDpi xmlns:a14="http://schemas.microsoft.com/office/drawing/2010/main" val="0"/>
+              </a:ext>
+            </a:extLst>
+          </a:blip>
+          <a:stretch>
+            <a:fillRect/>
+          </a:stretch>
+        </p:blipFill>
+        <p:spPr>
+          <a:xfrm>
+            <a:off x="7868772" y="504634"/>
+            <a:ext cx="3249803" cy="727125"/>
+          </a:xfrm>
+          <a:prstGeom prst="rect">
+            <a:avLst/>
+          </a:prstGeom>
+        </p:spPr>
+      </p:pic>
     </p:spTree>
     <p:extLst>
       <p:ext uri="{BB962C8B-B14F-4D97-AF65-F5344CB8AC3E}">
-        <p14:creationId xmlns:p14="http://schemas.microsoft.com/office/powerpoint/2010/main" val="4136787870"/>
+        <p14:creationId xmlns:p14="http://schemas.microsoft.com/office/powerpoint/2010/main" val="450291241"/>
       </p:ext>
     </p:extLst>
   </p:cSld>
   <p:clrMapOvr>
     <a:masterClrMapping/>
   </p:clrMapOvr>
+  <mc:AlternateContent xmlns:mc="http://schemas.openxmlformats.org/markup-compatibility/2006">
+    <mc:Choice xmlns:p14="http://schemas.microsoft.com/office/powerpoint/2010/main" Requires="p14">
+      <p:transition spd="slow" p14:dur="1500">
+        <p:random/>
+      </p:transition>
+    </mc:Choice>
+    <mc:Fallback>
+      <p:transition spd="slow">
+        <p:random/>
+      </p:transition>
+    </mc:Fallback>
+  </mc:AlternateContent>
 </p:sld>
 </file>
 
@@ -6651,10 +7254,10 @@
       </p:grpSpPr>
       <p:sp>
         <p:nvSpPr>
-          <p:cNvPr id="3" name="CuadroTexto 2">
+          <p:cNvPr id="2" name="CuadroTexto 1">
             <a:extLst>
               <a:ext uri="{FF2B5EF4-FFF2-40B4-BE49-F238E27FC236}">
-                <a16:creationId xmlns:a16="http://schemas.microsoft.com/office/drawing/2014/main" id="{0F3ED5B2-A25D-4BFD-A271-312EA039A95A}"/>
+                <a16:creationId xmlns:a16="http://schemas.microsoft.com/office/drawing/2014/main" id="{B9CCC957-85A3-4C91-B5E8-93D0A40574CC}"/>
               </a:ext>
             </a:extLst>
           </p:cNvPr>
@@ -6663,8 +7266,8 @@
         </p:nvSpPr>
         <p:spPr>
           <a:xfrm>
-            <a:off x="1934817" y="338581"/>
-            <a:ext cx="7659757" cy="369332"/>
+            <a:off x="4253948" y="463826"/>
+            <a:ext cx="3602268" cy="400110"/>
           </a:xfrm>
           <a:prstGeom prst="rect">
             <a:avLst/>
@@ -6672,37 +7275,27 @@
           <a:noFill/>
         </p:spPr>
         <p:txBody>
-          <a:bodyPr wrap="square">
+          <a:bodyPr wrap="none" rtlCol="0">
             <a:spAutoFit/>
           </a:bodyPr>
           <a:lstStyle/>
           <a:p>
-            <a:pPr algn="ctr"/>
-            <a:r>
-              <a:rPr lang="es-MX" b="1" dirty="0">
-                <a:solidFill>
-                  <a:srgbClr val="000000"/>
-                </a:solidFill>
-                <a:effectLst/>
+            <a:r>
+              <a:rPr lang="es-MX" sz="2000" b="1" dirty="0">
                 <a:latin typeface="Arial" panose="020B0604020202020204" pitchFamily="34" charset="0"/>
-                <a:ea typeface="Times New Roman" panose="02020603050405020304" pitchFamily="18" charset="0"/>
                 <a:cs typeface="Arial" panose="020B0604020202020204" pitchFamily="34" charset="0"/>
               </a:rPr>
-              <a:t>GENERALIDADES DE LA EMPRESA</a:t>
-            </a:r>
-            <a:endParaRPr lang="es-MX" dirty="0">
-              <a:latin typeface="Arial" panose="020B0604020202020204" pitchFamily="34" charset="0"/>
-              <a:cs typeface="Arial" panose="020B0604020202020204" pitchFamily="34" charset="0"/>
-            </a:endParaRPr>
-          </a:p>
-        </p:txBody>
-      </p:sp>
-      <p:sp>
-        <p:nvSpPr>
-          <p:cNvPr id="5" name="CuadroTexto 4">
+              <a:t>Planteamiento del problema</a:t>
+            </a:r>
+          </a:p>
+        </p:txBody>
+      </p:sp>
+      <p:sp>
+        <p:nvSpPr>
+          <p:cNvPr id="4" name="CuadroTexto 3">
             <a:extLst>
               <a:ext uri="{FF2B5EF4-FFF2-40B4-BE49-F238E27FC236}">
-                <a16:creationId xmlns:a16="http://schemas.microsoft.com/office/drawing/2014/main" id="{9DE9D428-5878-42BE-B3EB-CD1E4597A910}"/>
+                <a16:creationId xmlns:a16="http://schemas.microsoft.com/office/drawing/2014/main" id="{82D9D875-0989-4EC0-A940-D98CDADBE87C}"/>
               </a:ext>
             </a:extLst>
           </p:cNvPr>
@@ -6711,8 +7304,8 @@
         </p:nvSpPr>
         <p:spPr>
           <a:xfrm>
-            <a:off x="1934818" y="941770"/>
-            <a:ext cx="7659756" cy="615553"/>
+            <a:off x="1318591" y="1211999"/>
+            <a:ext cx="8792818" cy="3642023"/>
           </a:xfrm>
           <a:prstGeom prst="rect">
             <a:avLst/>
@@ -6725,256 +7318,235 @@
           </a:bodyPr>
           <a:lstStyle/>
           <a:p>
-            <a:r>
-              <a:rPr lang="es-MX" sz="1800" b="1" dirty="0">
+            <a:pPr marL="285750" indent="-285750">
+              <a:lnSpc>
+                <a:spcPct val="250000"/>
+              </a:lnSpc>
+              <a:buFont typeface="Arial" panose="020B0604020202020204" pitchFamily="34" charset="0"/>
+              <a:buChar char="•"/>
+            </a:pPr>
+            <a:r>
+              <a:rPr lang="es-MX" b="0" i="0" dirty="0">
                 <a:solidFill>
-                  <a:srgbClr val="000000"/>
+                  <a:srgbClr val="1D1C1D"/>
                 </a:solidFill>
                 <a:effectLst/>
                 <a:latin typeface="Arial" panose="020B0604020202020204" pitchFamily="34" charset="0"/>
-                <a:ea typeface="Times New Roman" panose="02020603050405020304" pitchFamily="18" charset="0"/>
                 <a:cs typeface="Arial" panose="020B0604020202020204" pitchFamily="34" charset="0"/>
               </a:rPr>
-              <a:t>Nombre de la </a:t>
-            </a:r>
-            <a:r>
-              <a:rPr lang="es-MX" b="1" dirty="0">
+              <a:t>Registro de la ventas por empleado</a:t>
+            </a:r>
+          </a:p>
+          <a:p>
+            <a:pPr marL="285750" indent="-285750">
+              <a:lnSpc>
+                <a:spcPct val="150000"/>
+              </a:lnSpc>
+              <a:buFont typeface="Arial" panose="020B0604020202020204" pitchFamily="34" charset="0"/>
+              <a:buChar char="•"/>
+            </a:pPr>
+            <a:r>
+              <a:rPr lang="es-MX" b="0" i="0" dirty="0">
                 <a:solidFill>
-                  <a:srgbClr val="000000"/>
-                </a:solidFill>
-                <a:latin typeface="Arial" panose="020B0604020202020204" pitchFamily="34" charset="0"/>
-                <a:ea typeface="Times New Roman" panose="02020603050405020304" pitchFamily="18" charset="0"/>
-                <a:cs typeface="Arial" panose="020B0604020202020204" pitchFamily="34" charset="0"/>
-              </a:rPr>
-              <a:t>E</a:t>
-            </a:r>
-            <a:r>
-              <a:rPr lang="es-MX" sz="1800" b="1" dirty="0">
-                <a:solidFill>
-                  <a:srgbClr val="000000"/>
+                  <a:srgbClr val="1D1C1D"/>
                 </a:solidFill>
                 <a:effectLst/>
                 <a:latin typeface="Arial" panose="020B0604020202020204" pitchFamily="34" charset="0"/>
-                <a:ea typeface="Times New Roman" panose="02020603050405020304" pitchFamily="18" charset="0"/>
                 <a:cs typeface="Arial" panose="020B0604020202020204" pitchFamily="34" charset="0"/>
               </a:rPr>
-              <a:t>mpresa</a:t>
-            </a:r>
-          </a:p>
-          <a:p>
-            <a:r>
-              <a:rPr lang="es-MX" sz="1600" dirty="0">
+              <a:t>Registro manual de clientes deudores</a:t>
+            </a:r>
+          </a:p>
+          <a:p>
+            <a:pPr marL="285750" indent="-285750">
+              <a:lnSpc>
+                <a:spcPct val="150000"/>
+              </a:lnSpc>
+              <a:buFont typeface="Arial" panose="020B0604020202020204" pitchFamily="34" charset="0"/>
+              <a:buChar char="•"/>
+            </a:pPr>
+            <a:r>
+              <a:rPr lang="es-MX" b="0" i="0" dirty="0">
+                <a:solidFill>
+                  <a:srgbClr val="1D1C1D"/>
+                </a:solidFill>
+                <a:effectLst/>
                 <a:latin typeface="Arial" panose="020B0604020202020204" pitchFamily="34" charset="0"/>
                 <a:cs typeface="Arial" panose="020B0604020202020204" pitchFamily="34" charset="0"/>
               </a:rPr>
-              <a:t>Farmacias Gi S.A. de C.V. </a:t>
-            </a:r>
-          </a:p>
-        </p:txBody>
-      </p:sp>
-      <p:sp>
-        <p:nvSpPr>
-          <p:cNvPr id="7" name="CuadroTexto 6">
+              <a:t>Productos agotados</a:t>
+            </a:r>
+            <a:endParaRPr lang="es-MX" dirty="0">
+              <a:latin typeface="Arial" panose="020B0604020202020204" pitchFamily="34" charset="0"/>
+              <a:cs typeface="Arial" panose="020B0604020202020204" pitchFamily="34" charset="0"/>
+            </a:endParaRPr>
+          </a:p>
+          <a:p>
+            <a:pPr marL="285750" indent="-285750">
+              <a:lnSpc>
+                <a:spcPct val="150000"/>
+              </a:lnSpc>
+              <a:buFont typeface="Arial" panose="020B0604020202020204" pitchFamily="34" charset="0"/>
+              <a:buChar char="•"/>
+            </a:pPr>
+            <a:r>
+              <a:rPr lang="es-MX" b="0" i="0" dirty="0">
+                <a:solidFill>
+                  <a:srgbClr val="1D1C1D"/>
+                </a:solidFill>
+                <a:effectLst/>
+                <a:latin typeface="Arial" panose="020B0604020202020204" pitchFamily="34" charset="0"/>
+                <a:cs typeface="Arial" panose="020B0604020202020204" pitchFamily="34" charset="0"/>
+              </a:rPr>
+              <a:t>Productos caducados</a:t>
+            </a:r>
+            <a:endParaRPr lang="es-MX" dirty="0">
+              <a:latin typeface="Arial" panose="020B0604020202020204" pitchFamily="34" charset="0"/>
+              <a:cs typeface="Arial" panose="020B0604020202020204" pitchFamily="34" charset="0"/>
+            </a:endParaRPr>
+          </a:p>
+          <a:p>
+            <a:pPr marL="285750" indent="-285750">
+              <a:lnSpc>
+                <a:spcPct val="150000"/>
+              </a:lnSpc>
+              <a:buFont typeface="Arial" panose="020B0604020202020204" pitchFamily="34" charset="0"/>
+              <a:buChar char="•"/>
+            </a:pPr>
+            <a:r>
+              <a:rPr lang="es-MX" b="0" i="0" dirty="0">
+                <a:solidFill>
+                  <a:srgbClr val="1D1C1D"/>
+                </a:solidFill>
+                <a:effectLst/>
+                <a:latin typeface="Arial" panose="020B0604020202020204" pitchFamily="34" charset="0"/>
+                <a:cs typeface="Arial" panose="020B0604020202020204" pitchFamily="34" charset="0"/>
+              </a:rPr>
+              <a:t>Registro manual de las compras</a:t>
+            </a:r>
+            <a:endParaRPr lang="es-MX" dirty="0">
+              <a:latin typeface="Arial" panose="020B0604020202020204" pitchFamily="34" charset="0"/>
+              <a:cs typeface="Arial" panose="020B0604020202020204" pitchFamily="34" charset="0"/>
+            </a:endParaRPr>
+          </a:p>
+          <a:p>
+            <a:pPr marL="285750" indent="-285750">
+              <a:lnSpc>
+                <a:spcPct val="150000"/>
+              </a:lnSpc>
+              <a:buFont typeface="Arial" panose="020B0604020202020204" pitchFamily="34" charset="0"/>
+              <a:buChar char="•"/>
+            </a:pPr>
+            <a:r>
+              <a:rPr lang="es-MX" b="0" i="0" dirty="0">
+                <a:solidFill>
+                  <a:srgbClr val="1D1C1D"/>
+                </a:solidFill>
+                <a:effectLst/>
+                <a:latin typeface="Arial" panose="020B0604020202020204" pitchFamily="34" charset="0"/>
+                <a:cs typeface="Arial" panose="020B0604020202020204" pitchFamily="34" charset="0"/>
+              </a:rPr>
+              <a:t>No existe calculo del margen de ganancias</a:t>
+            </a:r>
+            <a:endParaRPr lang="es-MX" dirty="0">
+              <a:latin typeface="Arial" panose="020B0604020202020204" pitchFamily="34" charset="0"/>
+              <a:cs typeface="Arial" panose="020B0604020202020204" pitchFamily="34" charset="0"/>
+            </a:endParaRPr>
+          </a:p>
+          <a:p>
+            <a:pPr marL="285750" indent="-285750">
+              <a:lnSpc>
+                <a:spcPct val="150000"/>
+              </a:lnSpc>
+              <a:buFont typeface="Arial" panose="020B0604020202020204" pitchFamily="34" charset="0"/>
+              <a:buChar char="•"/>
+            </a:pPr>
+            <a:r>
+              <a:rPr lang="es-MX" b="0" i="0" dirty="0">
+                <a:solidFill>
+                  <a:srgbClr val="1D1C1D"/>
+                </a:solidFill>
+                <a:effectLst/>
+                <a:latin typeface="Arial" panose="020B0604020202020204" pitchFamily="34" charset="0"/>
+                <a:cs typeface="Arial" panose="020B0604020202020204" pitchFamily="34" charset="0"/>
+              </a:rPr>
+              <a:t>No existe las compras a distancia para las personas que</a:t>
+            </a:r>
+            <a:br>
+              <a:rPr lang="es-MX" dirty="0">
+                <a:latin typeface="Arial" panose="020B0604020202020204" pitchFamily="34" charset="0"/>
+                <a:cs typeface="Arial" panose="020B0604020202020204" pitchFamily="34" charset="0"/>
+              </a:rPr>
+            </a:br>
+            <a:r>
+              <a:rPr lang="es-MX" b="0" i="0" dirty="0">
+                <a:solidFill>
+                  <a:srgbClr val="1D1C1D"/>
+                </a:solidFill>
+                <a:effectLst/>
+                <a:latin typeface="Arial" panose="020B0604020202020204" pitchFamily="34" charset="0"/>
+                <a:cs typeface="Arial" panose="020B0604020202020204" pitchFamily="34" charset="0"/>
+              </a:rPr>
+              <a:t>no pueden comprar en la tienda de manera física</a:t>
+            </a:r>
+            <a:endParaRPr lang="es-MX" dirty="0">
+              <a:latin typeface="Arial" panose="020B0604020202020204" pitchFamily="34" charset="0"/>
+              <a:cs typeface="Arial" panose="020B0604020202020204" pitchFamily="34" charset="0"/>
+            </a:endParaRPr>
+          </a:p>
+        </p:txBody>
+      </p:sp>
+      <p:pic>
+        <p:nvPicPr>
+          <p:cNvPr id="7" name="Imagen 6">
             <a:extLst>
               <a:ext uri="{FF2B5EF4-FFF2-40B4-BE49-F238E27FC236}">
-                <a16:creationId xmlns:a16="http://schemas.microsoft.com/office/drawing/2014/main" id="{EBC8294F-964E-461B-9976-B056B5955A30}"/>
+                <a16:creationId xmlns:a16="http://schemas.microsoft.com/office/drawing/2014/main" id="{D2749865-594C-4543-BF0F-67F6D1600D72}"/>
               </a:ext>
             </a:extLst>
           </p:cNvPr>
-          <p:cNvSpPr txBox="1"/>
+          <p:cNvPicPr>
+            <a:picLocks noChangeAspect="1"/>
+          </p:cNvPicPr>
           <p:nvPr/>
-        </p:nvSpPr>
+        </p:nvPicPr>
+        <p:blipFill rotWithShape="1">
+          <a:blip r:embed="rId2"/>
+          <a:srcRect l="16522" t="31899" r="43912" b="22250"/>
+          <a:stretch/>
+        </p:blipFill>
         <p:spPr>
           <a:xfrm>
-            <a:off x="1934817" y="1719183"/>
-            <a:ext cx="7248939" cy="369332"/>
+            <a:off x="7315199" y="1009710"/>
+            <a:ext cx="4280453" cy="2643626"/>
           </a:xfrm>
           <a:prstGeom prst="rect">
             <a:avLst/>
           </a:prstGeom>
-          <a:noFill/>
-        </p:spPr>
-        <p:txBody>
-          <a:bodyPr wrap="square">
-            <a:spAutoFit/>
-          </a:bodyPr>
-          <a:lstStyle/>
-          <a:p>
-            <a:r>
-              <a:rPr lang="es-MX" sz="1800" b="1" dirty="0">
-                <a:solidFill>
-                  <a:srgbClr val="000000"/>
-                </a:solidFill>
-                <a:effectLst/>
-                <a:latin typeface="Arial" panose="020B0604020202020204" pitchFamily="34" charset="0"/>
-                <a:ea typeface="Times New Roman" panose="02020603050405020304" pitchFamily="18" charset="0"/>
-                <a:cs typeface="Arial" panose="020B0604020202020204" pitchFamily="34" charset="0"/>
-              </a:rPr>
-              <a:t>Giro de la Empresa</a:t>
-            </a:r>
-          </a:p>
-        </p:txBody>
-      </p:sp>
-      <p:sp>
-        <p:nvSpPr>
-          <p:cNvPr id="9" name="CuadroTexto 8">
-            <a:extLst>
-              <a:ext uri="{FF2B5EF4-FFF2-40B4-BE49-F238E27FC236}">
-                <a16:creationId xmlns:a16="http://schemas.microsoft.com/office/drawing/2014/main" id="{912287C4-D12D-4FC3-B107-1EAB09A116BA}"/>
-              </a:ext>
-            </a:extLst>
-          </p:cNvPr>
-          <p:cNvSpPr txBox="1"/>
-          <p:nvPr/>
-        </p:nvSpPr>
-        <p:spPr>
-          <a:xfrm>
-            <a:off x="1934817" y="2661482"/>
-            <a:ext cx="7248938" cy="615553"/>
-          </a:xfrm>
-          <a:prstGeom prst="rect">
-            <a:avLst/>
-          </a:prstGeom>
-          <a:noFill/>
-        </p:spPr>
-        <p:txBody>
-          <a:bodyPr wrap="square">
-            <a:spAutoFit/>
-          </a:bodyPr>
-          <a:lstStyle/>
-          <a:p>
-            <a:r>
-              <a:rPr lang="es-MX" sz="1800" b="1" dirty="0">
-                <a:solidFill>
-                  <a:srgbClr val="000000"/>
-                </a:solidFill>
-                <a:effectLst/>
-                <a:latin typeface="Arial" panose="020B0604020202020204" pitchFamily="34" charset="0"/>
-                <a:ea typeface="Times New Roman" panose="02020603050405020304" pitchFamily="18" charset="0"/>
-                <a:cs typeface="Arial" panose="020B0604020202020204" pitchFamily="34" charset="0"/>
-              </a:rPr>
-              <a:t>Dirección (Croquis de ubicación)</a:t>
-            </a:r>
-          </a:p>
-          <a:p>
-            <a:pPr algn="just"/>
-            <a:r>
-              <a:rPr lang="es-MX" sz="1600" dirty="0">
-                <a:latin typeface="Arial" panose="020B0604020202020204" pitchFamily="34" charset="0"/>
-                <a:cs typeface="Arial" panose="020B0604020202020204" pitchFamily="34" charset="0"/>
-              </a:rPr>
-              <a:t>Nicolas Bravo No. 103, Barrio Expiración, Zimatlán de Álvarez, Oaxaca.</a:t>
-            </a:r>
-          </a:p>
-        </p:txBody>
-      </p:sp>
-      <p:sp>
-        <p:nvSpPr>
-          <p:cNvPr id="13" name="CuadroTexto 12">
-            <a:extLst>
-              <a:ext uri="{FF2B5EF4-FFF2-40B4-BE49-F238E27FC236}">
-                <a16:creationId xmlns:a16="http://schemas.microsoft.com/office/drawing/2014/main" id="{5FAE1C08-A515-4FD3-A50D-5B1B028D761E}"/>
-              </a:ext>
-            </a:extLst>
-          </p:cNvPr>
-          <p:cNvSpPr txBox="1"/>
-          <p:nvPr/>
-        </p:nvSpPr>
-        <p:spPr>
-          <a:xfrm>
-            <a:off x="1934817" y="3743309"/>
-            <a:ext cx="7248938" cy="369332"/>
-          </a:xfrm>
-          <a:prstGeom prst="rect">
-            <a:avLst/>
-          </a:prstGeom>
-          <a:noFill/>
-        </p:spPr>
-        <p:txBody>
-          <a:bodyPr wrap="square">
-            <a:spAutoFit/>
-          </a:bodyPr>
-          <a:lstStyle/>
-          <a:p>
-            <a:r>
-              <a:rPr lang="es-MX" sz="1800" b="1" dirty="0">
-                <a:solidFill>
-                  <a:srgbClr val="000000"/>
-                </a:solidFill>
-                <a:effectLst/>
-                <a:latin typeface="Arial" panose="020B0604020202020204" pitchFamily="34" charset="0"/>
-                <a:ea typeface="Times New Roman" panose="02020603050405020304" pitchFamily="18" charset="0"/>
-                <a:cs typeface="Arial" panose="020B0604020202020204" pitchFamily="34" charset="0"/>
-              </a:rPr>
-              <a:t>Breve descripción de los procesos de la Empresa </a:t>
-            </a:r>
-          </a:p>
-        </p:txBody>
-      </p:sp>
-      <p:sp>
-        <p:nvSpPr>
-          <p:cNvPr id="8" name="CuadroTexto 7">
-            <a:extLst>
-              <a:ext uri="{FF2B5EF4-FFF2-40B4-BE49-F238E27FC236}">
-                <a16:creationId xmlns:a16="http://schemas.microsoft.com/office/drawing/2014/main" id="{711964B0-E636-4DFD-987D-0C1F0B6E9A23}"/>
-              </a:ext>
-            </a:extLst>
-          </p:cNvPr>
-          <p:cNvSpPr txBox="1"/>
-          <p:nvPr/>
-        </p:nvSpPr>
-        <p:spPr>
-          <a:xfrm>
-            <a:off x="1934817" y="4578915"/>
-            <a:ext cx="7248938" cy="369332"/>
-          </a:xfrm>
-          <a:prstGeom prst="rect">
-            <a:avLst/>
-          </a:prstGeom>
-          <a:noFill/>
-        </p:spPr>
-        <p:txBody>
-          <a:bodyPr wrap="square">
-            <a:spAutoFit/>
-          </a:bodyPr>
-          <a:lstStyle/>
-          <a:p>
-            <a:r>
-              <a:rPr lang="es-MX" b="1" dirty="0">
-                <a:solidFill>
-                  <a:srgbClr val="000000"/>
-                </a:solidFill>
-                <a:latin typeface="Arial" panose="020B0604020202020204" pitchFamily="34" charset="0"/>
-                <a:ea typeface="Times New Roman" panose="02020603050405020304" pitchFamily="18" charset="0"/>
-                <a:cs typeface="Arial" panose="020B0604020202020204" pitchFamily="34" charset="0"/>
-              </a:rPr>
-              <a:t>Organigrama </a:t>
-            </a:r>
-            <a:r>
-              <a:rPr lang="es-MX" sz="1800" b="1" dirty="0">
-                <a:solidFill>
-                  <a:srgbClr val="000000"/>
-                </a:solidFill>
-                <a:effectLst/>
-                <a:latin typeface="Arial" panose="020B0604020202020204" pitchFamily="34" charset="0"/>
-                <a:ea typeface="Times New Roman" panose="02020603050405020304" pitchFamily="18" charset="0"/>
-                <a:cs typeface="Arial" panose="020B0604020202020204" pitchFamily="34" charset="0"/>
-              </a:rPr>
-              <a:t>de la Empresa </a:t>
-            </a:r>
-          </a:p>
-        </p:txBody>
-      </p:sp>
+        </p:spPr>
+      </p:pic>
     </p:spTree>
     <p:extLst>
       <p:ext uri="{BB962C8B-B14F-4D97-AF65-F5344CB8AC3E}">
-        <p14:creationId xmlns:p14="http://schemas.microsoft.com/office/powerpoint/2010/main" val="450291241"/>
+        <p14:creationId xmlns:p14="http://schemas.microsoft.com/office/powerpoint/2010/main" val="2937598698"/>
       </p:ext>
     </p:extLst>
   </p:cSld>
   <p:clrMapOvr>
     <a:masterClrMapping/>
   </p:clrMapOvr>
+  <mc:AlternateContent xmlns:mc="http://schemas.openxmlformats.org/markup-compatibility/2006">
+    <mc:Choice xmlns:p14="http://schemas.microsoft.com/office/powerpoint/2010/main" Requires="p14">
+      <p:transition spd="slow" p14:dur="1500">
+        <p:random/>
+      </p:transition>
+    </mc:Choice>
+    <mc:Fallback>
+      <p:transition spd="slow">
+        <p:random/>
+      </p:transition>
+    </mc:Fallback>
+  </mc:AlternateContent>
 </p:sld>
 </file>
 
@@ -6997,10 +7569,10 @@
       </p:grpSpPr>
       <p:sp>
         <p:nvSpPr>
-          <p:cNvPr id="2" name="CuadroTexto 1">
+          <p:cNvPr id="4" name="CuadroTexto 3">
             <a:extLst>
               <a:ext uri="{FF2B5EF4-FFF2-40B4-BE49-F238E27FC236}">
-                <a16:creationId xmlns:a16="http://schemas.microsoft.com/office/drawing/2014/main" id="{B9CCC957-85A3-4C91-B5E8-93D0A40574CC}"/>
+                <a16:creationId xmlns:a16="http://schemas.microsoft.com/office/drawing/2014/main" id="{63D03C20-A84A-44EF-9844-9DFA685C535F}"/>
               </a:ext>
             </a:extLst>
           </p:cNvPr>
@@ -7009,8 +7581,8 @@
         </p:nvSpPr>
         <p:spPr>
           <a:xfrm>
-            <a:off x="4253948" y="463826"/>
-            <a:ext cx="3602268" cy="400110"/>
+            <a:off x="742950" y="969896"/>
+            <a:ext cx="5989155" cy="2580194"/>
           </a:xfrm>
           <a:prstGeom prst="rect">
             <a:avLst/>
@@ -7018,27 +7590,172 @@
           <a:noFill/>
         </p:spPr>
         <p:txBody>
-          <a:bodyPr wrap="none" rtlCol="0">
+          <a:bodyPr wrap="square">
             <a:spAutoFit/>
           </a:bodyPr>
           <a:lstStyle/>
           <a:p>
-            <a:r>
-              <a:rPr lang="es-MX" sz="2000" b="1" dirty="0">
+            <a:pPr algn="ctr">
+              <a:spcBef>
+                <a:spcPts val="1800"/>
+              </a:spcBef>
+              <a:spcAft>
+                <a:spcPts val="400"/>
+              </a:spcAft>
+            </a:pPr>
+            <a:r>
+              <a:rPr lang="es-MX" sz="2400" b="1" dirty="0">
+                <a:solidFill>
+                  <a:srgbClr val="000000"/>
+                </a:solidFill>
+                <a:effectLst/>
                 <a:latin typeface="Arial" panose="020B0604020202020204" pitchFamily="34" charset="0"/>
+                <a:ea typeface="Times New Roman" panose="02020603050405020304" pitchFamily="18" charset="0"/>
                 <a:cs typeface="Arial" panose="020B0604020202020204" pitchFamily="34" charset="0"/>
               </a:rPr>
-              <a:t>Planteamiento del problema</a:t>
-            </a:r>
-          </a:p>
-        </p:txBody>
-      </p:sp>
-      <p:sp>
-        <p:nvSpPr>
-          <p:cNvPr id="4" name="CuadroTexto 3">
+              <a:t>	</a:t>
+            </a:r>
+            <a:endParaRPr lang="es-MX" sz="2400" dirty="0">
+              <a:effectLst/>
+              <a:latin typeface="Arial" panose="020B0604020202020204" pitchFamily="34" charset="0"/>
+              <a:ea typeface="Calibri" panose="020F0502020204030204" pitchFamily="34" charset="0"/>
+              <a:cs typeface="Arial" panose="020B0604020202020204" pitchFamily="34" charset="0"/>
+            </a:endParaRPr>
+          </a:p>
+          <a:p>
+            <a:pPr>
+              <a:lnSpc>
+                <a:spcPct val="150000"/>
+              </a:lnSpc>
+              <a:spcBef>
+                <a:spcPts val="1400"/>
+              </a:spcBef>
+              <a:spcAft>
+                <a:spcPts val="400"/>
+              </a:spcAft>
+            </a:pPr>
+            <a:r>
+              <a:rPr lang="es-MX" sz="2000" b="1" dirty="0">
+                <a:solidFill>
+                  <a:srgbClr val="000000"/>
+                </a:solidFill>
+                <a:effectLst/>
+                <a:latin typeface="Arial" panose="020B0604020202020204" pitchFamily="34" charset="0"/>
+                <a:ea typeface="Times New Roman" panose="02020603050405020304" pitchFamily="18" charset="0"/>
+                <a:cs typeface="Arial" panose="020B0604020202020204" pitchFamily="34" charset="0"/>
+              </a:rPr>
+              <a:t>Objetivo general	</a:t>
+            </a:r>
+            <a:endParaRPr lang="es-MX" sz="2000" b="1" dirty="0">
+              <a:solidFill>
+                <a:srgbClr val="000000"/>
+              </a:solidFill>
+              <a:latin typeface="Arial" panose="020B0604020202020204" pitchFamily="34" charset="0"/>
+              <a:ea typeface="Times New Roman" panose="02020603050405020304" pitchFamily="18" charset="0"/>
+              <a:cs typeface="Arial" panose="020B0604020202020204" pitchFamily="34" charset="0"/>
+            </a:endParaRPr>
+          </a:p>
+          <a:p>
+            <a:pPr algn="just">
+              <a:lnSpc>
+                <a:spcPct val="150000"/>
+              </a:lnSpc>
+              <a:spcBef>
+                <a:spcPts val="1400"/>
+              </a:spcBef>
+              <a:spcAft>
+                <a:spcPts val="400"/>
+              </a:spcAft>
+            </a:pPr>
+            <a:r>
+              <a:rPr lang="es-MX" dirty="0">
+                <a:effectLst/>
+                <a:latin typeface="Arial" panose="020B0604020202020204" pitchFamily="34" charset="0"/>
+                <a:ea typeface="Times New Roman" panose="02020603050405020304" pitchFamily="18" charset="0"/>
+                <a:cs typeface="Arial" panose="020B0604020202020204" pitchFamily="34" charset="0"/>
+              </a:rPr>
+              <a:t>Desarrollar un sistema de punto de venta y e-</a:t>
+            </a:r>
+            <a:r>
+              <a:rPr lang="es-MX" dirty="0" err="1">
+                <a:effectLst/>
+                <a:latin typeface="Arial" panose="020B0604020202020204" pitchFamily="34" charset="0"/>
+                <a:ea typeface="Times New Roman" panose="02020603050405020304" pitchFamily="18" charset="0"/>
+                <a:cs typeface="Arial" panose="020B0604020202020204" pitchFamily="34" charset="0"/>
+              </a:rPr>
+              <a:t>commerce</a:t>
+            </a:r>
+            <a:r>
+              <a:rPr lang="es-MX" dirty="0">
+                <a:effectLst/>
+                <a:latin typeface="Arial" panose="020B0604020202020204" pitchFamily="34" charset="0"/>
+                <a:ea typeface="Times New Roman" panose="02020603050405020304" pitchFamily="18" charset="0"/>
+                <a:cs typeface="Arial" panose="020B0604020202020204" pitchFamily="34" charset="0"/>
+              </a:rPr>
+              <a:t> para las sucursales de Farmacias Gi S.A. de C.V, en Zimatlán de Álvarez, Oaxaca.</a:t>
+            </a:r>
+            <a:endParaRPr lang="es-MX" dirty="0">
+              <a:effectLst/>
+              <a:latin typeface="Arial" panose="020B0604020202020204" pitchFamily="34" charset="0"/>
+              <a:ea typeface="Calibri" panose="020F0502020204030204" pitchFamily="34" charset="0"/>
+              <a:cs typeface="Arial" panose="020B0604020202020204" pitchFamily="34" charset="0"/>
+            </a:endParaRPr>
+          </a:p>
+        </p:txBody>
+      </p:sp>
+      <p:pic>
+        <p:nvPicPr>
+          <p:cNvPr id="1026" name="Picture 2" descr="Definir objetivos | Los 4 mejores métodos para alcanzar tus metas!">
             <a:extLst>
               <a:ext uri="{FF2B5EF4-FFF2-40B4-BE49-F238E27FC236}">
-                <a16:creationId xmlns:a16="http://schemas.microsoft.com/office/drawing/2014/main" id="{82D9D875-0989-4EC0-A940-D98CDADBE87C}"/>
+                <a16:creationId xmlns:a16="http://schemas.microsoft.com/office/drawing/2014/main" id="{01B2AE57-85B8-4315-97C7-28C8FEAFC3F1}"/>
+              </a:ext>
+            </a:extLst>
+          </p:cNvPr>
+          <p:cNvPicPr>
+            <a:picLocks noChangeAspect="1" noChangeArrowheads="1"/>
+          </p:cNvPicPr>
+          <p:nvPr/>
+        </p:nvPicPr>
+        <p:blipFill>
+          <a:blip r:embed="rId2">
+            <a:extLst>
+              <a:ext uri="{28A0092B-C50C-407E-A947-70E740481C1C}">
+                <a14:useLocalDpi xmlns:a14="http://schemas.microsoft.com/office/drawing/2010/main" val="0"/>
+              </a:ext>
+            </a:extLst>
+          </a:blip>
+          <a:srcRect/>
+          <a:stretch>
+            <a:fillRect/>
+          </a:stretch>
+        </p:blipFill>
+        <p:spPr bwMode="auto">
+          <a:xfrm>
+            <a:off x="7381459" y="1675988"/>
+            <a:ext cx="3869635" cy="2312711"/>
+          </a:xfrm>
+          <a:prstGeom prst="rect">
+            <a:avLst/>
+          </a:prstGeom>
+          <a:noFill/>
+          <a:extLst>
+            <a:ext uri="{909E8E84-426E-40DD-AFC4-6F175D3DCCD1}">
+              <a14:hiddenFill xmlns:a14="http://schemas.microsoft.com/office/drawing/2010/main">
+                <a:solidFill>
+                  <a:srgbClr val="FFFFFF"/>
+                </a:solidFill>
+              </a14:hiddenFill>
+            </a:ext>
+          </a:extLst>
+        </p:spPr>
+      </p:pic>
+      <p:sp>
+        <p:nvSpPr>
+          <p:cNvPr id="5" name="CuadroTexto 4">
+            <a:extLst>
+              <a:ext uri="{FF2B5EF4-FFF2-40B4-BE49-F238E27FC236}">
+                <a16:creationId xmlns:a16="http://schemas.microsoft.com/office/drawing/2014/main" id="{BE05454C-6D82-4E70-840D-A8F57C5DBFF6}"/>
               </a:ext>
             </a:extLst>
           </p:cNvPr>
@@ -7047,8 +7764,8 @@
         </p:nvSpPr>
         <p:spPr>
           <a:xfrm>
-            <a:off x="1318591" y="1768591"/>
-            <a:ext cx="8792818" cy="3247556"/>
+            <a:off x="742949" y="508231"/>
+            <a:ext cx="10097329" cy="461665"/>
           </a:xfrm>
           <a:prstGeom prst="rect">
             <a:avLst/>
@@ -7061,207 +7778,50 @@
           </a:bodyPr>
           <a:lstStyle/>
           <a:p>
-            <a:r>
-              <a:rPr lang="es-MX" sz="1600" b="0" i="0" dirty="0">
+            <a:pPr algn="ctr"/>
+            <a:r>
+              <a:rPr kumimoji="0" lang="es-MX" sz="2400" b="1" i="0" u="none" strike="noStrike" kern="1200" cap="none" spc="0" normalizeH="0" baseline="0" noProof="0" dirty="0">
+                <a:ln>
+                  <a:noFill/>
+                </a:ln>
                 <a:solidFill>
-                  <a:srgbClr val="1D1C1D"/>
+                  <a:srgbClr val="000000"/>
                 </a:solidFill>
                 <a:effectLst/>
+                <a:uLnTx/>
+                <a:uFillTx/>
                 <a:latin typeface="Arial" panose="020B0604020202020204" pitchFamily="34" charset="0"/>
+                <a:ea typeface="Times New Roman" panose="02020603050405020304" pitchFamily="18" charset="0"/>
                 <a:cs typeface="Arial" panose="020B0604020202020204" pitchFamily="34" charset="0"/>
               </a:rPr>
-              <a:t>Problemas en Farmacias GI:</a:t>
-            </a:r>
-          </a:p>
-          <a:p>
-            <a:pPr marL="285750" indent="-285750">
-              <a:lnSpc>
-                <a:spcPct val="150000"/>
-              </a:lnSpc>
-              <a:buFont typeface="Arial" panose="020B0604020202020204" pitchFamily="34" charset="0"/>
-              <a:buChar char="•"/>
-            </a:pPr>
-            <a:r>
-              <a:rPr lang="es-MX" sz="1600" b="0" i="0" dirty="0">
-                <a:solidFill>
-                  <a:srgbClr val="1D1C1D"/>
-                </a:solidFill>
-                <a:effectLst/>
-                <a:latin typeface="Arial" panose="020B0604020202020204" pitchFamily="34" charset="0"/>
-                <a:cs typeface="Arial" panose="020B0604020202020204" pitchFamily="34" charset="0"/>
-              </a:rPr>
-              <a:t>Registro de la ventas por empleado</a:t>
-            </a:r>
-          </a:p>
-          <a:p>
-            <a:pPr marL="285750" indent="-285750">
-              <a:lnSpc>
-                <a:spcPct val="150000"/>
-              </a:lnSpc>
-              <a:buFont typeface="Arial" panose="020B0604020202020204" pitchFamily="34" charset="0"/>
-              <a:buChar char="•"/>
-            </a:pPr>
-            <a:r>
-              <a:rPr lang="es-MX" sz="1600" b="0" i="0" dirty="0">
-                <a:solidFill>
-                  <a:srgbClr val="1D1C1D"/>
-                </a:solidFill>
-                <a:effectLst/>
-                <a:latin typeface="Arial" panose="020B0604020202020204" pitchFamily="34" charset="0"/>
-                <a:cs typeface="Arial" panose="020B0604020202020204" pitchFamily="34" charset="0"/>
-              </a:rPr>
-              <a:t>Registro manual de clientes deudores</a:t>
-            </a:r>
-          </a:p>
-          <a:p>
-            <a:pPr marL="285750" indent="-285750">
-              <a:lnSpc>
-                <a:spcPct val="150000"/>
-              </a:lnSpc>
-              <a:buFont typeface="Arial" panose="020B0604020202020204" pitchFamily="34" charset="0"/>
-              <a:buChar char="•"/>
-            </a:pPr>
-            <a:r>
-              <a:rPr lang="es-MX" sz="1600" b="0" i="0" dirty="0">
-                <a:solidFill>
-                  <a:srgbClr val="1D1C1D"/>
-                </a:solidFill>
-                <a:effectLst/>
-                <a:latin typeface="Arial" panose="020B0604020202020204" pitchFamily="34" charset="0"/>
-                <a:cs typeface="Arial" panose="020B0604020202020204" pitchFamily="34" charset="0"/>
-              </a:rPr>
-              <a:t>Productos agotados</a:t>
-            </a:r>
-            <a:endParaRPr lang="es-MX" sz="1600" dirty="0">
-              <a:latin typeface="Arial" panose="020B0604020202020204" pitchFamily="34" charset="0"/>
-              <a:cs typeface="Arial" panose="020B0604020202020204" pitchFamily="34" charset="0"/>
-            </a:endParaRPr>
-          </a:p>
-          <a:p>
-            <a:pPr marL="285750" indent="-285750">
-              <a:lnSpc>
-                <a:spcPct val="150000"/>
-              </a:lnSpc>
-              <a:buFont typeface="Arial" panose="020B0604020202020204" pitchFamily="34" charset="0"/>
-              <a:buChar char="•"/>
-            </a:pPr>
-            <a:r>
-              <a:rPr lang="es-MX" sz="1600" b="0" i="0" dirty="0">
-                <a:solidFill>
-                  <a:srgbClr val="1D1C1D"/>
-                </a:solidFill>
-                <a:effectLst/>
-                <a:latin typeface="Arial" panose="020B0604020202020204" pitchFamily="34" charset="0"/>
-                <a:cs typeface="Arial" panose="020B0604020202020204" pitchFamily="34" charset="0"/>
-              </a:rPr>
-              <a:t>Productos caducados</a:t>
-            </a:r>
-            <a:endParaRPr lang="es-MX" sz="1600" dirty="0">
-              <a:latin typeface="Arial" panose="020B0604020202020204" pitchFamily="34" charset="0"/>
-              <a:cs typeface="Arial" panose="020B0604020202020204" pitchFamily="34" charset="0"/>
-            </a:endParaRPr>
-          </a:p>
-          <a:p>
-            <a:pPr marL="285750" indent="-285750">
-              <a:lnSpc>
-                <a:spcPct val="150000"/>
-              </a:lnSpc>
-              <a:buFont typeface="Arial" panose="020B0604020202020204" pitchFamily="34" charset="0"/>
-              <a:buChar char="•"/>
-            </a:pPr>
-            <a:r>
-              <a:rPr lang="es-MX" sz="1600" b="0" i="0" dirty="0">
-                <a:solidFill>
-                  <a:srgbClr val="1D1C1D"/>
-                </a:solidFill>
-                <a:effectLst/>
-                <a:latin typeface="Arial" panose="020B0604020202020204" pitchFamily="34" charset="0"/>
-                <a:cs typeface="Arial" panose="020B0604020202020204" pitchFamily="34" charset="0"/>
-              </a:rPr>
-              <a:t>Registro manual de las compras</a:t>
-            </a:r>
-            <a:endParaRPr lang="es-MX" sz="1600" dirty="0">
-              <a:latin typeface="Arial" panose="020B0604020202020204" pitchFamily="34" charset="0"/>
-              <a:cs typeface="Arial" panose="020B0604020202020204" pitchFamily="34" charset="0"/>
-            </a:endParaRPr>
-          </a:p>
-          <a:p>
-            <a:pPr marL="285750" indent="-285750">
-              <a:lnSpc>
-                <a:spcPct val="150000"/>
-              </a:lnSpc>
-              <a:buFont typeface="Arial" panose="020B0604020202020204" pitchFamily="34" charset="0"/>
-              <a:buChar char="•"/>
-            </a:pPr>
-            <a:r>
-              <a:rPr lang="es-MX" sz="1600" b="0" i="0" dirty="0">
-                <a:solidFill>
-                  <a:srgbClr val="1D1C1D"/>
-                </a:solidFill>
-                <a:effectLst/>
-                <a:latin typeface="Arial" panose="020B0604020202020204" pitchFamily="34" charset="0"/>
-                <a:cs typeface="Arial" panose="020B0604020202020204" pitchFamily="34" charset="0"/>
-              </a:rPr>
-              <a:t>No existe calculo del margen de ganancias</a:t>
-            </a:r>
-            <a:endParaRPr lang="es-MX" sz="1600" dirty="0">
-              <a:latin typeface="Arial" panose="020B0604020202020204" pitchFamily="34" charset="0"/>
-              <a:cs typeface="Arial" panose="020B0604020202020204" pitchFamily="34" charset="0"/>
-            </a:endParaRPr>
-          </a:p>
-          <a:p>
-            <a:pPr marL="285750" indent="-285750">
-              <a:lnSpc>
-                <a:spcPct val="150000"/>
-              </a:lnSpc>
-              <a:buFont typeface="Arial" panose="020B0604020202020204" pitchFamily="34" charset="0"/>
-              <a:buChar char="•"/>
-            </a:pPr>
-            <a:r>
-              <a:rPr lang="es-MX" sz="1600" b="0" i="0" dirty="0">
-                <a:solidFill>
-                  <a:srgbClr val="1D1C1D"/>
-                </a:solidFill>
-                <a:effectLst/>
-                <a:latin typeface="Arial" panose="020B0604020202020204" pitchFamily="34" charset="0"/>
-                <a:cs typeface="Arial" panose="020B0604020202020204" pitchFamily="34" charset="0"/>
-              </a:rPr>
-              <a:t>No existe las compras a distancia para las personas que</a:t>
-            </a:r>
-            <a:br>
-              <a:rPr lang="es-MX" sz="1600" dirty="0">
-                <a:latin typeface="Arial" panose="020B0604020202020204" pitchFamily="34" charset="0"/>
-                <a:cs typeface="Arial" panose="020B0604020202020204" pitchFamily="34" charset="0"/>
-              </a:rPr>
-            </a:br>
-            <a:r>
-              <a:rPr lang="es-MX" sz="1600" b="0" i="0" dirty="0">
-                <a:solidFill>
-                  <a:srgbClr val="1D1C1D"/>
-                </a:solidFill>
-                <a:effectLst/>
-                <a:latin typeface="Arial" panose="020B0604020202020204" pitchFamily="34" charset="0"/>
-                <a:cs typeface="Arial" panose="020B0604020202020204" pitchFamily="34" charset="0"/>
-              </a:rPr>
-              <a:t> no pueden comprar en la tienda de manera física</a:t>
-            </a:r>
-            <a:endParaRPr lang="es-MX" sz="1600" dirty="0">
-              <a:latin typeface="Arial" panose="020B0604020202020204" pitchFamily="34" charset="0"/>
-              <a:cs typeface="Arial" panose="020B0604020202020204" pitchFamily="34" charset="0"/>
-            </a:endParaRPr>
+              <a:t>Objetivos</a:t>
+            </a:r>
+            <a:endParaRPr lang="es-MX" dirty="0"/>
           </a:p>
         </p:txBody>
       </p:sp>
     </p:spTree>
     <p:extLst>
       <p:ext uri="{BB962C8B-B14F-4D97-AF65-F5344CB8AC3E}">
-        <p14:creationId xmlns:p14="http://schemas.microsoft.com/office/powerpoint/2010/main" val="2937598698"/>
+        <p14:creationId xmlns:p14="http://schemas.microsoft.com/office/powerpoint/2010/main" val="4051917151"/>
       </p:ext>
     </p:extLst>
   </p:cSld>
   <p:clrMapOvr>
     <a:masterClrMapping/>
   </p:clrMapOvr>
+  <mc:AlternateContent xmlns:mc="http://schemas.openxmlformats.org/markup-compatibility/2006">
+    <mc:Choice xmlns:p14="http://schemas.microsoft.com/office/powerpoint/2010/main" Requires="p14">
+      <p:transition spd="slow" p14:dur="1500">
+        <p:random/>
+      </p:transition>
+    </mc:Choice>
+    <mc:Fallback>
+      <p:transition spd="slow">
+        <p:random/>
+      </p:transition>
+    </mc:Fallback>
+  </mc:AlternateContent>
 </p:sld>
 </file>
 
@@ -7282,12 +7842,62 @@
           <a:chExt cx="0" cy="0"/>
         </a:xfrm>
       </p:grpSpPr>
-      <p:sp>
-        <p:nvSpPr>
-          <p:cNvPr id="4" name="CuadroTexto 3">
+      <p:pic>
+        <p:nvPicPr>
+          <p:cNvPr id="2050" name="Picture 2" descr="Los objetivos de resultado y de proceso: ¿Cómo aplicarlos a la vida  cotidiana? ⋆ Rincón de la Psicología">
             <a:extLst>
               <a:ext uri="{FF2B5EF4-FFF2-40B4-BE49-F238E27FC236}">
-                <a16:creationId xmlns:a16="http://schemas.microsoft.com/office/drawing/2014/main" id="{63D03C20-A84A-44EF-9844-9DFA685C535F}"/>
+                <a16:creationId xmlns:a16="http://schemas.microsoft.com/office/drawing/2014/main" id="{862DD084-0E93-43C5-B642-E49894D4675F}"/>
+              </a:ext>
+            </a:extLst>
+          </p:cNvPr>
+          <p:cNvPicPr>
+            <a:picLocks noChangeAspect="1" noChangeArrowheads="1"/>
+          </p:cNvPicPr>
+          <p:nvPr/>
+        </p:nvPicPr>
+        <p:blipFill rotWithShape="1">
+          <a:blip r:embed="rId2">
+            <a:extLst>
+              <a:ext uri="{28A0092B-C50C-407E-A947-70E740481C1C}">
+                <a14:useLocalDpi xmlns:a14="http://schemas.microsoft.com/office/drawing/2010/main" val="0"/>
+              </a:ext>
+            </a:extLst>
+          </a:blip>
+          <a:srcRect t="17445" r="4562" b="9081"/>
+          <a:stretch/>
+        </p:blipFill>
+        <p:spPr bwMode="auto">
+          <a:xfrm>
+            <a:off x="8607246" y="2779643"/>
+            <a:ext cx="3081172" cy="1779105"/>
+          </a:xfrm>
+          <a:prstGeom prst="rect">
+            <a:avLst/>
+          </a:prstGeom>
+          <a:ln>
+            <a:noFill/>
+          </a:ln>
+          <a:effectLst>
+            <a:softEdge rad="112500"/>
+          </a:effectLst>
+          <a:extLst>
+            <a:ext uri="{909E8E84-426E-40DD-AFC4-6F175D3DCCD1}">
+              <a14:hiddenFill xmlns:a14="http://schemas.microsoft.com/office/drawing/2010/main">
+                <a:solidFill>
+                  <a:srgbClr val="FFFFFF"/>
+                </a:solidFill>
+              </a14:hiddenFill>
+            </a:ext>
+          </a:extLst>
+        </p:spPr>
+      </p:pic>
+      <p:sp>
+        <p:nvSpPr>
+          <p:cNvPr id="2" name="CuadroTexto 1">
+            <a:extLst>
+              <a:ext uri="{FF2B5EF4-FFF2-40B4-BE49-F238E27FC236}">
+                <a16:creationId xmlns:a16="http://schemas.microsoft.com/office/drawing/2014/main" id="{40E1DCFE-32B2-451C-BE26-BB46845633A2}"/>
               </a:ext>
             </a:extLst>
           </p:cNvPr>
@@ -7296,8 +7906,8 @@
         </p:nvSpPr>
         <p:spPr>
           <a:xfrm>
-            <a:off x="544996" y="569843"/>
-            <a:ext cx="10653092" cy="2124171"/>
+            <a:off x="2126973" y="406119"/>
+            <a:ext cx="7938053" cy="496996"/>
           </a:xfrm>
           <a:prstGeom prst="rect">
             <a:avLst/>
@@ -7333,13 +7943,42 @@
               </a:rPr>
               <a:t>Objetivos	</a:t>
             </a:r>
-            <a:endParaRPr lang="es-MX" sz="2000" dirty="0">
+            <a:endParaRPr lang="es-MX" sz="1600" u="none" strike="noStrike" dirty="0">
               <a:effectLst/>
               <a:latin typeface="Arial" panose="020B0604020202020204" pitchFamily="34" charset="0"/>
               <a:ea typeface="Calibri" panose="020F0502020204030204" pitchFamily="34" charset="0"/>
               <a:cs typeface="Arial" panose="020B0604020202020204" pitchFamily="34" charset="0"/>
             </a:endParaRPr>
           </a:p>
+        </p:txBody>
+      </p:sp>
+      <p:sp>
+        <p:nvSpPr>
+          <p:cNvPr id="4" name="CuadroTexto 3">
+            <a:extLst>
+              <a:ext uri="{FF2B5EF4-FFF2-40B4-BE49-F238E27FC236}">
+                <a16:creationId xmlns:a16="http://schemas.microsoft.com/office/drawing/2014/main" id="{02BB4AE3-0A83-4DF5-9EA3-CBFCFE05E361}"/>
+              </a:ext>
+            </a:extLst>
+          </p:cNvPr>
+          <p:cNvSpPr txBox="1"/>
+          <p:nvPr/>
+        </p:nvSpPr>
+        <p:spPr>
+          <a:xfrm>
+            <a:off x="642731" y="1040296"/>
+            <a:ext cx="7772400" cy="4324774"/>
+          </a:xfrm>
+          <a:prstGeom prst="rect">
+            <a:avLst/>
+          </a:prstGeom>
+          <a:noFill/>
+        </p:spPr>
+        <p:txBody>
+          <a:bodyPr wrap="square">
+            <a:spAutoFit/>
+          </a:bodyPr>
+          <a:lstStyle/>
           <a:p>
             <a:pPr algn="just">
               <a:lnSpc>
@@ -7362,19 +8001,17 @@
                 <a:ea typeface="Times New Roman" panose="02020603050405020304" pitchFamily="18" charset="0"/>
                 <a:cs typeface="Arial" panose="020B0604020202020204" pitchFamily="34" charset="0"/>
               </a:rPr>
-              <a:t>Objetivo general	</a:t>
-            </a:r>
-            <a:endParaRPr lang="es-MX" b="1" dirty="0">
-              <a:solidFill>
-                <a:srgbClr val="000000"/>
-              </a:solidFill>
+              <a:t>Objetivos Específicos</a:t>
+            </a:r>
+            <a:endParaRPr lang="es-MX" dirty="0">
+              <a:effectLst/>
               <a:latin typeface="Arial" panose="020B0604020202020204" pitchFamily="34" charset="0"/>
-              <a:ea typeface="Times New Roman" panose="02020603050405020304" pitchFamily="18" charset="0"/>
+              <a:ea typeface="Calibri" panose="020F0502020204030204" pitchFamily="34" charset="0"/>
               <a:cs typeface="Arial" panose="020B0604020202020204" pitchFamily="34" charset="0"/>
             </a:endParaRPr>
           </a:p>
           <a:p>
-            <a:pPr algn="just">
+            <a:pPr marL="342900" lvl="0" indent="-342900" algn="just">
               <a:lnSpc>
                 <a:spcPct val="150000"/>
               </a:lnSpc>
@@ -7382,55 +8019,168 @@
                 <a:spcPts val="1400"/>
               </a:spcBef>
               <a:spcAft>
-                <a:spcPts val="400"/>
+                <a:spcPts val="800"/>
               </a:spcAft>
+              <a:buFont typeface="Arial" panose="020B0604020202020204" pitchFamily="34" charset="0"/>
+              <a:buChar char="●"/>
             </a:pPr>
             <a:r>
-              <a:rPr lang="es-MX" sz="1600" dirty="0">
+              <a:rPr lang="es-MX" sz="1600" u="none" strike="noStrike" dirty="0">
                 <a:effectLst/>
                 <a:latin typeface="Arial" panose="020B0604020202020204" pitchFamily="34" charset="0"/>
                 <a:ea typeface="Times New Roman" panose="02020603050405020304" pitchFamily="18" charset="0"/>
                 <a:cs typeface="Arial" panose="020B0604020202020204" pitchFamily="34" charset="0"/>
               </a:rPr>
-              <a:t>Desarrollar un sistema de punto de venta y e-</a:t>
-            </a:r>
-            <a:r>
-              <a:rPr lang="es-MX" sz="1600" dirty="0" err="1">
+              <a:t>Aplicar la metodología SCRUM para el desarrollo del sistema de control de inventarios y </a:t>
+            </a:r>
+            <a:r>
+              <a:rPr lang="es-MX" sz="1600" u="none" strike="noStrike" dirty="0" err="1">
                 <a:effectLst/>
                 <a:latin typeface="Arial" panose="020B0604020202020204" pitchFamily="34" charset="0"/>
                 <a:ea typeface="Times New Roman" panose="02020603050405020304" pitchFamily="18" charset="0"/>
                 <a:cs typeface="Arial" panose="020B0604020202020204" pitchFamily="34" charset="0"/>
               </a:rPr>
-              <a:t>commerce</a:t>
-            </a:r>
-            <a:r>
-              <a:rPr lang="es-MX" sz="1600" dirty="0">
+              <a:t>ecommerce</a:t>
+            </a:r>
+            <a:r>
+              <a:rPr lang="es-MX" sz="1600" u="none" strike="noStrike" dirty="0">
                 <a:effectLst/>
                 <a:latin typeface="Arial" panose="020B0604020202020204" pitchFamily="34" charset="0"/>
                 <a:ea typeface="Times New Roman" panose="02020603050405020304" pitchFamily="18" charset="0"/>
                 <a:cs typeface="Arial" panose="020B0604020202020204" pitchFamily="34" charset="0"/>
               </a:rPr>
-              <a:t> para las sucursales de Farmacias Gi S.A. de C.V, en Zimatlán de Álvarez, Oaxaca.</a:t>
-            </a:r>
-            <a:endParaRPr lang="es-MX" sz="1600" dirty="0">
+              <a:t> en las sucursales de Farmacias Gi S.A. de C.V.</a:t>
+            </a:r>
+            <a:endParaRPr lang="es-MX" sz="1600" u="none" strike="noStrike" dirty="0">
               <a:effectLst/>
               <a:latin typeface="Arial" panose="020B0604020202020204" pitchFamily="34" charset="0"/>
               <a:ea typeface="Calibri" panose="020F0502020204030204" pitchFamily="34" charset="0"/>
               <a:cs typeface="Arial" panose="020B0604020202020204" pitchFamily="34" charset="0"/>
             </a:endParaRPr>
           </a:p>
+          <a:p>
+            <a:pPr marL="342900" lvl="0" indent="-342900" algn="just">
+              <a:lnSpc>
+                <a:spcPct val="150000"/>
+              </a:lnSpc>
+              <a:spcAft>
+                <a:spcPts val="800"/>
+              </a:spcAft>
+              <a:buFont typeface="Arial" panose="020B0604020202020204" pitchFamily="34" charset="0"/>
+              <a:buChar char="●"/>
+            </a:pPr>
+            <a:r>
+              <a:rPr lang="es-MX" sz="1600" u="none" strike="noStrike" dirty="0">
+                <a:effectLst/>
+                <a:latin typeface="Arial" panose="020B0604020202020204" pitchFamily="34" charset="0"/>
+                <a:ea typeface="Times New Roman" panose="02020603050405020304" pitchFamily="18" charset="0"/>
+                <a:cs typeface="Arial" panose="020B0604020202020204" pitchFamily="34" charset="0"/>
+              </a:rPr>
+              <a:t>Diseñar un </a:t>
+            </a:r>
+            <a:r>
+              <a:rPr lang="es-MX" sz="1600" u="none" strike="noStrike" dirty="0" err="1">
+                <a:effectLst/>
+                <a:latin typeface="Arial" panose="020B0604020202020204" pitchFamily="34" charset="0"/>
+                <a:ea typeface="Times New Roman" panose="02020603050405020304" pitchFamily="18" charset="0"/>
+                <a:cs typeface="Arial" panose="020B0604020202020204" pitchFamily="34" charset="0"/>
+              </a:rPr>
+              <a:t>ecommerce</a:t>
+            </a:r>
+            <a:r>
+              <a:rPr lang="es-MX" sz="1600" u="none" strike="noStrike" dirty="0">
+                <a:effectLst/>
+                <a:latin typeface="Arial" panose="020B0604020202020204" pitchFamily="34" charset="0"/>
+                <a:ea typeface="Times New Roman" panose="02020603050405020304" pitchFamily="18" charset="0"/>
+                <a:cs typeface="Arial" panose="020B0604020202020204" pitchFamily="34" charset="0"/>
+              </a:rPr>
+              <a:t> para las sucursales de Farmacias Gi S.A. de C.V en Zimatlán de Álvarez, Oaxaca, para lograr un mayor alcance al público e incrementar las ganancias en sus sucursales.</a:t>
+            </a:r>
+            <a:endParaRPr lang="es-MX" sz="1600" u="none" strike="noStrike" dirty="0">
+              <a:effectLst/>
+              <a:latin typeface="Arial" panose="020B0604020202020204" pitchFamily="34" charset="0"/>
+              <a:ea typeface="Calibri" panose="020F0502020204030204" pitchFamily="34" charset="0"/>
+              <a:cs typeface="Arial" panose="020B0604020202020204" pitchFamily="34" charset="0"/>
+            </a:endParaRPr>
+          </a:p>
+          <a:p>
+            <a:pPr marL="342900" lvl="0" indent="-342900" algn="just">
+              <a:lnSpc>
+                <a:spcPct val="150000"/>
+              </a:lnSpc>
+              <a:spcAft>
+                <a:spcPts val="800"/>
+              </a:spcAft>
+              <a:buFont typeface="Arial" panose="020B0604020202020204" pitchFamily="34" charset="0"/>
+              <a:buChar char="●"/>
+            </a:pPr>
+            <a:r>
+              <a:rPr lang="es-MX" sz="1600" u="none" strike="noStrike" dirty="0">
+                <a:effectLst/>
+                <a:latin typeface="Arial" panose="020B0604020202020204" pitchFamily="34" charset="0"/>
+                <a:ea typeface="Times New Roman" panose="02020603050405020304" pitchFamily="18" charset="0"/>
+                <a:cs typeface="Arial" panose="020B0604020202020204" pitchFamily="34" charset="0"/>
+              </a:rPr>
+              <a:t>Administrar las entradas y salidas de los productos en las sucursales de Farmacias Gi S.A. de C.V en Zimatlán de Álvarez, Oaxaca para tener un mejor control de las pérdidas y ganancias.</a:t>
+            </a:r>
+            <a:endParaRPr lang="es-MX" sz="1600" u="none" strike="noStrike" dirty="0">
+              <a:effectLst/>
+              <a:latin typeface="Arial" panose="020B0604020202020204" pitchFamily="34" charset="0"/>
+              <a:ea typeface="Calibri" panose="020F0502020204030204" pitchFamily="34" charset="0"/>
+              <a:cs typeface="Arial" panose="020B0604020202020204" pitchFamily="34" charset="0"/>
+            </a:endParaRPr>
+          </a:p>
+          <a:p>
+            <a:pPr marL="342900" lvl="0" indent="-342900" algn="just">
+              <a:lnSpc>
+                <a:spcPct val="150000"/>
+              </a:lnSpc>
+              <a:spcAft>
+                <a:spcPts val="400"/>
+              </a:spcAft>
+              <a:buFont typeface="Arial" panose="020B0604020202020204" pitchFamily="34" charset="0"/>
+              <a:buChar char="●"/>
+            </a:pPr>
+            <a:r>
+              <a:rPr lang="es-MX" sz="1600" u="none" strike="noStrike" dirty="0">
+                <a:effectLst/>
+                <a:latin typeface="Arial" panose="020B0604020202020204" pitchFamily="34" charset="0"/>
+                <a:ea typeface="Times New Roman" panose="02020603050405020304" pitchFamily="18" charset="0"/>
+                <a:cs typeface="Arial" panose="020B0604020202020204" pitchFamily="34" charset="0"/>
+              </a:rPr>
+              <a:t>Facilitar la accesibilidad de la venta de los productos a los clientes.</a:t>
+            </a:r>
+            <a:endParaRPr lang="es-MX" sz="1600" u="none" strike="noStrike" dirty="0">
+              <a:effectLst/>
+              <a:latin typeface="Arial" panose="020B0604020202020204" pitchFamily="34" charset="0"/>
+              <a:ea typeface="Calibri" panose="020F0502020204030204" pitchFamily="34" charset="0"/>
+              <a:cs typeface="Arial" panose="020B0604020202020204" pitchFamily="34" charset="0"/>
+            </a:endParaRPr>
+          </a:p>
         </p:txBody>
       </p:sp>
     </p:spTree>
     <p:extLst>
       <p:ext uri="{BB962C8B-B14F-4D97-AF65-F5344CB8AC3E}">
-        <p14:creationId xmlns:p14="http://schemas.microsoft.com/office/powerpoint/2010/main" val="4051917151"/>
+        <p14:creationId xmlns:p14="http://schemas.microsoft.com/office/powerpoint/2010/main" val="1141999583"/>
       </p:ext>
     </p:extLst>
   </p:cSld>
   <p:clrMapOvr>
     <a:masterClrMapping/>
   </p:clrMapOvr>
+  <mc:AlternateContent xmlns:mc="http://schemas.openxmlformats.org/markup-compatibility/2006">
+    <mc:Choice xmlns:p14="http://schemas.microsoft.com/office/powerpoint/2010/main" Requires="p14">
+      <p:transition spd="slow" p14:dur="1500">
+        <p:random/>
+      </p:transition>
+    </mc:Choice>
+    <mc:Fallback>
+      <p:transition spd="slow">
+        <p:random/>
+      </p:transition>
+    </mc:Fallback>
+  </mc:AlternateContent>
 </p:sld>
 </file>
 
@@ -7456,7 +8206,7 @@
           <p:cNvPr id="2" name="CuadroTexto 1">
             <a:extLst>
               <a:ext uri="{FF2B5EF4-FFF2-40B4-BE49-F238E27FC236}">
-                <a16:creationId xmlns:a16="http://schemas.microsoft.com/office/drawing/2014/main" id="{40E1DCFE-32B2-451C-BE26-BB46845633A2}"/>
+                <a16:creationId xmlns:a16="http://schemas.microsoft.com/office/drawing/2014/main" id="{535A342C-85A0-4F48-9F14-8416A777832D}"/>
               </a:ext>
             </a:extLst>
           </p:cNvPr>
@@ -7465,8 +8215,8 @@
         </p:nvSpPr>
         <p:spPr>
           <a:xfrm>
-            <a:off x="503582" y="583096"/>
-            <a:ext cx="10681253" cy="4278607"/>
+            <a:off x="5088835" y="636104"/>
+            <a:ext cx="1750800" cy="677108"/>
           </a:xfrm>
           <a:prstGeom prst="rect">
             <a:avLst/>
@@ -7474,216 +8224,196 @@
           <a:noFill/>
         </p:spPr>
         <p:txBody>
+          <a:bodyPr wrap="none" rtlCol="0">
+            <a:spAutoFit/>
+          </a:bodyPr>
+          <a:lstStyle/>
+          <a:p>
+            <a:r>
+              <a:rPr lang="es-MX" sz="2000" b="1" dirty="0">
+                <a:latin typeface="Arial" panose="020B0604020202020204" pitchFamily="34" charset="0"/>
+                <a:cs typeface="Arial" panose="020B0604020202020204" pitchFamily="34" charset="0"/>
+              </a:rPr>
+              <a:t>Justificación</a:t>
+            </a:r>
+          </a:p>
+          <a:p>
+            <a:endParaRPr lang="es-MX" dirty="0"/>
+          </a:p>
+        </p:txBody>
+      </p:sp>
+      <p:sp>
+        <p:nvSpPr>
+          <p:cNvPr id="3" name="CuadroTexto 2">
+            <a:extLst>
+              <a:ext uri="{FF2B5EF4-FFF2-40B4-BE49-F238E27FC236}">
+                <a16:creationId xmlns:a16="http://schemas.microsoft.com/office/drawing/2014/main" id="{C7E7C02F-835A-468A-B69F-C200520CEC10}"/>
+              </a:ext>
+            </a:extLst>
+          </p:cNvPr>
+          <p:cNvSpPr txBox="1"/>
+          <p:nvPr/>
+        </p:nvSpPr>
+        <p:spPr>
+          <a:xfrm>
+            <a:off x="1318591" y="1583061"/>
+            <a:ext cx="8792818" cy="2949525"/>
+          </a:xfrm>
+          <a:prstGeom prst="rect">
+            <a:avLst/>
+          </a:prstGeom>
+          <a:noFill/>
+        </p:spPr>
+        <p:txBody>
           <a:bodyPr wrap="square">
             <a:spAutoFit/>
           </a:bodyPr>
           <a:lstStyle/>
           <a:p>
-            <a:pPr algn="ctr">
+            <a:pPr marL="285750" indent="-285750">
               <a:lnSpc>
                 <a:spcPct val="150000"/>
               </a:lnSpc>
-              <a:spcBef>
-                <a:spcPts val="1800"/>
-              </a:spcBef>
-              <a:spcAft>
-                <a:spcPts val="400"/>
-              </a:spcAft>
+              <a:buFont typeface="Arial" panose="020B0604020202020204" pitchFamily="34" charset="0"/>
+              <a:buChar char="•"/>
             </a:pPr>
             <a:r>
-              <a:rPr lang="es-MX" sz="2000" b="1" dirty="0">
+              <a:rPr lang="es-MX" b="0" i="0" dirty="0">
                 <a:solidFill>
-                  <a:srgbClr val="000000"/>
+                  <a:srgbClr val="1D1C1D"/>
                 </a:solidFill>
                 <a:effectLst/>
                 <a:latin typeface="Arial" panose="020B0604020202020204" pitchFamily="34" charset="0"/>
-                <a:ea typeface="Times New Roman" panose="02020603050405020304" pitchFamily="18" charset="0"/>
                 <a:cs typeface="Arial" panose="020B0604020202020204" pitchFamily="34" charset="0"/>
               </a:rPr>
-              <a:t>Objetivos	</a:t>
-            </a:r>
-            <a:endParaRPr lang="es-MX" sz="2000" dirty="0">
-              <a:effectLst/>
-              <a:latin typeface="Arial" panose="020B0604020202020204" pitchFamily="34" charset="0"/>
-              <a:ea typeface="Calibri" panose="020F0502020204030204" pitchFamily="34" charset="0"/>
-              <a:cs typeface="Arial" panose="020B0604020202020204" pitchFamily="34" charset="0"/>
-            </a:endParaRPr>
-          </a:p>
-          <a:p>
-            <a:pPr algn="just">
+              <a:t>Código único para las acciones del empleado</a:t>
+            </a:r>
+          </a:p>
+          <a:p>
+            <a:pPr marL="285750" indent="-285750">
               <a:lnSpc>
                 <a:spcPct val="150000"/>
               </a:lnSpc>
-              <a:spcBef>
-                <a:spcPts val="1400"/>
-              </a:spcBef>
-              <a:spcAft>
-                <a:spcPts val="400"/>
-              </a:spcAft>
+              <a:buFont typeface="Arial" panose="020B0604020202020204" pitchFamily="34" charset="0"/>
+              <a:buChar char="•"/>
             </a:pPr>
             <a:r>
-              <a:rPr lang="es-MX" b="1" dirty="0">
+              <a:rPr lang="es-MX" b="0" i="0" dirty="0">
                 <a:solidFill>
-                  <a:srgbClr val="000000"/>
+                  <a:srgbClr val="1D1C1D"/>
                 </a:solidFill>
                 <a:effectLst/>
                 <a:latin typeface="Arial" panose="020B0604020202020204" pitchFamily="34" charset="0"/>
-                <a:ea typeface="Times New Roman" panose="02020603050405020304" pitchFamily="18" charset="0"/>
                 <a:cs typeface="Arial" panose="020B0604020202020204" pitchFamily="34" charset="0"/>
               </a:rPr>
-              <a:t>Objetivos Específicos</a:t>
-            </a:r>
-            <a:endParaRPr lang="es-MX" dirty="0">
-              <a:effectLst/>
-              <a:latin typeface="Arial" panose="020B0604020202020204" pitchFamily="34" charset="0"/>
-              <a:ea typeface="Calibri" panose="020F0502020204030204" pitchFamily="34" charset="0"/>
-              <a:cs typeface="Arial" panose="020B0604020202020204" pitchFamily="34" charset="0"/>
-            </a:endParaRPr>
-          </a:p>
-          <a:p>
-            <a:pPr marL="342900" lvl="0" indent="-342900" algn="just">
+              <a:t>inventario intermedio para clientes con línea de crédito</a:t>
+            </a:r>
+          </a:p>
+          <a:p>
+            <a:pPr marL="285750" indent="-285750">
               <a:lnSpc>
                 <a:spcPct val="150000"/>
               </a:lnSpc>
-              <a:spcBef>
-                <a:spcPts val="1400"/>
-              </a:spcBef>
-              <a:spcAft>
-                <a:spcPts val="800"/>
-              </a:spcAft>
               <a:buFont typeface="Arial" panose="020B0604020202020204" pitchFamily="34" charset="0"/>
-              <a:buChar char="●"/>
+              <a:buChar char="•"/>
             </a:pPr>
             <a:r>
-              <a:rPr lang="es-MX" sz="1600" u="none" strike="noStrike" dirty="0">
+              <a:rPr lang="es-MX" b="0" i="0" dirty="0">
+                <a:solidFill>
+                  <a:srgbClr val="1D1C1D"/>
+                </a:solidFill>
                 <a:effectLst/>
                 <a:latin typeface="Arial" panose="020B0604020202020204" pitchFamily="34" charset="0"/>
-                <a:ea typeface="Times New Roman" panose="02020603050405020304" pitchFamily="18" charset="0"/>
                 <a:cs typeface="Arial" panose="020B0604020202020204" pitchFamily="34" charset="0"/>
               </a:rPr>
-              <a:t>Aplicar la metodología SCRUM para el desarrollo del sistema de control de inventarios y </a:t>
-            </a:r>
-            <a:r>
-              <a:rPr lang="es-MX" sz="1600" u="none" strike="noStrike" dirty="0" err="1">
-                <a:effectLst/>
-                <a:latin typeface="Arial" panose="020B0604020202020204" pitchFamily="34" charset="0"/>
-                <a:ea typeface="Times New Roman" panose="02020603050405020304" pitchFamily="18" charset="0"/>
-                <a:cs typeface="Arial" panose="020B0604020202020204" pitchFamily="34" charset="0"/>
-              </a:rPr>
-              <a:t>ecommerce</a:t>
-            </a:r>
-            <a:r>
-              <a:rPr lang="es-MX" sz="1600" u="none" strike="noStrike" dirty="0">
-                <a:effectLst/>
-                <a:latin typeface="Arial" panose="020B0604020202020204" pitchFamily="34" charset="0"/>
-                <a:ea typeface="Times New Roman" panose="02020603050405020304" pitchFamily="18" charset="0"/>
-                <a:cs typeface="Arial" panose="020B0604020202020204" pitchFamily="34" charset="0"/>
-              </a:rPr>
-              <a:t> en las sucursales de Farmacias Gi S.A. de C.V.</a:t>
-            </a:r>
-            <a:endParaRPr lang="es-MX" sz="1600" u="none" strike="noStrike" dirty="0">
-              <a:effectLst/>
-              <a:latin typeface="Arial" panose="020B0604020202020204" pitchFamily="34" charset="0"/>
-              <a:ea typeface="Calibri" panose="020F0502020204030204" pitchFamily="34" charset="0"/>
-              <a:cs typeface="Arial" panose="020B0604020202020204" pitchFamily="34" charset="0"/>
-            </a:endParaRPr>
-          </a:p>
-          <a:p>
-            <a:pPr marL="342900" lvl="0" indent="-342900" algn="just">
+              <a:t>Notificación automática de la existencia de los productos</a:t>
+            </a:r>
+          </a:p>
+          <a:p>
+            <a:pPr marL="285750" indent="-285750">
               <a:lnSpc>
                 <a:spcPct val="150000"/>
               </a:lnSpc>
-              <a:spcAft>
-                <a:spcPts val="800"/>
-              </a:spcAft>
               <a:buFont typeface="Arial" panose="020B0604020202020204" pitchFamily="34" charset="0"/>
-              <a:buChar char="●"/>
+              <a:buChar char="•"/>
             </a:pPr>
             <a:r>
-              <a:rPr lang="es-MX" sz="1600" u="none" strike="noStrike" dirty="0">
+              <a:rPr lang="es-MX" b="0" i="0" dirty="0">
+                <a:solidFill>
+                  <a:srgbClr val="1D1C1D"/>
+                </a:solidFill>
                 <a:effectLst/>
                 <a:latin typeface="Arial" panose="020B0604020202020204" pitchFamily="34" charset="0"/>
-                <a:ea typeface="Times New Roman" panose="02020603050405020304" pitchFamily="18" charset="0"/>
                 <a:cs typeface="Arial" panose="020B0604020202020204" pitchFamily="34" charset="0"/>
               </a:rPr>
-              <a:t>Diseñar un </a:t>
-            </a:r>
-            <a:r>
-              <a:rPr lang="es-MX" sz="1600" u="none" strike="noStrike" dirty="0" err="1">
-                <a:effectLst/>
-                <a:latin typeface="Arial" panose="020B0604020202020204" pitchFamily="34" charset="0"/>
-                <a:ea typeface="Times New Roman" panose="02020603050405020304" pitchFamily="18" charset="0"/>
-                <a:cs typeface="Arial" panose="020B0604020202020204" pitchFamily="34" charset="0"/>
-              </a:rPr>
-              <a:t>ecommerce</a:t>
-            </a:r>
-            <a:r>
-              <a:rPr lang="es-MX" sz="1600" u="none" strike="noStrike" dirty="0">
-                <a:effectLst/>
-                <a:latin typeface="Arial" panose="020B0604020202020204" pitchFamily="34" charset="0"/>
-                <a:ea typeface="Times New Roman" panose="02020603050405020304" pitchFamily="18" charset="0"/>
-                <a:cs typeface="Arial" panose="020B0604020202020204" pitchFamily="34" charset="0"/>
-              </a:rPr>
-              <a:t> para las sucursales de Farmacias Gi S.A. de C.V en Zimatlán de Álvarez, Oaxaca, para lograr un mayor alcance al público e incrementar las ganancias en sus sucursales.</a:t>
-            </a:r>
-            <a:endParaRPr lang="es-MX" sz="1600" u="none" strike="noStrike" dirty="0">
-              <a:effectLst/>
-              <a:latin typeface="Arial" panose="020B0604020202020204" pitchFamily="34" charset="0"/>
-              <a:ea typeface="Calibri" panose="020F0502020204030204" pitchFamily="34" charset="0"/>
-              <a:cs typeface="Arial" panose="020B0604020202020204" pitchFamily="34" charset="0"/>
-            </a:endParaRPr>
-          </a:p>
-          <a:p>
-            <a:pPr marL="342900" lvl="0" indent="-342900" algn="just">
+              <a:t>Notificación automática de caducidad de los productos</a:t>
+            </a:r>
+          </a:p>
+          <a:p>
+            <a:pPr marL="285750" indent="-285750">
               <a:lnSpc>
                 <a:spcPct val="150000"/>
               </a:lnSpc>
-              <a:spcAft>
-                <a:spcPts val="800"/>
-              </a:spcAft>
               <a:buFont typeface="Arial" panose="020B0604020202020204" pitchFamily="34" charset="0"/>
-              <a:buChar char="●"/>
+              <a:buChar char="•"/>
             </a:pPr>
             <a:r>
-              <a:rPr lang="es-MX" sz="1600" u="none" strike="noStrike" dirty="0">
+              <a:rPr lang="es-MX" b="0" i="0" dirty="0">
+                <a:solidFill>
+                  <a:srgbClr val="1D1C1D"/>
+                </a:solidFill>
                 <a:effectLst/>
                 <a:latin typeface="Arial" panose="020B0604020202020204" pitchFamily="34" charset="0"/>
-                <a:ea typeface="Times New Roman" panose="02020603050405020304" pitchFamily="18" charset="0"/>
                 <a:cs typeface="Arial" panose="020B0604020202020204" pitchFamily="34" charset="0"/>
               </a:rPr>
-              <a:t>Administrar las entradas y salidas de los productos en las sucursales de Farmacias Gi S.A. de C.V en Zimatlán de Álvarez, Oaxaca para tener un mejor control de las pérdidas y ganancias.</a:t>
-            </a:r>
-            <a:endParaRPr lang="es-MX" sz="1600" u="none" strike="noStrike" dirty="0">
-              <a:effectLst/>
-              <a:latin typeface="Arial" panose="020B0604020202020204" pitchFamily="34" charset="0"/>
-              <a:ea typeface="Calibri" panose="020F0502020204030204" pitchFamily="34" charset="0"/>
-              <a:cs typeface="Arial" panose="020B0604020202020204" pitchFamily="34" charset="0"/>
-            </a:endParaRPr>
-          </a:p>
-          <a:p>
-            <a:pPr marL="342900" lvl="0" indent="-342900" algn="just">
+              <a:t>Modulo de compras</a:t>
+            </a:r>
+          </a:p>
+          <a:p>
+            <a:pPr marL="285750" indent="-285750">
               <a:lnSpc>
                 <a:spcPct val="150000"/>
               </a:lnSpc>
-              <a:spcAft>
-                <a:spcPts val="400"/>
-              </a:spcAft>
               <a:buFont typeface="Arial" panose="020B0604020202020204" pitchFamily="34" charset="0"/>
-              <a:buChar char="●"/>
+              <a:buChar char="•"/>
             </a:pPr>
             <a:r>
-              <a:rPr lang="es-MX" sz="1600" u="none" strike="noStrike" dirty="0">
+              <a:rPr lang="es-MX" b="0" i="0" dirty="0">
+                <a:solidFill>
+                  <a:srgbClr val="1D1C1D"/>
+                </a:solidFill>
                 <a:effectLst/>
                 <a:latin typeface="Arial" panose="020B0604020202020204" pitchFamily="34" charset="0"/>
-                <a:ea typeface="Times New Roman" panose="02020603050405020304" pitchFamily="18" charset="0"/>
                 <a:cs typeface="Arial" panose="020B0604020202020204" pitchFamily="34" charset="0"/>
               </a:rPr>
-              <a:t>Facilitar la accesibilidad de la venta de los productos a los clientes.</a:t>
-            </a:r>
-            <a:endParaRPr lang="es-MX" sz="1600" u="none" strike="noStrike" dirty="0">
+              <a:t>Modulo de reporte de compra-venta</a:t>
+            </a:r>
+          </a:p>
+          <a:p>
+            <a:pPr marL="285750" indent="-285750">
+              <a:lnSpc>
+                <a:spcPct val="150000"/>
+              </a:lnSpc>
+              <a:buFont typeface="Arial" panose="020B0604020202020204" pitchFamily="34" charset="0"/>
+              <a:buChar char="•"/>
+            </a:pPr>
+            <a:r>
+              <a:rPr lang="es-MX" b="0" i="0" dirty="0" err="1">
+                <a:solidFill>
+                  <a:srgbClr val="1D1C1D"/>
+                </a:solidFill>
+                <a:effectLst/>
+                <a:latin typeface="Arial" panose="020B0604020202020204" pitchFamily="34" charset="0"/>
+                <a:cs typeface="Arial" panose="020B0604020202020204" pitchFamily="34" charset="0"/>
+              </a:rPr>
+              <a:t>Ecommerce</a:t>
+            </a:r>
+            <a:endParaRPr lang="es-MX" b="0" i="0" dirty="0">
+              <a:solidFill>
+                <a:srgbClr val="1D1C1D"/>
+              </a:solidFill>
               <a:effectLst/>
               <a:latin typeface="Arial" panose="020B0604020202020204" pitchFamily="34" charset="0"/>
-              <a:ea typeface="Calibri" panose="020F0502020204030204" pitchFamily="34" charset="0"/>
               <a:cs typeface="Arial" panose="020B0604020202020204" pitchFamily="34" charset="0"/>
             </a:endParaRPr>
           </a:p>
@@ -7692,13 +8422,25 @@
     </p:spTree>
     <p:extLst>
       <p:ext uri="{BB962C8B-B14F-4D97-AF65-F5344CB8AC3E}">
-        <p14:creationId xmlns:p14="http://schemas.microsoft.com/office/powerpoint/2010/main" val="1141999583"/>
+        <p14:creationId xmlns:p14="http://schemas.microsoft.com/office/powerpoint/2010/main" val="461370616"/>
       </p:ext>
     </p:extLst>
   </p:cSld>
   <p:clrMapOvr>
     <a:masterClrMapping/>
   </p:clrMapOvr>
+  <mc:AlternateContent xmlns:mc="http://schemas.openxmlformats.org/markup-compatibility/2006">
+    <mc:Choice xmlns:p14="http://schemas.microsoft.com/office/powerpoint/2010/main" Requires="p14">
+      <p:transition spd="slow" p14:dur="1500">
+        <p:random/>
+      </p:transition>
+    </mc:Choice>
+    <mc:Fallback>
+      <p:transition spd="slow">
+        <p:random/>
+      </p:transition>
+    </mc:Fallback>
+  </mc:AlternateContent>
 </p:sld>
 </file>
 
@@ -7719,12 +8461,55 @@
           <a:chExt cx="0" cy="0"/>
         </a:xfrm>
       </p:grpSpPr>
-      <p:sp>
-        <p:nvSpPr>
-          <p:cNvPr id="2" name="CuadroTexto 1">
+      <p:pic>
+        <p:nvPicPr>
+          <p:cNvPr id="6" name="Imagen 5">
             <a:extLst>
               <a:ext uri="{FF2B5EF4-FFF2-40B4-BE49-F238E27FC236}">
-                <a16:creationId xmlns:a16="http://schemas.microsoft.com/office/drawing/2014/main" id="{535A342C-85A0-4F48-9F14-8416A777832D}"/>
+                <a16:creationId xmlns:a16="http://schemas.microsoft.com/office/drawing/2014/main" id="{0D1F5296-B03E-4926-BABA-8AA5EAA0F55F}"/>
+              </a:ext>
+            </a:extLst>
+          </p:cNvPr>
+          <p:cNvPicPr>
+            <a:picLocks noChangeAspect="1"/>
+          </p:cNvPicPr>
+          <p:nvPr/>
+        </p:nvPicPr>
+        <p:blipFill rotWithShape="1">
+          <a:blip r:embed="rId2">
+            <a:extLst>
+              <a:ext uri="{BEBA8EAE-BF5A-486C-A8C5-ECC9F3942E4B}">
+                <a14:imgProps xmlns:a14="http://schemas.microsoft.com/office/drawing/2010/main">
+                  <a14:imgLayer r:embed="rId3">
+                    <a14:imgEffect>
+                      <a14:backgroundRemoval t="38187" b="56868" l="31259" r="42533">
+                        <a14:foregroundMark x1="37042" y1="43544" x2="37042" y2="43544"/>
+                      </a14:backgroundRemoval>
+                    </a14:imgEffect>
+                  </a14:imgLayer>
+                </a14:imgProps>
+              </a:ext>
+            </a:extLst>
+          </a:blip>
+          <a:srcRect l="31630" t="38222" r="57392" b="43371"/>
+          <a:stretch/>
+        </p:blipFill>
+        <p:spPr>
+          <a:xfrm>
+            <a:off x="9597886" y="3161609"/>
+            <a:ext cx="1338470" cy="1196009"/>
+          </a:xfrm>
+          <a:prstGeom prst="rect">
+            <a:avLst/>
+          </a:prstGeom>
+        </p:spPr>
+      </p:pic>
+      <p:sp>
+        <p:nvSpPr>
+          <p:cNvPr id="3" name="CuadroTexto 2">
+            <a:extLst>
+              <a:ext uri="{FF2B5EF4-FFF2-40B4-BE49-F238E27FC236}">
+                <a16:creationId xmlns:a16="http://schemas.microsoft.com/office/drawing/2014/main" id="{8A49B418-25BE-484D-811D-F7FE21C72C35}"/>
               </a:ext>
             </a:extLst>
           </p:cNvPr>
@@ -7733,8 +8518,8 @@
         </p:nvSpPr>
         <p:spPr>
           <a:xfrm>
-            <a:off x="5088835" y="636104"/>
-            <a:ext cx="1750800" cy="677108"/>
+            <a:off x="1142999" y="299824"/>
+            <a:ext cx="10416209" cy="5293757"/>
           </a:xfrm>
           <a:prstGeom prst="rect">
             <a:avLst/>
@@ -7742,63 +8527,248 @@
           <a:noFill/>
         </p:spPr>
         <p:txBody>
-          <a:bodyPr wrap="none" rtlCol="0">
-            <a:spAutoFit/>
-          </a:bodyPr>
-          <a:lstStyle/>
-          <a:p>
-            <a:r>
-              <a:rPr lang="es-MX" sz="2000" b="1" dirty="0">
-                <a:latin typeface="Arial" panose="020B0604020202020204" pitchFamily="34" charset="0"/>
-                <a:cs typeface="Arial" panose="020B0604020202020204" pitchFamily="34" charset="0"/>
-              </a:rPr>
-              <a:t>Justificación</a:t>
-            </a:r>
-          </a:p>
-          <a:p>
-            <a:endParaRPr lang="es-MX" dirty="0"/>
-          </a:p>
-        </p:txBody>
-      </p:sp>
-      <p:sp>
-        <p:nvSpPr>
-          <p:cNvPr id="3" name="CuadroTexto 2">
-            <a:extLst>
-              <a:ext uri="{FF2B5EF4-FFF2-40B4-BE49-F238E27FC236}">
-                <a16:creationId xmlns:a16="http://schemas.microsoft.com/office/drawing/2014/main" id="{C7E7C02F-835A-468A-B69F-C200520CEC10}"/>
-              </a:ext>
-            </a:extLst>
-          </p:cNvPr>
-          <p:cNvSpPr txBox="1"/>
-          <p:nvPr/>
-        </p:nvSpPr>
-        <p:spPr>
-          <a:xfrm>
-            <a:off x="1318591" y="1768591"/>
-            <a:ext cx="8792818" cy="2878224"/>
-          </a:xfrm>
-          <a:prstGeom prst="rect">
-            <a:avLst/>
-          </a:prstGeom>
-          <a:noFill/>
-        </p:spPr>
-        <p:txBody>
           <a:bodyPr wrap="square">
             <a:spAutoFit/>
           </a:bodyPr>
           <a:lstStyle/>
           <a:p>
-            <a:r>
-              <a:rPr lang="es-MX" sz="1600" b="0" i="0" dirty="0">
+            <a:pPr algn="just">
+              <a:lnSpc>
+                <a:spcPct val="150000"/>
+              </a:lnSpc>
+              <a:spcBef>
+                <a:spcPts val="1400"/>
+              </a:spcBef>
+              <a:spcAft>
+                <a:spcPts val="400"/>
+              </a:spcAft>
+            </a:pPr>
+            <a:r>
+              <a:rPr lang="es-MX" sz="2000" b="1" dirty="0">
                 <a:solidFill>
-                  <a:srgbClr val="1D1C1D"/>
+                  <a:srgbClr val="000000"/>
                 </a:solidFill>
                 <a:effectLst/>
                 <a:latin typeface="Arial" panose="020B0604020202020204" pitchFamily="34" charset="0"/>
+                <a:ea typeface="Times New Roman" panose="02020603050405020304" pitchFamily="18" charset="0"/>
                 <a:cs typeface="Arial" panose="020B0604020202020204" pitchFamily="34" charset="0"/>
               </a:rPr>
-              <a:t>Problemas en Farmacias GI:</a:t>
-            </a:r>
+              <a:t>Alcances</a:t>
+            </a:r>
+            <a:endParaRPr lang="es-MX" dirty="0">
+              <a:effectLst/>
+              <a:latin typeface="Arial" panose="020B0604020202020204" pitchFamily="34" charset="0"/>
+              <a:ea typeface="Calibri" panose="020F0502020204030204" pitchFamily="34" charset="0"/>
+              <a:cs typeface="Arial" panose="020B0604020202020204" pitchFamily="34" charset="0"/>
+            </a:endParaRPr>
+          </a:p>
+          <a:p>
+            <a:pPr marL="285750" lvl="0" indent="-285750" algn="just">
+              <a:lnSpc>
+                <a:spcPct val="150000"/>
+              </a:lnSpc>
+              <a:spcAft>
+                <a:spcPts val="400"/>
+              </a:spcAft>
+              <a:buFont typeface="Arial" panose="020B0604020202020204" pitchFamily="34" charset="0"/>
+              <a:buChar char="•"/>
+            </a:pPr>
+            <a:r>
+              <a:rPr lang="es-MX" u="none" strike="noStrike" dirty="0">
+                <a:effectLst/>
+                <a:latin typeface="Arial" panose="020B0604020202020204" pitchFamily="34" charset="0"/>
+                <a:ea typeface="Times New Roman" panose="02020603050405020304" pitchFamily="18" charset="0"/>
+                <a:cs typeface="Arial" panose="020B0604020202020204" pitchFamily="34" charset="0"/>
+              </a:rPr>
+              <a:t>El sistema administrará el inventario de las sucursales de Farmacias GI.</a:t>
+            </a:r>
+            <a:endParaRPr lang="es-MX" u="none" strike="noStrike" dirty="0">
+              <a:effectLst/>
+              <a:latin typeface="Arial" panose="020B0604020202020204" pitchFamily="34" charset="0"/>
+              <a:ea typeface="Calibri" panose="020F0502020204030204" pitchFamily="34" charset="0"/>
+              <a:cs typeface="Arial" panose="020B0604020202020204" pitchFamily="34" charset="0"/>
+            </a:endParaRPr>
+          </a:p>
+          <a:p>
+            <a:pPr marL="285750" lvl="0" indent="-285750" algn="just">
+              <a:lnSpc>
+                <a:spcPct val="150000"/>
+              </a:lnSpc>
+              <a:spcAft>
+                <a:spcPts val="400"/>
+              </a:spcAft>
+              <a:buFont typeface="Arial" panose="020B0604020202020204" pitchFamily="34" charset="0"/>
+              <a:buChar char="•"/>
+            </a:pPr>
+            <a:r>
+              <a:rPr lang="es-MX" u="none" strike="noStrike" dirty="0">
+                <a:effectLst/>
+                <a:latin typeface="Arial" panose="020B0604020202020204" pitchFamily="34" charset="0"/>
+                <a:ea typeface="Times New Roman" panose="02020603050405020304" pitchFamily="18" charset="0"/>
+                <a:cs typeface="Arial" panose="020B0604020202020204" pitchFamily="34" charset="0"/>
+              </a:rPr>
+              <a:t>El sistema controlará la compra-venta de los productos.</a:t>
+            </a:r>
+            <a:endParaRPr lang="es-MX" u="none" strike="noStrike" dirty="0">
+              <a:effectLst/>
+              <a:latin typeface="Arial" panose="020B0604020202020204" pitchFamily="34" charset="0"/>
+              <a:ea typeface="Calibri" panose="020F0502020204030204" pitchFamily="34" charset="0"/>
+              <a:cs typeface="Arial" panose="020B0604020202020204" pitchFamily="34" charset="0"/>
+            </a:endParaRPr>
+          </a:p>
+          <a:p>
+            <a:pPr marL="285750" lvl="0" indent="-285750" algn="just">
+              <a:lnSpc>
+                <a:spcPct val="150000"/>
+              </a:lnSpc>
+              <a:spcAft>
+                <a:spcPts val="400"/>
+              </a:spcAft>
+              <a:buFont typeface="Arial" panose="020B0604020202020204" pitchFamily="34" charset="0"/>
+              <a:buChar char="•"/>
+            </a:pPr>
+            <a:r>
+              <a:rPr lang="es-MX" u="none" strike="noStrike" dirty="0">
+                <a:effectLst/>
+                <a:latin typeface="Arial" panose="020B0604020202020204" pitchFamily="34" charset="0"/>
+                <a:ea typeface="Times New Roman" panose="02020603050405020304" pitchFamily="18" charset="0"/>
+                <a:cs typeface="Arial" panose="020B0604020202020204" pitchFamily="34" charset="0"/>
+              </a:rPr>
+              <a:t>El sistema hará un control de inventario rápido.</a:t>
+            </a:r>
+          </a:p>
+          <a:p>
+            <a:pPr marL="285750" lvl="0" indent="-285750" algn="just">
+              <a:lnSpc>
+                <a:spcPct val="150000"/>
+              </a:lnSpc>
+              <a:spcAft>
+                <a:spcPts val="400"/>
+              </a:spcAft>
+              <a:buFont typeface="Arial" panose="020B0604020202020204" pitchFamily="34" charset="0"/>
+              <a:buChar char="•"/>
+            </a:pPr>
+            <a:endParaRPr lang="es-MX" u="none" strike="noStrike" dirty="0">
+              <a:effectLst/>
+              <a:latin typeface="Arial" panose="020B0604020202020204" pitchFamily="34" charset="0"/>
+              <a:ea typeface="Calibri" panose="020F0502020204030204" pitchFamily="34" charset="0"/>
+              <a:cs typeface="Arial" panose="020B0604020202020204" pitchFamily="34" charset="0"/>
+            </a:endParaRPr>
+          </a:p>
+          <a:p>
+            <a:pPr algn="just">
+              <a:lnSpc>
+                <a:spcPct val="150000"/>
+              </a:lnSpc>
+              <a:spcBef>
+                <a:spcPts val="1400"/>
+              </a:spcBef>
+              <a:spcAft>
+                <a:spcPts val="400"/>
+              </a:spcAft>
+            </a:pPr>
+            <a:r>
+              <a:rPr lang="es-MX" sz="2000" b="1" dirty="0">
+                <a:solidFill>
+                  <a:srgbClr val="000000"/>
+                </a:solidFill>
+                <a:effectLst/>
+                <a:latin typeface="Arial" panose="020B0604020202020204" pitchFamily="34" charset="0"/>
+                <a:ea typeface="Times New Roman" panose="02020603050405020304" pitchFamily="18" charset="0"/>
+                <a:cs typeface="Arial" panose="020B0604020202020204" pitchFamily="34" charset="0"/>
+              </a:rPr>
+              <a:t>Limitaciones</a:t>
+            </a:r>
+            <a:r>
+              <a:rPr lang="es-MX" b="1" dirty="0">
+                <a:solidFill>
+                  <a:srgbClr val="000000"/>
+                </a:solidFill>
+                <a:effectLst/>
+                <a:latin typeface="Arial" panose="020B0604020202020204" pitchFamily="34" charset="0"/>
+                <a:ea typeface="Times New Roman" panose="02020603050405020304" pitchFamily="18" charset="0"/>
+                <a:cs typeface="Arial" panose="020B0604020202020204" pitchFamily="34" charset="0"/>
+              </a:rPr>
+              <a:t>	</a:t>
+            </a:r>
+            <a:endParaRPr lang="es-MX" dirty="0">
+              <a:effectLst/>
+              <a:latin typeface="Arial" panose="020B0604020202020204" pitchFamily="34" charset="0"/>
+              <a:ea typeface="Calibri" panose="020F0502020204030204" pitchFamily="34" charset="0"/>
+              <a:cs typeface="Arial" panose="020B0604020202020204" pitchFamily="34" charset="0"/>
+            </a:endParaRPr>
+          </a:p>
+          <a:p>
+            <a:pPr marL="285750" lvl="0" indent="-285750" algn="just">
+              <a:lnSpc>
+                <a:spcPct val="150000"/>
+              </a:lnSpc>
+              <a:spcAft>
+                <a:spcPts val="400"/>
+              </a:spcAft>
+              <a:buFont typeface="Arial" panose="020B0604020202020204" pitchFamily="34" charset="0"/>
+              <a:buChar char="•"/>
+            </a:pPr>
+            <a:r>
+              <a:rPr lang="es-MX" u="none" strike="noStrike" dirty="0">
+                <a:effectLst/>
+                <a:latin typeface="Arial" panose="020B0604020202020204" pitchFamily="34" charset="0"/>
+                <a:ea typeface="Times New Roman" panose="02020603050405020304" pitchFamily="18" charset="0"/>
+                <a:cs typeface="Arial" panose="020B0604020202020204" pitchFamily="34" charset="0"/>
+              </a:rPr>
+              <a:t>El </a:t>
+            </a:r>
+            <a:r>
+              <a:rPr lang="es-MX" u="none" strike="noStrike" dirty="0" err="1">
+                <a:effectLst/>
+                <a:latin typeface="Arial" panose="020B0604020202020204" pitchFamily="34" charset="0"/>
+                <a:ea typeface="Times New Roman" panose="02020603050405020304" pitchFamily="18" charset="0"/>
+                <a:cs typeface="Arial" panose="020B0604020202020204" pitchFamily="34" charset="0"/>
+              </a:rPr>
+              <a:t>ecommerce</a:t>
+            </a:r>
+            <a:r>
+              <a:rPr lang="es-MX" u="none" strike="noStrike" dirty="0">
+                <a:effectLst/>
+                <a:latin typeface="Arial" panose="020B0604020202020204" pitchFamily="34" charset="0"/>
+                <a:ea typeface="Times New Roman" panose="02020603050405020304" pitchFamily="18" charset="0"/>
+                <a:cs typeface="Arial" panose="020B0604020202020204" pitchFamily="34" charset="0"/>
+              </a:rPr>
+              <a:t> sólo podrá realizar ventas en Zimatlán de Álvarez, Oaxaca. </a:t>
+            </a:r>
+            <a:endParaRPr lang="es-MX" u="none" strike="noStrike" dirty="0">
+              <a:effectLst/>
+              <a:latin typeface="Arial" panose="020B0604020202020204" pitchFamily="34" charset="0"/>
+              <a:ea typeface="Calibri" panose="020F0502020204030204" pitchFamily="34" charset="0"/>
+              <a:cs typeface="Arial" panose="020B0604020202020204" pitchFamily="34" charset="0"/>
+            </a:endParaRPr>
+          </a:p>
+          <a:p>
+            <a:pPr marL="285750" lvl="0" indent="-285750" algn="just">
+              <a:lnSpc>
+                <a:spcPct val="150000"/>
+              </a:lnSpc>
+              <a:spcAft>
+                <a:spcPts val="400"/>
+              </a:spcAft>
+              <a:buFont typeface="Arial" panose="020B0604020202020204" pitchFamily="34" charset="0"/>
+              <a:buChar char="•"/>
+            </a:pPr>
+            <a:r>
+              <a:rPr lang="es-MX" u="none" strike="noStrike" dirty="0">
+                <a:effectLst/>
+                <a:latin typeface="Arial" panose="020B0604020202020204" pitchFamily="34" charset="0"/>
+                <a:ea typeface="Times New Roman" panose="02020603050405020304" pitchFamily="18" charset="0"/>
+                <a:cs typeface="Arial" panose="020B0604020202020204" pitchFamily="34" charset="0"/>
+              </a:rPr>
+              <a:t>El sistema va a estar limitado a las reglas del negocio de Farmacias Gi.</a:t>
+            </a:r>
+            <a:endParaRPr lang="es-MX" u="none" strike="noStrike" dirty="0">
+              <a:effectLst/>
+              <a:latin typeface="Arial" panose="020B0604020202020204" pitchFamily="34" charset="0"/>
+              <a:ea typeface="Calibri" panose="020F0502020204030204" pitchFamily="34" charset="0"/>
+              <a:cs typeface="Arial" panose="020B0604020202020204" pitchFamily="34" charset="0"/>
+            </a:endParaRPr>
           </a:p>
           <a:p>
             <a:pPr marL="285750" indent="-285750">
@@ -7809,157 +8779,107 @@
               <a:buChar char="•"/>
             </a:pPr>
             <a:r>
-              <a:rPr lang="es-MX" sz="1600" b="0" i="0" dirty="0">
-                <a:solidFill>
-                  <a:srgbClr val="1D1C1D"/>
-                </a:solidFill>
+              <a:rPr lang="es-MX" dirty="0">
                 <a:effectLst/>
                 <a:latin typeface="Arial" panose="020B0604020202020204" pitchFamily="34" charset="0"/>
+                <a:ea typeface="Times New Roman" panose="02020603050405020304" pitchFamily="18" charset="0"/>
                 <a:cs typeface="Arial" panose="020B0604020202020204" pitchFamily="34" charset="0"/>
               </a:rPr>
-              <a:t>Código único para las acciones del empleado</a:t>
-            </a:r>
-          </a:p>
-          <a:p>
-            <a:pPr marL="285750" indent="-285750">
-              <a:lnSpc>
-                <a:spcPct val="150000"/>
-              </a:lnSpc>
-              <a:buFont typeface="Arial" panose="020B0604020202020204" pitchFamily="34" charset="0"/>
-              <a:buChar char="•"/>
-            </a:pPr>
-            <a:r>
-              <a:rPr lang="es-MX" sz="1600" b="0" i="0" dirty="0">
-                <a:solidFill>
-                  <a:srgbClr val="1D1C1D"/>
-                </a:solidFill>
+              <a:t>El </a:t>
+            </a:r>
+            <a:r>
+              <a:rPr lang="es-MX" dirty="0" err="1">
                 <a:effectLst/>
                 <a:latin typeface="Arial" panose="020B0604020202020204" pitchFamily="34" charset="0"/>
+                <a:ea typeface="Times New Roman" panose="02020603050405020304" pitchFamily="18" charset="0"/>
                 <a:cs typeface="Arial" panose="020B0604020202020204" pitchFamily="34" charset="0"/>
               </a:rPr>
-              <a:t>inventario intermedio para clientes con línea de crédito</a:t>
-            </a:r>
-          </a:p>
-          <a:p>
-            <a:pPr marL="285750" indent="-285750">
-              <a:lnSpc>
-                <a:spcPct val="150000"/>
-              </a:lnSpc>
-              <a:buFont typeface="Arial" panose="020B0604020202020204" pitchFamily="34" charset="0"/>
-              <a:buChar char="•"/>
-            </a:pPr>
-            <a:r>
-              <a:rPr lang="es-MX" sz="1600" b="0" i="0" dirty="0">
-                <a:solidFill>
-                  <a:srgbClr val="1D1C1D"/>
-                </a:solidFill>
+              <a:t>ecommerce</a:t>
+            </a:r>
+            <a:r>
+              <a:rPr lang="es-MX" dirty="0">
                 <a:effectLst/>
                 <a:latin typeface="Arial" panose="020B0604020202020204" pitchFamily="34" charset="0"/>
+                <a:ea typeface="Times New Roman" panose="02020603050405020304" pitchFamily="18" charset="0"/>
                 <a:cs typeface="Arial" panose="020B0604020202020204" pitchFamily="34" charset="0"/>
               </a:rPr>
-              <a:t>Notificación automática de la existencia de los productos</a:t>
-            </a:r>
-          </a:p>
-          <a:p>
-            <a:pPr marL="285750" indent="-285750">
-              <a:lnSpc>
-                <a:spcPct val="150000"/>
-              </a:lnSpc>
-              <a:buFont typeface="Arial" panose="020B0604020202020204" pitchFamily="34" charset="0"/>
-              <a:buChar char="•"/>
-            </a:pPr>
-            <a:r>
-              <a:rPr lang="es-MX" sz="1600" b="0" i="0" dirty="0">
-                <a:solidFill>
-                  <a:srgbClr val="1D1C1D"/>
-                </a:solidFill>
-                <a:effectLst/>
-                <a:latin typeface="Arial" panose="020B0604020202020204" pitchFamily="34" charset="0"/>
-                <a:cs typeface="Arial" panose="020B0604020202020204" pitchFamily="34" charset="0"/>
-              </a:rPr>
-              <a:t>Notificación automática de caducidad de los productos</a:t>
-            </a:r>
-          </a:p>
-          <a:p>
-            <a:pPr marL="285750" indent="-285750">
-              <a:lnSpc>
-                <a:spcPct val="150000"/>
-              </a:lnSpc>
-              <a:buFont typeface="Arial" panose="020B0604020202020204" pitchFamily="34" charset="0"/>
-              <a:buChar char="•"/>
-            </a:pPr>
-            <a:r>
-              <a:rPr lang="es-MX" sz="1600" b="0" i="0" dirty="0">
-                <a:solidFill>
-                  <a:srgbClr val="1D1C1D"/>
-                </a:solidFill>
-                <a:effectLst/>
-                <a:latin typeface="Arial" panose="020B0604020202020204" pitchFamily="34" charset="0"/>
-                <a:cs typeface="Arial" panose="020B0604020202020204" pitchFamily="34" charset="0"/>
-              </a:rPr>
-              <a:t>Modulo de compras</a:t>
-            </a:r>
-          </a:p>
-          <a:p>
-            <a:pPr marL="285750" indent="-285750">
-              <a:lnSpc>
-                <a:spcPct val="150000"/>
-              </a:lnSpc>
-              <a:buFont typeface="Arial" panose="020B0604020202020204" pitchFamily="34" charset="0"/>
-              <a:buChar char="•"/>
-            </a:pPr>
-            <a:r>
-              <a:rPr lang="es-MX" sz="1600" b="0" i="0" dirty="0">
-                <a:solidFill>
-                  <a:srgbClr val="1D1C1D"/>
-                </a:solidFill>
-                <a:effectLst/>
-                <a:latin typeface="Arial" panose="020B0604020202020204" pitchFamily="34" charset="0"/>
-                <a:cs typeface="Arial" panose="020B0604020202020204" pitchFamily="34" charset="0"/>
-              </a:rPr>
-              <a:t>Modulo de reporte de compra-venta</a:t>
-            </a:r>
-          </a:p>
-          <a:p>
-            <a:pPr marL="285750" indent="-285750">
-              <a:lnSpc>
-                <a:spcPct val="150000"/>
-              </a:lnSpc>
-              <a:buFont typeface="Arial" panose="020B0604020202020204" pitchFamily="34" charset="0"/>
-              <a:buChar char="•"/>
-            </a:pPr>
-            <a:r>
-              <a:rPr lang="es-MX" sz="1600" b="0" i="0" dirty="0" err="1">
-                <a:solidFill>
-                  <a:srgbClr val="1D1C1D"/>
-                </a:solidFill>
-                <a:effectLst/>
-                <a:latin typeface="Arial" panose="020B0604020202020204" pitchFamily="34" charset="0"/>
-                <a:cs typeface="Arial" panose="020B0604020202020204" pitchFamily="34" charset="0"/>
-              </a:rPr>
-              <a:t>Ecommerce</a:t>
-            </a:r>
-            <a:endParaRPr lang="es-MX" sz="1600" b="0" i="0" dirty="0">
-              <a:solidFill>
-                <a:srgbClr val="1D1C1D"/>
-              </a:solidFill>
-              <a:effectLst/>
+              <a:t> solo aceptará  dos métodos de pagos: por medio de PayPal y en efectivo cuando le entreguen el producto en su domicilio mencionando que este último sólo será válido en Zimatlán de Álvarez.</a:t>
+            </a:r>
+            <a:endParaRPr lang="es-MX" dirty="0">
               <a:latin typeface="Arial" panose="020B0604020202020204" pitchFamily="34" charset="0"/>
               <a:cs typeface="Arial" panose="020B0604020202020204" pitchFamily="34" charset="0"/>
             </a:endParaRPr>
           </a:p>
         </p:txBody>
       </p:sp>
+      <p:pic>
+        <p:nvPicPr>
+          <p:cNvPr id="4" name="Imagen 3">
+            <a:extLst>
+              <a:ext uri="{FF2B5EF4-FFF2-40B4-BE49-F238E27FC236}">
+                <a16:creationId xmlns:a16="http://schemas.microsoft.com/office/drawing/2014/main" id="{82CD3153-1025-499B-B8F7-BA87A1FB73CC}"/>
+              </a:ext>
+            </a:extLst>
+          </p:cNvPr>
+          <p:cNvPicPr>
+            <a:picLocks noChangeAspect="1"/>
+          </p:cNvPicPr>
+          <p:nvPr/>
+        </p:nvPicPr>
+        <p:blipFill rotWithShape="1">
+          <a:blip r:embed="rId4"/>
+          <a:srcRect l="21848" t="28840" r="47608" b="25475"/>
+          <a:stretch/>
+        </p:blipFill>
+        <p:spPr>
+          <a:xfrm>
+            <a:off x="8878955" y="578119"/>
+            <a:ext cx="2292628" cy="1827576"/>
+          </a:xfrm>
+          <a:prstGeom prst="rect">
+            <a:avLst/>
+          </a:prstGeom>
+          <a:ln>
+            <a:noFill/>
+          </a:ln>
+          <a:effectLst>
+            <a:reflection blurRad="12700" stA="30000" endPos="30000" dist="5000" dir="5400000" sy="-100000" algn="bl" rotWithShape="0"/>
+          </a:effectLst>
+          <a:scene3d>
+            <a:camera prst="perspectiveContrastingLeftFacing">
+              <a:rot lat="300000" lon="19800000" rev="0"/>
+            </a:camera>
+            <a:lightRig rig="threePt" dir="t">
+              <a:rot lat="0" lon="0" rev="2700000"/>
+            </a:lightRig>
+          </a:scene3d>
+          <a:sp3d>
+            <a:bevelT w="63500" h="50800"/>
+          </a:sp3d>
+        </p:spPr>
+      </p:pic>
     </p:spTree>
     <p:extLst>
       <p:ext uri="{BB962C8B-B14F-4D97-AF65-F5344CB8AC3E}">
-        <p14:creationId xmlns:p14="http://schemas.microsoft.com/office/powerpoint/2010/main" val="461370616"/>
+        <p14:creationId xmlns:p14="http://schemas.microsoft.com/office/powerpoint/2010/main" val="4103274064"/>
       </p:ext>
     </p:extLst>
   </p:cSld>
   <p:clrMapOvr>
     <a:masterClrMapping/>
   </p:clrMapOvr>
+  <mc:AlternateContent xmlns:mc="http://schemas.openxmlformats.org/markup-compatibility/2006">
+    <mc:Choice xmlns:p14="http://schemas.microsoft.com/office/powerpoint/2010/main" Requires="p14">
+      <p:transition spd="slow" p14:dur="1500">
+        <p:random/>
+      </p:transition>
+    </mc:Choice>
+    <mc:Fallback>
+      <p:transition spd="slow">
+        <p:random/>
+      </p:transition>
+    </mc:Fallback>
+  </mc:AlternateContent>
 </p:sld>
 </file>
 
@@ -7982,332 +8902,6 @@
       </p:grpSpPr>
       <p:sp>
         <p:nvSpPr>
-          <p:cNvPr id="3" name="CuadroTexto 2">
-            <a:extLst>
-              <a:ext uri="{FF2B5EF4-FFF2-40B4-BE49-F238E27FC236}">
-                <a16:creationId xmlns:a16="http://schemas.microsoft.com/office/drawing/2014/main" id="{8A49B418-25BE-484D-811D-F7FE21C72C35}"/>
-              </a:ext>
-            </a:extLst>
-          </p:cNvPr>
-          <p:cNvSpPr txBox="1"/>
-          <p:nvPr/>
-        </p:nvSpPr>
-        <p:spPr>
-          <a:xfrm>
-            <a:off x="622852" y="578119"/>
-            <a:ext cx="10416209" cy="4093941"/>
-          </a:xfrm>
-          <a:prstGeom prst="rect">
-            <a:avLst/>
-          </a:prstGeom>
-          <a:noFill/>
-        </p:spPr>
-        <p:txBody>
-          <a:bodyPr wrap="square">
-            <a:spAutoFit/>
-          </a:bodyPr>
-          <a:lstStyle/>
-          <a:p>
-            <a:pPr algn="just">
-              <a:lnSpc>
-                <a:spcPct val="150000"/>
-              </a:lnSpc>
-              <a:spcBef>
-                <a:spcPts val="1400"/>
-              </a:spcBef>
-              <a:spcAft>
-                <a:spcPts val="400"/>
-              </a:spcAft>
-            </a:pPr>
-            <a:r>
-              <a:rPr lang="es-MX" sz="2000" b="1" dirty="0">
-                <a:solidFill>
-                  <a:srgbClr val="000000"/>
-                </a:solidFill>
-                <a:effectLst/>
-                <a:latin typeface="Arial" panose="020B0604020202020204" pitchFamily="34" charset="0"/>
-                <a:ea typeface="Times New Roman" panose="02020603050405020304" pitchFamily="18" charset="0"/>
-                <a:cs typeface="Arial" panose="020B0604020202020204" pitchFamily="34" charset="0"/>
-              </a:rPr>
-              <a:t>Alcances</a:t>
-            </a:r>
-            <a:endParaRPr lang="es-MX" dirty="0">
-              <a:effectLst/>
-              <a:latin typeface="Arial" panose="020B0604020202020204" pitchFamily="34" charset="0"/>
-              <a:ea typeface="Calibri" panose="020F0502020204030204" pitchFamily="34" charset="0"/>
-              <a:cs typeface="Arial" panose="020B0604020202020204" pitchFamily="34" charset="0"/>
-            </a:endParaRPr>
-          </a:p>
-          <a:p>
-            <a:pPr marL="285750" lvl="0" indent="-285750" algn="just">
-              <a:lnSpc>
-                <a:spcPct val="150000"/>
-              </a:lnSpc>
-              <a:spcAft>
-                <a:spcPts val="400"/>
-              </a:spcAft>
-              <a:buFont typeface="Arial" panose="020B0604020202020204" pitchFamily="34" charset="0"/>
-              <a:buChar char="•"/>
-            </a:pPr>
-            <a:r>
-              <a:rPr lang="es-MX" sz="1600" u="none" strike="noStrike" dirty="0">
-                <a:effectLst/>
-                <a:latin typeface="Arial" panose="020B0604020202020204" pitchFamily="34" charset="0"/>
-                <a:ea typeface="Times New Roman" panose="02020603050405020304" pitchFamily="18" charset="0"/>
-                <a:cs typeface="Arial" panose="020B0604020202020204" pitchFamily="34" charset="0"/>
-              </a:rPr>
-              <a:t>El sistema administrará el inventario de las sucursales de Farmacias GI.</a:t>
-            </a:r>
-            <a:endParaRPr lang="es-MX" sz="1600" u="none" strike="noStrike" dirty="0">
-              <a:effectLst/>
-              <a:latin typeface="Arial" panose="020B0604020202020204" pitchFamily="34" charset="0"/>
-              <a:ea typeface="Calibri" panose="020F0502020204030204" pitchFamily="34" charset="0"/>
-              <a:cs typeface="Arial" panose="020B0604020202020204" pitchFamily="34" charset="0"/>
-            </a:endParaRPr>
-          </a:p>
-          <a:p>
-            <a:pPr marL="285750" lvl="0" indent="-285750" algn="just">
-              <a:lnSpc>
-                <a:spcPct val="150000"/>
-              </a:lnSpc>
-              <a:spcAft>
-                <a:spcPts val="400"/>
-              </a:spcAft>
-              <a:buFont typeface="Arial" panose="020B0604020202020204" pitchFamily="34" charset="0"/>
-              <a:buChar char="•"/>
-            </a:pPr>
-            <a:r>
-              <a:rPr lang="es-MX" sz="1600" u="none" strike="noStrike" dirty="0">
-                <a:effectLst/>
-                <a:latin typeface="Arial" panose="020B0604020202020204" pitchFamily="34" charset="0"/>
-                <a:ea typeface="Times New Roman" panose="02020603050405020304" pitchFamily="18" charset="0"/>
-                <a:cs typeface="Arial" panose="020B0604020202020204" pitchFamily="34" charset="0"/>
-              </a:rPr>
-              <a:t>El sistema controlará la compra-venta de los productos.</a:t>
-            </a:r>
-            <a:endParaRPr lang="es-MX" sz="1600" u="none" strike="noStrike" dirty="0">
-              <a:effectLst/>
-              <a:latin typeface="Arial" panose="020B0604020202020204" pitchFamily="34" charset="0"/>
-              <a:ea typeface="Calibri" panose="020F0502020204030204" pitchFamily="34" charset="0"/>
-              <a:cs typeface="Arial" panose="020B0604020202020204" pitchFamily="34" charset="0"/>
-            </a:endParaRPr>
-          </a:p>
-          <a:p>
-            <a:pPr marL="285750" lvl="0" indent="-285750" algn="just">
-              <a:lnSpc>
-                <a:spcPct val="150000"/>
-              </a:lnSpc>
-              <a:spcAft>
-                <a:spcPts val="400"/>
-              </a:spcAft>
-              <a:buFont typeface="Arial" panose="020B0604020202020204" pitchFamily="34" charset="0"/>
-              <a:buChar char="•"/>
-            </a:pPr>
-            <a:r>
-              <a:rPr lang="es-MX" sz="1600" u="none" strike="noStrike" dirty="0">
-                <a:effectLst/>
-                <a:latin typeface="Arial" panose="020B0604020202020204" pitchFamily="34" charset="0"/>
-                <a:ea typeface="Times New Roman" panose="02020603050405020304" pitchFamily="18" charset="0"/>
-                <a:cs typeface="Arial" panose="020B0604020202020204" pitchFamily="34" charset="0"/>
-              </a:rPr>
-              <a:t>El sistema hará un control de inventario rápido.</a:t>
-            </a:r>
-            <a:endParaRPr lang="es-MX" sz="1600" u="none" strike="noStrike" dirty="0">
-              <a:effectLst/>
-              <a:latin typeface="Arial" panose="020B0604020202020204" pitchFamily="34" charset="0"/>
-              <a:ea typeface="Calibri" panose="020F0502020204030204" pitchFamily="34" charset="0"/>
-              <a:cs typeface="Arial" panose="020B0604020202020204" pitchFamily="34" charset="0"/>
-            </a:endParaRPr>
-          </a:p>
-          <a:p>
-            <a:pPr algn="just">
-              <a:lnSpc>
-                <a:spcPct val="150000"/>
-              </a:lnSpc>
-              <a:spcBef>
-                <a:spcPts val="1400"/>
-              </a:spcBef>
-              <a:spcAft>
-                <a:spcPts val="400"/>
-              </a:spcAft>
-            </a:pPr>
-            <a:r>
-              <a:rPr lang="es-MX" sz="2000" b="1" dirty="0">
-                <a:solidFill>
-                  <a:srgbClr val="000000"/>
-                </a:solidFill>
-                <a:effectLst/>
-                <a:latin typeface="Arial" panose="020B0604020202020204" pitchFamily="34" charset="0"/>
-                <a:ea typeface="Times New Roman" panose="02020603050405020304" pitchFamily="18" charset="0"/>
-                <a:cs typeface="Arial" panose="020B0604020202020204" pitchFamily="34" charset="0"/>
-              </a:rPr>
-              <a:t>Limitaciones</a:t>
-            </a:r>
-            <a:r>
-              <a:rPr lang="es-MX" b="1" dirty="0">
-                <a:solidFill>
-                  <a:srgbClr val="000000"/>
-                </a:solidFill>
-                <a:effectLst/>
-                <a:latin typeface="Arial" panose="020B0604020202020204" pitchFamily="34" charset="0"/>
-                <a:ea typeface="Times New Roman" panose="02020603050405020304" pitchFamily="18" charset="0"/>
-                <a:cs typeface="Arial" panose="020B0604020202020204" pitchFamily="34" charset="0"/>
-              </a:rPr>
-              <a:t>	</a:t>
-            </a:r>
-            <a:endParaRPr lang="es-MX" dirty="0">
-              <a:effectLst/>
-              <a:latin typeface="Arial" panose="020B0604020202020204" pitchFamily="34" charset="0"/>
-              <a:ea typeface="Calibri" panose="020F0502020204030204" pitchFamily="34" charset="0"/>
-              <a:cs typeface="Arial" panose="020B0604020202020204" pitchFamily="34" charset="0"/>
-            </a:endParaRPr>
-          </a:p>
-          <a:p>
-            <a:pPr marL="285750" lvl="0" indent="-285750" algn="just">
-              <a:lnSpc>
-                <a:spcPct val="150000"/>
-              </a:lnSpc>
-              <a:spcAft>
-                <a:spcPts val="400"/>
-              </a:spcAft>
-              <a:buFont typeface="Arial" panose="020B0604020202020204" pitchFamily="34" charset="0"/>
-              <a:buChar char="•"/>
-            </a:pPr>
-            <a:r>
-              <a:rPr lang="es-MX" sz="1600" u="none" strike="noStrike" dirty="0">
-                <a:effectLst/>
-                <a:latin typeface="Arial" panose="020B0604020202020204" pitchFamily="34" charset="0"/>
-                <a:ea typeface="Times New Roman" panose="02020603050405020304" pitchFamily="18" charset="0"/>
-                <a:cs typeface="Arial" panose="020B0604020202020204" pitchFamily="34" charset="0"/>
-              </a:rPr>
-              <a:t>El </a:t>
-            </a:r>
-            <a:r>
-              <a:rPr lang="es-MX" sz="1600" u="none" strike="noStrike" dirty="0" err="1">
-                <a:effectLst/>
-                <a:latin typeface="Arial" panose="020B0604020202020204" pitchFamily="34" charset="0"/>
-                <a:ea typeface="Times New Roman" panose="02020603050405020304" pitchFamily="18" charset="0"/>
-                <a:cs typeface="Arial" panose="020B0604020202020204" pitchFamily="34" charset="0"/>
-              </a:rPr>
-              <a:t>ecommerce</a:t>
-            </a:r>
-            <a:r>
-              <a:rPr lang="es-MX" sz="1600" u="none" strike="noStrike" dirty="0">
-                <a:effectLst/>
-                <a:latin typeface="Arial" panose="020B0604020202020204" pitchFamily="34" charset="0"/>
-                <a:ea typeface="Times New Roman" panose="02020603050405020304" pitchFamily="18" charset="0"/>
-                <a:cs typeface="Arial" panose="020B0604020202020204" pitchFamily="34" charset="0"/>
-              </a:rPr>
-              <a:t> sólo podrá realizar ventas en Zimatlán de Álvarez, Oaxaca. </a:t>
-            </a:r>
-            <a:endParaRPr lang="es-MX" sz="1600" u="none" strike="noStrike" dirty="0">
-              <a:effectLst/>
-              <a:latin typeface="Arial" panose="020B0604020202020204" pitchFamily="34" charset="0"/>
-              <a:ea typeface="Calibri" panose="020F0502020204030204" pitchFamily="34" charset="0"/>
-              <a:cs typeface="Arial" panose="020B0604020202020204" pitchFamily="34" charset="0"/>
-            </a:endParaRPr>
-          </a:p>
-          <a:p>
-            <a:pPr marL="285750" lvl="0" indent="-285750" algn="just">
-              <a:lnSpc>
-                <a:spcPct val="150000"/>
-              </a:lnSpc>
-              <a:spcAft>
-                <a:spcPts val="400"/>
-              </a:spcAft>
-              <a:buFont typeface="Arial" panose="020B0604020202020204" pitchFamily="34" charset="0"/>
-              <a:buChar char="•"/>
-            </a:pPr>
-            <a:r>
-              <a:rPr lang="es-MX" sz="1600" u="none" strike="noStrike" dirty="0">
-                <a:effectLst/>
-                <a:latin typeface="Arial" panose="020B0604020202020204" pitchFamily="34" charset="0"/>
-                <a:ea typeface="Times New Roman" panose="02020603050405020304" pitchFamily="18" charset="0"/>
-                <a:cs typeface="Arial" panose="020B0604020202020204" pitchFamily="34" charset="0"/>
-              </a:rPr>
-              <a:t>El sistema va a estar limitado a las reglas del negocio de Farmacias Gi.</a:t>
-            </a:r>
-            <a:endParaRPr lang="es-MX" sz="1600" u="none" strike="noStrike" dirty="0">
-              <a:effectLst/>
-              <a:latin typeface="Arial" panose="020B0604020202020204" pitchFamily="34" charset="0"/>
-              <a:ea typeface="Calibri" panose="020F0502020204030204" pitchFamily="34" charset="0"/>
-              <a:cs typeface="Arial" panose="020B0604020202020204" pitchFamily="34" charset="0"/>
-            </a:endParaRPr>
-          </a:p>
-          <a:p>
-            <a:pPr marL="285750" indent="-285750">
-              <a:lnSpc>
-                <a:spcPct val="150000"/>
-              </a:lnSpc>
-              <a:buFont typeface="Arial" panose="020B0604020202020204" pitchFamily="34" charset="0"/>
-              <a:buChar char="•"/>
-            </a:pPr>
-            <a:r>
-              <a:rPr lang="es-MX" sz="1600" dirty="0">
-                <a:effectLst/>
-                <a:latin typeface="Arial" panose="020B0604020202020204" pitchFamily="34" charset="0"/>
-                <a:ea typeface="Times New Roman" panose="02020603050405020304" pitchFamily="18" charset="0"/>
-                <a:cs typeface="Arial" panose="020B0604020202020204" pitchFamily="34" charset="0"/>
-              </a:rPr>
-              <a:t>El e-</a:t>
-            </a:r>
-            <a:r>
-              <a:rPr lang="es-MX" sz="1600" dirty="0" err="1">
-                <a:effectLst/>
-                <a:latin typeface="Arial" panose="020B0604020202020204" pitchFamily="34" charset="0"/>
-                <a:ea typeface="Times New Roman" panose="02020603050405020304" pitchFamily="18" charset="0"/>
-                <a:cs typeface="Arial" panose="020B0604020202020204" pitchFamily="34" charset="0"/>
-              </a:rPr>
-              <a:t>commerce</a:t>
-            </a:r>
-            <a:r>
-              <a:rPr lang="es-MX" sz="1600" dirty="0">
-                <a:effectLst/>
-                <a:latin typeface="Arial" panose="020B0604020202020204" pitchFamily="34" charset="0"/>
-                <a:ea typeface="Times New Roman" panose="02020603050405020304" pitchFamily="18" charset="0"/>
-                <a:cs typeface="Arial" panose="020B0604020202020204" pitchFamily="34" charset="0"/>
-              </a:rPr>
-              <a:t> solo aceptará  dos métodos de pagos: por medio de PayPal y en efectivo cuando le entreguen el producto en su domicilio mencionando que este último sólo será válido en Zimatlán de Álvarez.</a:t>
-            </a:r>
-            <a:endParaRPr lang="es-MX" sz="1600" dirty="0">
-              <a:latin typeface="Arial" panose="020B0604020202020204" pitchFamily="34" charset="0"/>
-              <a:cs typeface="Arial" panose="020B0604020202020204" pitchFamily="34" charset="0"/>
-            </a:endParaRPr>
-          </a:p>
-        </p:txBody>
-      </p:sp>
-    </p:spTree>
-    <p:extLst>
-      <p:ext uri="{BB962C8B-B14F-4D97-AF65-F5344CB8AC3E}">
-        <p14:creationId xmlns:p14="http://schemas.microsoft.com/office/powerpoint/2010/main" val="4103274064"/>
-      </p:ext>
-    </p:extLst>
-  </p:cSld>
-  <p:clrMapOvr>
-    <a:masterClrMapping/>
-  </p:clrMapOvr>
-</p:sld>
-</file>
-
-<file path=ppt/slides/slide9.xml><?xml version="1.0" encoding="utf-8"?>
-<p:sld xmlns:a="http://schemas.openxmlformats.org/drawingml/2006/main" xmlns:r="http://schemas.openxmlformats.org/officeDocument/2006/relationships" xmlns:p="http://schemas.openxmlformats.org/presentationml/2006/main">
-  <p:cSld>
-    <p:spTree>
-      <p:nvGrpSpPr>
-        <p:cNvPr id="1" name=""/>
-        <p:cNvGrpSpPr/>
-        <p:nvPr/>
-      </p:nvGrpSpPr>
-      <p:grpSpPr>
-        <a:xfrm>
-          <a:off x="0" y="0"/>
-          <a:ext cx="0" cy="0"/>
-          <a:chOff x="0" y="0"/>
-          <a:chExt cx="0" cy="0"/>
-        </a:xfrm>
-      </p:grpSpPr>
-      <p:sp>
-        <p:nvSpPr>
           <p:cNvPr id="2" name="CuadroTexto 1">
             <a:extLst>
               <a:ext uri="{FF2B5EF4-FFF2-40B4-BE49-F238E27FC236}">
@@ -8320,8 +8914,8 @@
         </p:nvSpPr>
         <p:spPr>
           <a:xfrm>
-            <a:off x="3944609" y="516835"/>
-            <a:ext cx="4302781" cy="400110"/>
+            <a:off x="1713706" y="601112"/>
+            <a:ext cx="4912381" cy="400110"/>
           </a:xfrm>
           <a:prstGeom prst="rect">
             <a:avLst/>
@@ -8329,7 +8923,7 @@
           <a:noFill/>
         </p:spPr>
         <p:txBody>
-          <a:bodyPr wrap="none" rtlCol="0" anchor="ctr">
+          <a:bodyPr wrap="square" rtlCol="0" anchor="ctr">
             <a:spAutoFit/>
           </a:bodyPr>
           <a:lstStyle/>
@@ -8340,7 +8934,21 @@
                 <a:latin typeface="Arial" panose="020B0604020202020204" pitchFamily="34" charset="0"/>
                 <a:cs typeface="Arial" panose="020B0604020202020204" pitchFamily="34" charset="0"/>
               </a:rPr>
-              <a:t> Metodología de desarrollo: SCRUM</a:t>
+              <a:t> </a:t>
+            </a:r>
+            <a:r>
+              <a:rPr lang="es-MX" sz="2000" b="1" dirty="0">
+                <a:latin typeface="Arial" panose="020B0604020202020204" pitchFamily="34" charset="0"/>
+                <a:cs typeface="Arial" panose="020B0604020202020204" pitchFamily="34" charset="0"/>
+              </a:rPr>
+              <a:t>Metodología de desarrollo: </a:t>
+            </a:r>
+            <a:r>
+              <a:rPr lang="es-MX" sz="2000" dirty="0">
+                <a:latin typeface="Arial" panose="020B0604020202020204" pitchFamily="34" charset="0"/>
+                <a:cs typeface="Arial" panose="020B0604020202020204" pitchFamily="34" charset="0"/>
+              </a:rPr>
+              <a:t>SCRUM</a:t>
             </a:r>
           </a:p>
         </p:txBody>
@@ -8359,7 +8967,7 @@
         </p:nvSpPr>
         <p:spPr>
           <a:xfrm>
-            <a:off x="5120411" y="1470992"/>
+            <a:off x="1983287" y="1793389"/>
             <a:ext cx="1951175" cy="400110"/>
           </a:xfrm>
           <a:prstGeom prst="rect">
@@ -8384,8 +8992,12 @@
           </a:lstStyle>
           <a:p>
             <a:r>
+              <a:rPr lang="es-MX" b="1" dirty="0"/>
+              <a:t>SGBD</a:t>
+            </a:r>
+            <a:r>
               <a:rPr lang="es-MX" dirty="0"/>
-              <a:t>SGBD: MYSQL</a:t>
+              <a:t>: MYSQL</a:t>
             </a:r>
           </a:p>
         </p:txBody>
@@ -8404,8 +9016,8 @@
         </p:nvSpPr>
         <p:spPr>
           <a:xfrm>
-            <a:off x="3231976" y="2222333"/>
-            <a:ext cx="5728043" cy="1938992"/>
+            <a:off x="1983287" y="2845185"/>
+            <a:ext cx="5756897" cy="2246769"/>
           </a:xfrm>
           <a:prstGeom prst="rect">
             <a:avLst/>
@@ -8428,14 +9040,16 @@
             </a:lvl1pPr>
           </a:lstStyle>
           <a:p>
-            <a:pPr algn="ctr"/>
-            <a:r>
-              <a:rPr lang="es-MX" dirty="0"/>
+            <a:r>
+              <a:rPr lang="es-MX" b="1" dirty="0"/>
               <a:t>Lenguajes y herramientas de programación:</a:t>
             </a:r>
           </a:p>
           <a:p>
-            <a:pPr marL="342900" indent="-342900" algn="ctr">
+            <a:endParaRPr lang="es-MX" dirty="0"/>
+          </a:p>
+          <a:p>
+            <a:pPr marL="342900" indent="-342900">
               <a:buFont typeface="Arial" panose="020B0604020202020204" pitchFamily="34" charset="0"/>
               <a:buChar char="•"/>
             </a:pPr>
@@ -8450,7 +9064,7 @@
             <a:endParaRPr lang="es-MX" dirty="0"/>
           </a:p>
           <a:p>
-            <a:pPr marL="342900" indent="-342900" algn="ctr">
+            <a:pPr marL="342900" indent="-342900">
               <a:buFont typeface="Arial" panose="020B0604020202020204" pitchFamily="34" charset="0"/>
               <a:buChar char="•"/>
             </a:pPr>
@@ -8465,7 +9079,7 @@
             <a:endParaRPr lang="es-MX" dirty="0"/>
           </a:p>
           <a:p>
-            <a:pPr marL="342900" indent="-342900" algn="ctr">
+            <a:pPr marL="342900" indent="-342900">
               <a:buFont typeface="Arial" panose="020B0604020202020204" pitchFamily="34" charset="0"/>
               <a:buChar char="•"/>
             </a:pPr>
@@ -8475,7 +9089,7 @@
             </a:r>
           </a:p>
           <a:p>
-            <a:pPr marL="342900" indent="-342900" algn="ctr">
+            <a:pPr marL="342900" indent="-342900">
               <a:buFont typeface="Arial" panose="020B0604020202020204" pitchFamily="34" charset="0"/>
               <a:buChar char="•"/>
             </a:pPr>
@@ -8485,37 +9099,146 @@
             </a:r>
           </a:p>
           <a:p>
-            <a:pPr marL="342900" indent="-342900" algn="ctr">
+            <a:pPr marL="342900" indent="-342900">
               <a:buFont typeface="Arial" panose="020B0604020202020204" pitchFamily="34" charset="0"/>
               <a:buChar char="•"/>
             </a:pPr>
             <a:r>
               <a:rPr lang="es-MX" dirty="0"/>
-              <a:t>Visual Studio: </a:t>
-            </a:r>
-            <a:r>
-              <a:rPr lang="es-MX" dirty="0">
+              <a:t>Visual Studio: Entorno de desarrollo integrado</a:t>
+            </a:r>
+          </a:p>
+        </p:txBody>
+      </p:sp>
+      <p:pic>
+        <p:nvPicPr>
+          <p:cNvPr id="3074" name="Picture 2" descr="ᐈ Scrum vector de stock, vectores iconos de scrum | descargar en  Depositphotos®">
+            <a:extLst>
+              <a:ext uri="{FF2B5EF4-FFF2-40B4-BE49-F238E27FC236}">
+                <a16:creationId xmlns:a16="http://schemas.microsoft.com/office/drawing/2014/main" id="{917E6468-52AC-4BA0-B47B-F211203853E0}"/>
+              </a:ext>
+            </a:extLst>
+          </p:cNvPr>
+          <p:cNvPicPr>
+            <a:picLocks noChangeAspect="1" noChangeArrowheads="1"/>
+          </p:cNvPicPr>
+          <p:nvPr/>
+        </p:nvPicPr>
+        <p:blipFill rotWithShape="1">
+          <a:blip r:embed="rId2">
+            <a:extLst>
+              <a:ext uri="{28A0092B-C50C-407E-A947-70E740481C1C}">
+                <a14:useLocalDpi xmlns:a14="http://schemas.microsoft.com/office/drawing/2010/main" val="0"/>
+              </a:ext>
+            </a:extLst>
+          </a:blip>
+          <a:srcRect l="11956" t="9573" r="7826" b="19492"/>
+          <a:stretch/>
+        </p:blipFill>
+        <p:spPr bwMode="auto">
+          <a:xfrm>
+            <a:off x="8004392" y="191054"/>
+            <a:ext cx="3340461" cy="1602335"/>
+          </a:xfrm>
+          <a:prstGeom prst="rect">
+            <a:avLst/>
+          </a:prstGeom>
+          <a:solidFill>
+            <a:srgbClr val="FFFFFF">
+              <a:shade val="85000"/>
+            </a:srgbClr>
+          </a:solidFill>
+          <a:ln w="190500" cap="rnd">
+            <a:solidFill>
+              <a:srgbClr val="FFFFFF"/>
+            </a:solidFill>
+          </a:ln>
+          <a:effectLst>
+            <a:outerShdw blurRad="50000" algn="tl" rotWithShape="0">
+              <a:srgbClr val="000000">
+                <a:alpha val="41000"/>
+              </a:srgbClr>
+            </a:outerShdw>
+          </a:effectLst>
+          <a:scene3d>
+            <a:camera prst="orthographicFront"/>
+            <a:lightRig rig="twoPt" dir="t">
+              <a:rot lat="0" lon="0" rev="7800000"/>
+            </a:lightRig>
+          </a:scene3d>
+          <a:sp3d contourW="6350">
+            <a:bevelT w="50800" h="16510"/>
+            <a:contourClr>
+              <a:srgbClr val="C0C0C0"/>
+            </a:contourClr>
+          </a:sp3d>
+          <a:extLst>
+            <a:ext uri="{909E8E84-426E-40DD-AFC4-6F175D3DCCD1}">
+              <a14:hiddenFill xmlns:a14="http://schemas.microsoft.com/office/drawing/2010/main">
                 <a:solidFill>
-                  <a:srgbClr val="202124"/>
+                  <a:srgbClr val="FFFFFF"/>
                 </a:solidFill>
-                <a:latin typeface="arial" panose="020B0604020202020204" pitchFamily="34" charset="0"/>
-              </a:rPr>
-              <a:t>E</a:t>
-            </a:r>
-            <a:r>
-              <a:rPr lang="es-MX" b="0" i="0" dirty="0">
+              </a14:hiddenFill>
+            </a:ext>
+          </a:extLst>
+        </p:spPr>
+      </p:pic>
+      <p:pic>
+        <p:nvPicPr>
+          <p:cNvPr id="3076" name="Picture 4" descr="Mysql - Iconos gratis de marcas y logotipos">
+            <a:extLst>
+              <a:ext uri="{FF2B5EF4-FFF2-40B4-BE49-F238E27FC236}">
+                <a16:creationId xmlns:a16="http://schemas.microsoft.com/office/drawing/2014/main" id="{7248408E-8099-4F9B-8877-3BD0FB2F19B4}"/>
+              </a:ext>
+            </a:extLst>
+          </p:cNvPr>
+          <p:cNvPicPr>
+            <a:picLocks noChangeAspect="1" noChangeArrowheads="1"/>
+          </p:cNvPicPr>
+          <p:nvPr/>
+        </p:nvPicPr>
+        <p:blipFill>
+          <a:blip r:embed="rId3">
+            <a:extLst>
+              <a:ext uri="{28A0092B-C50C-407E-A947-70E740481C1C}">
+                <a14:useLocalDpi xmlns:a14="http://schemas.microsoft.com/office/drawing/2010/main" val="0"/>
+              </a:ext>
+            </a:extLst>
+          </a:blip>
+          <a:srcRect/>
+          <a:stretch>
+            <a:fillRect/>
+          </a:stretch>
+        </p:blipFill>
+        <p:spPr bwMode="auto">
+          <a:xfrm>
+            <a:off x="5208104" y="1242522"/>
+            <a:ext cx="1152939" cy="1152939"/>
+          </a:xfrm>
+          <a:prstGeom prst="rect">
+            <a:avLst/>
+          </a:prstGeom>
+          <a:ln>
+            <a:noFill/>
+          </a:ln>
+          <a:effectLst>
+            <a:outerShdw blurRad="292100" dist="139700" dir="2700000" algn="tl" rotWithShape="0">
+              <a:srgbClr val="333333">
+                <a:alpha val="65000"/>
+              </a:srgbClr>
+            </a:outerShdw>
+          </a:effectLst>
+          <a:extLst>
+            <a:ext uri="{909E8E84-426E-40DD-AFC4-6F175D3DCCD1}">
+              <a14:hiddenFill xmlns:a14="http://schemas.microsoft.com/office/drawing/2010/main">
                 <a:solidFill>
-                  <a:srgbClr val="202124"/>
+                  <a:srgbClr val="FFFFFF"/>
                 </a:solidFill>
-                <a:effectLst/>
-                <a:latin typeface="arial" panose="020B0604020202020204" pitchFamily="34" charset="0"/>
-              </a:rPr>
-              <a:t>ntorno de desarrollo integrado</a:t>
-            </a:r>
-            <a:endParaRPr lang="es-MX" dirty="0"/>
-          </a:p>
-        </p:txBody>
-      </p:sp>
+              </a14:hiddenFill>
+            </a:ext>
+          </a:extLst>
+        </p:spPr>
+      </p:pic>
     </p:spTree>
     <p:extLst>
       <p:ext uri="{BB962C8B-B14F-4D97-AF65-F5344CB8AC3E}">
@@ -8526,6 +9249,18 @@
   <p:clrMapOvr>
     <a:masterClrMapping/>
   </p:clrMapOvr>
+  <mc:AlternateContent xmlns:mc="http://schemas.openxmlformats.org/markup-compatibility/2006">
+    <mc:Choice xmlns:p14="http://schemas.microsoft.com/office/powerpoint/2010/main" Requires="p14">
+      <p:transition spd="slow" p14:dur="1500">
+        <p:random/>
+      </p:transition>
+    </mc:Choice>
+    <mc:Fallback>
+      <p:transition spd="slow">
+        <p:random/>
+      </p:transition>
+    </mc:Fallback>
+  </mc:AlternateContent>
 </p:sld>
 </file>
 

</xml_diff>

<commit_message>
Ortografía revisada pt1 Presentacion asesor uno
</commit_message>
<xml_diff>
--- a/Presentacion asesor uno.pptx
+++ b/Presentacion asesor uno.pptx
@@ -124,7 +124,7 @@
   <pc:docChgLst>
     <pc:chgData name="adelaida.molinar1997@gmail.com" userId="73a9b2cc98479d66" providerId="LiveId" clId="{2F3BDEE8-1B09-4329-B241-C1265B3CF150}"/>
     <pc:docChg chg="undo custSel addSld delSld modSld sldOrd">
-      <pc:chgData name="adelaida.molinar1997@gmail.com" userId="73a9b2cc98479d66" providerId="LiveId" clId="{2F3BDEE8-1B09-4329-B241-C1265B3CF150}" dt="2020-11-23T19:51:11.232" v="354"/>
+      <pc:chgData name="adelaida.molinar1997@gmail.com" userId="73a9b2cc98479d66" providerId="LiveId" clId="{2F3BDEE8-1B09-4329-B241-C1265B3CF150}" dt="2020-12-04T01:31:33.343" v="364" actId="20577"/>
       <pc:docMkLst>
         <pc:docMk/>
       </pc:docMkLst>
@@ -254,13 +254,13 @@
         </pc:picChg>
       </pc:sldChg>
       <pc:sldChg chg="addSp delSp modSp mod modTransition">
-        <pc:chgData name="adelaida.molinar1997@gmail.com" userId="73a9b2cc98479d66" providerId="LiveId" clId="{2F3BDEE8-1B09-4329-B241-C1265B3CF150}" dt="2020-11-23T19:51:11.232" v="354"/>
+        <pc:chgData name="adelaida.molinar1997@gmail.com" userId="73a9b2cc98479d66" providerId="LiveId" clId="{2F3BDEE8-1B09-4329-B241-C1265B3CF150}" dt="2020-12-04T01:31:33.343" v="364" actId="20577"/>
         <pc:sldMkLst>
           <pc:docMk/>
           <pc:sldMk cId="2937598698" sldId="260"/>
         </pc:sldMkLst>
         <pc:spChg chg="mod">
-          <ac:chgData name="adelaida.molinar1997@gmail.com" userId="73a9b2cc98479d66" providerId="LiveId" clId="{2F3BDEE8-1B09-4329-B241-C1265B3CF150}" dt="2020-11-23T18:48:58.731" v="147" actId="403"/>
+          <ac:chgData name="adelaida.molinar1997@gmail.com" userId="73a9b2cc98479d66" providerId="LiveId" clId="{2F3BDEE8-1B09-4329-B241-C1265B3CF150}" dt="2020-12-04T01:31:33.343" v="364" actId="20577"/>
           <ac:spMkLst>
             <pc:docMk/>
             <pc:sldMk cId="2937598698" sldId="260"/>
@@ -316,13 +316,13 @@
         </pc:picChg>
       </pc:sldChg>
       <pc:sldChg chg="modSp mod modTransition">
-        <pc:chgData name="adelaida.molinar1997@gmail.com" userId="73a9b2cc98479d66" providerId="LiveId" clId="{2F3BDEE8-1B09-4329-B241-C1265B3CF150}" dt="2020-11-23T19:51:11.232" v="354"/>
+        <pc:chgData name="adelaida.molinar1997@gmail.com" userId="73a9b2cc98479d66" providerId="LiveId" clId="{2F3BDEE8-1B09-4329-B241-C1265B3CF150}" dt="2020-12-04T01:29:54.188" v="362" actId="20577"/>
         <pc:sldMkLst>
           <pc:docMk/>
           <pc:sldMk cId="461370616" sldId="262"/>
         </pc:sldMkLst>
         <pc:spChg chg="mod">
-          <ac:chgData name="adelaida.molinar1997@gmail.com" userId="73a9b2cc98479d66" providerId="LiveId" clId="{2F3BDEE8-1B09-4329-B241-C1265B3CF150}" dt="2020-11-23T19:39:02.342" v="321" actId="1076"/>
+          <ac:chgData name="adelaida.molinar1997@gmail.com" userId="73a9b2cc98479d66" providerId="LiveId" clId="{2F3BDEE8-1B09-4329-B241-C1265B3CF150}" dt="2020-12-04T01:29:54.188" v="362" actId="20577"/>
           <ac:spMkLst>
             <pc:docMk/>
             <pc:sldMk cId="461370616" sldId="262"/>
@@ -904,7 +904,7 @@
           <a:p>
             <a:fld id="{F0756DDB-0285-4862-ACCC-DF1BE98EB6DD}" type="datetimeFigureOut">
               <a:rPr lang="es-MX" smtClean="0"/>
-              <a:t>23/11/2020</a:t>
+              <a:t>03/12/2020</a:t>
             </a:fld>
             <a:endParaRPr lang="es-MX"/>
           </a:p>
@@ -1236,7 +1236,7 @@
           <a:p>
             <a:fld id="{F0756DDB-0285-4862-ACCC-DF1BE98EB6DD}" type="datetimeFigureOut">
               <a:rPr lang="es-MX" smtClean="0"/>
-              <a:t>23/11/2020</a:t>
+              <a:t>03/12/2020</a:t>
             </a:fld>
             <a:endParaRPr lang="es-MX"/>
           </a:p>
@@ -1432,7 +1432,7 @@
           <a:p>
             <a:fld id="{F0756DDB-0285-4862-ACCC-DF1BE98EB6DD}" type="datetimeFigureOut">
               <a:rPr lang="es-MX" smtClean="0"/>
-              <a:t>23/11/2020</a:t>
+              <a:t>03/12/2020</a:t>
             </a:fld>
             <a:endParaRPr lang="es-MX"/>
           </a:p>
@@ -1702,7 +1702,7 @@
           <a:p>
             <a:fld id="{F0756DDB-0285-4862-ACCC-DF1BE98EB6DD}" type="datetimeFigureOut">
               <a:rPr lang="es-MX" smtClean="0"/>
-              <a:t>23/11/2020</a:t>
+              <a:t>03/12/2020</a:t>
             </a:fld>
             <a:endParaRPr lang="es-MX"/>
           </a:p>
@@ -2130,7 +2130,7 @@
           <a:p>
             <a:fld id="{F0756DDB-0285-4862-ACCC-DF1BE98EB6DD}" type="datetimeFigureOut">
               <a:rPr lang="es-MX" smtClean="0"/>
-              <a:t>23/11/2020</a:t>
+              <a:t>03/12/2020</a:t>
             </a:fld>
             <a:endParaRPr lang="es-MX"/>
           </a:p>
@@ -2680,7 +2680,7 @@
           <a:p>
             <a:fld id="{F0756DDB-0285-4862-ACCC-DF1BE98EB6DD}" type="datetimeFigureOut">
               <a:rPr lang="es-MX" smtClean="0"/>
-              <a:t>23/11/2020</a:t>
+              <a:t>03/12/2020</a:t>
             </a:fld>
             <a:endParaRPr lang="es-MX"/>
           </a:p>
@@ -3470,7 +3470,7 @@
           <a:p>
             <a:fld id="{F0756DDB-0285-4862-ACCC-DF1BE98EB6DD}" type="datetimeFigureOut">
               <a:rPr lang="es-MX" smtClean="0"/>
-              <a:t>23/11/2020</a:t>
+              <a:t>03/12/2020</a:t>
             </a:fld>
             <a:endParaRPr lang="es-MX"/>
           </a:p>
@@ -3649,7 +3649,7 @@
           <a:p>
             <a:fld id="{F0756DDB-0285-4862-ACCC-DF1BE98EB6DD}" type="datetimeFigureOut">
               <a:rPr lang="es-MX" smtClean="0"/>
-              <a:t>23/11/2020</a:t>
+              <a:t>03/12/2020</a:t>
             </a:fld>
             <a:endParaRPr lang="es-MX"/>
           </a:p>
@@ -3833,7 +3833,7 @@
           <a:p>
             <a:fld id="{F0756DDB-0285-4862-ACCC-DF1BE98EB6DD}" type="datetimeFigureOut">
               <a:rPr lang="es-MX" smtClean="0"/>
-              <a:t>23/11/2020</a:t>
+              <a:t>03/12/2020</a:t>
             </a:fld>
             <a:endParaRPr lang="es-MX"/>
           </a:p>
@@ -4008,7 +4008,7 @@
           <a:p>
             <a:fld id="{F0756DDB-0285-4862-ACCC-DF1BE98EB6DD}" type="datetimeFigureOut">
               <a:rPr lang="es-MX" smtClean="0"/>
-              <a:t>23/11/2020</a:t>
+              <a:t>03/12/2020</a:t>
             </a:fld>
             <a:endParaRPr lang="es-MX"/>
           </a:p>
@@ -4258,7 +4258,7 @@
           <a:p>
             <a:fld id="{F0756DDB-0285-4862-ACCC-DF1BE98EB6DD}" type="datetimeFigureOut">
               <a:rPr lang="es-MX" smtClean="0"/>
-              <a:t>23/11/2020</a:t>
+              <a:t>03/12/2020</a:t>
             </a:fld>
             <a:endParaRPr lang="es-MX"/>
           </a:p>
@@ -4495,7 +4495,7 @@
           <a:p>
             <a:fld id="{F0756DDB-0285-4862-ACCC-DF1BE98EB6DD}" type="datetimeFigureOut">
               <a:rPr lang="es-MX" smtClean="0"/>
-              <a:t>23/11/2020</a:t>
+              <a:t>03/12/2020</a:t>
             </a:fld>
             <a:endParaRPr lang="es-MX"/>
           </a:p>
@@ -4880,7 +4880,7 @@
           <a:p>
             <a:fld id="{F0756DDB-0285-4862-ACCC-DF1BE98EB6DD}" type="datetimeFigureOut">
               <a:rPr lang="es-MX" smtClean="0"/>
-              <a:t>23/11/2020</a:t>
+              <a:t>03/12/2020</a:t>
             </a:fld>
             <a:endParaRPr lang="es-MX"/>
           </a:p>
@@ -4998,7 +4998,7 @@
           <a:p>
             <a:fld id="{F0756DDB-0285-4862-ACCC-DF1BE98EB6DD}" type="datetimeFigureOut">
               <a:rPr lang="es-MX" smtClean="0"/>
-              <a:t>23/11/2020</a:t>
+              <a:t>03/12/2020</a:t>
             </a:fld>
             <a:endParaRPr lang="es-MX"/>
           </a:p>
@@ -5093,7 +5093,7 @@
           <a:p>
             <a:fld id="{F0756DDB-0285-4862-ACCC-DF1BE98EB6DD}" type="datetimeFigureOut">
               <a:rPr lang="es-MX" smtClean="0"/>
-              <a:t>23/11/2020</a:t>
+              <a:t>03/12/2020</a:t>
             </a:fld>
             <a:endParaRPr lang="es-MX"/>
           </a:p>
@@ -5346,7 +5346,7 @@
           <a:p>
             <a:fld id="{F0756DDB-0285-4862-ACCC-DF1BE98EB6DD}" type="datetimeFigureOut">
               <a:rPr lang="es-MX" smtClean="0"/>
-              <a:t>23/11/2020</a:t>
+              <a:t>03/12/2020</a:t>
             </a:fld>
             <a:endParaRPr lang="es-MX"/>
           </a:p>
@@ -5615,7 +5615,7 @@
           <a:p>
             <a:fld id="{F0756DDB-0285-4862-ACCC-DF1BE98EB6DD}" type="datetimeFigureOut">
               <a:rPr lang="es-MX" smtClean="0"/>
-              <a:t>23/11/2020</a:t>
+              <a:t>03/12/2020</a:t>
             </a:fld>
             <a:endParaRPr lang="es-MX"/>
           </a:p>
@@ -6018,7 +6018,7 @@
           <a:p>
             <a:fld id="{F0756DDB-0285-4862-ACCC-DF1BE98EB6DD}" type="datetimeFigureOut">
               <a:rPr lang="es-MX" smtClean="0"/>
-              <a:t>23/11/2020</a:t>
+              <a:t>03/12/2020</a:t>
             </a:fld>
             <a:endParaRPr lang="es-MX"/>
           </a:p>
@@ -6826,13 +6826,13 @@
   <p:clrMapOvr>
     <a:masterClrMapping/>
   </p:clrMapOvr>
-  <mc:AlternateContent xmlns:mc="http://schemas.openxmlformats.org/markup-compatibility/2006">
-    <mc:Choice xmlns:p14="http://schemas.microsoft.com/office/powerpoint/2010/main" Requires="p14">
+  <mc:AlternateContent xmlns:mc="http://schemas.openxmlformats.org/markup-compatibility/2006" xmlns:p14="http://schemas.microsoft.com/office/powerpoint/2010/main">
+    <mc:Choice Requires="p14">
       <p:transition spd="slow" p14:dur="1500">
         <p:random/>
       </p:transition>
     </mc:Choice>
-    <mc:Fallback>
+    <mc:Fallback xmlns="">
       <p:transition spd="slow">
         <p:random/>
       </p:transition>
@@ -7220,13 +7220,13 @@
   <p:clrMapOvr>
     <a:masterClrMapping/>
   </p:clrMapOvr>
-  <mc:AlternateContent xmlns:mc="http://schemas.openxmlformats.org/markup-compatibility/2006">
-    <mc:Choice xmlns:p14="http://schemas.microsoft.com/office/powerpoint/2010/main" Requires="p14">
+  <mc:AlternateContent xmlns:mc="http://schemas.openxmlformats.org/markup-compatibility/2006" xmlns:p14="http://schemas.microsoft.com/office/powerpoint/2010/main">
+    <mc:Choice Requires="p14">
       <p:transition spd="slow" p14:dur="1500">
         <p:random/>
       </p:transition>
     </mc:Choice>
-    <mc:Fallback>
+    <mc:Fallback xmlns="">
       <p:transition spd="slow">
         <p:random/>
       </p:transition>
@@ -7334,7 +7334,7 @@
                 <a:latin typeface="Arial" panose="020B0604020202020204" pitchFamily="34" charset="0"/>
                 <a:cs typeface="Arial" panose="020B0604020202020204" pitchFamily="34" charset="0"/>
               </a:rPr>
-              <a:t>Registro de la ventas por empleado</a:t>
+              <a:t>Registro de las ventas por empleado</a:t>
             </a:r>
           </a:p>
           <a:p>
@@ -7446,21 +7446,19 @@
                 <a:latin typeface="Arial" panose="020B0604020202020204" pitchFamily="34" charset="0"/>
                 <a:cs typeface="Arial" panose="020B0604020202020204" pitchFamily="34" charset="0"/>
               </a:rPr>
-              <a:t>No existe calculo del margen de ganancias</a:t>
-            </a:r>
-            <a:endParaRPr lang="es-MX" dirty="0">
-              <a:latin typeface="Arial" panose="020B0604020202020204" pitchFamily="34" charset="0"/>
-              <a:cs typeface="Arial" panose="020B0604020202020204" pitchFamily="34" charset="0"/>
-            </a:endParaRPr>
-          </a:p>
-          <a:p>
-            <a:pPr marL="285750" indent="-285750">
-              <a:lnSpc>
-                <a:spcPct val="150000"/>
-              </a:lnSpc>
-              <a:buFont typeface="Arial" panose="020B0604020202020204" pitchFamily="34" charset="0"/>
-              <a:buChar char="•"/>
-            </a:pPr>
+              <a:t>No </a:t>
+            </a:r>
+            <a:r>
+              <a:rPr lang="es-MX" b="0" i="0">
+                <a:solidFill>
+                  <a:srgbClr val="1D1C1D"/>
+                </a:solidFill>
+                <a:effectLst/>
+                <a:latin typeface="Arial" panose="020B0604020202020204" pitchFamily="34" charset="0"/>
+                <a:cs typeface="Arial" panose="020B0604020202020204" pitchFamily="34" charset="0"/>
+              </a:rPr>
+              <a:t>existe cálculo </a:t>
+            </a:r>
             <a:r>
               <a:rPr lang="es-MX" b="0" i="0" dirty="0">
                 <a:solidFill>
@@ -7470,7 +7468,31 @@
                 <a:latin typeface="Arial" panose="020B0604020202020204" pitchFamily="34" charset="0"/>
                 <a:cs typeface="Arial" panose="020B0604020202020204" pitchFamily="34" charset="0"/>
               </a:rPr>
-              <a:t>No existe las compras a distancia para las personas que</a:t>
+              <a:t>del margen de ganancias</a:t>
+            </a:r>
+            <a:endParaRPr lang="es-MX" dirty="0">
+              <a:latin typeface="Arial" panose="020B0604020202020204" pitchFamily="34" charset="0"/>
+              <a:cs typeface="Arial" panose="020B0604020202020204" pitchFamily="34" charset="0"/>
+            </a:endParaRPr>
+          </a:p>
+          <a:p>
+            <a:pPr marL="285750" indent="-285750">
+              <a:lnSpc>
+                <a:spcPct val="150000"/>
+              </a:lnSpc>
+              <a:buFont typeface="Arial" panose="020B0604020202020204" pitchFamily="34" charset="0"/>
+              <a:buChar char="•"/>
+            </a:pPr>
+            <a:r>
+              <a:rPr lang="es-MX" b="0" i="0" dirty="0">
+                <a:solidFill>
+                  <a:srgbClr val="1D1C1D"/>
+                </a:solidFill>
+                <a:effectLst/>
+                <a:latin typeface="Arial" panose="020B0604020202020204" pitchFamily="34" charset="0"/>
+                <a:cs typeface="Arial" panose="020B0604020202020204" pitchFamily="34" charset="0"/>
+              </a:rPr>
+              <a:t>No existen las compras a distancia para las personas que</a:t>
             </a:r>
             <a:br>
               <a:rPr lang="es-MX" dirty="0">
@@ -7535,13 +7557,13 @@
   <p:clrMapOvr>
     <a:masterClrMapping/>
   </p:clrMapOvr>
-  <mc:AlternateContent xmlns:mc="http://schemas.openxmlformats.org/markup-compatibility/2006">
-    <mc:Choice xmlns:p14="http://schemas.microsoft.com/office/powerpoint/2010/main" Requires="p14">
+  <mc:AlternateContent xmlns:mc="http://schemas.openxmlformats.org/markup-compatibility/2006" xmlns:p14="http://schemas.microsoft.com/office/powerpoint/2010/main">
+    <mc:Choice Requires="p14">
       <p:transition spd="slow" p14:dur="1500">
         <p:random/>
       </p:transition>
     </mc:Choice>
-    <mc:Fallback>
+    <mc:Fallback xmlns="">
       <p:transition spd="slow">
         <p:random/>
       </p:transition>
@@ -7810,13 +7832,13 @@
   <p:clrMapOvr>
     <a:masterClrMapping/>
   </p:clrMapOvr>
-  <mc:AlternateContent xmlns:mc="http://schemas.openxmlformats.org/markup-compatibility/2006">
-    <mc:Choice xmlns:p14="http://schemas.microsoft.com/office/powerpoint/2010/main" Requires="p14">
+  <mc:AlternateContent xmlns:mc="http://schemas.openxmlformats.org/markup-compatibility/2006" xmlns:p14="http://schemas.microsoft.com/office/powerpoint/2010/main">
+    <mc:Choice Requires="p14">
       <p:transition spd="slow" p14:dur="1500">
         <p:random/>
       </p:transition>
     </mc:Choice>
-    <mc:Fallback>
+    <mc:Fallback xmlns="">
       <p:transition spd="slow">
         <p:random/>
       </p:transition>
@@ -8169,13 +8191,13 @@
   <p:clrMapOvr>
     <a:masterClrMapping/>
   </p:clrMapOvr>
-  <mc:AlternateContent xmlns:mc="http://schemas.openxmlformats.org/markup-compatibility/2006">
-    <mc:Choice xmlns:p14="http://schemas.microsoft.com/office/powerpoint/2010/main" Requires="p14">
+  <mc:AlternateContent xmlns:mc="http://schemas.openxmlformats.org/markup-compatibility/2006" xmlns:p14="http://schemas.microsoft.com/office/powerpoint/2010/main">
+    <mc:Choice Requires="p14">
       <p:transition spd="slow" p14:dur="1500">
         <p:random/>
       </p:transition>
     </mc:Choice>
-    <mc:Fallback>
+    <mc:Fallback xmlns="">
       <p:transition spd="slow">
         <p:random/>
       </p:transition>
@@ -8366,7 +8388,7 @@
                 <a:latin typeface="Arial" panose="020B0604020202020204" pitchFamily="34" charset="0"/>
                 <a:cs typeface="Arial" panose="020B0604020202020204" pitchFamily="34" charset="0"/>
               </a:rPr>
-              <a:t>Modulo de compras</a:t>
+              <a:t>Módulo de compras</a:t>
             </a:r>
           </a:p>
           <a:p>
@@ -8386,7 +8408,7 @@
                 <a:latin typeface="Arial" panose="020B0604020202020204" pitchFamily="34" charset="0"/>
                 <a:cs typeface="Arial" panose="020B0604020202020204" pitchFamily="34" charset="0"/>
               </a:rPr>
-              <a:t>Modulo de reporte de compra-venta</a:t>
+              <a:t>Módulo de reporte de compra-venta</a:t>
             </a:r>
           </a:p>
           <a:p>
@@ -8429,13 +8451,13 @@
   <p:clrMapOvr>
     <a:masterClrMapping/>
   </p:clrMapOvr>
-  <mc:AlternateContent xmlns:mc="http://schemas.openxmlformats.org/markup-compatibility/2006">
-    <mc:Choice xmlns:p14="http://schemas.microsoft.com/office/powerpoint/2010/main" Requires="p14">
+  <mc:AlternateContent xmlns:mc="http://schemas.openxmlformats.org/markup-compatibility/2006" xmlns:p14="http://schemas.microsoft.com/office/powerpoint/2010/main">
+    <mc:Choice Requires="p14">
       <p:transition spd="slow" p14:dur="1500">
         <p:random/>
       </p:transition>
     </mc:Choice>
-    <mc:Fallback>
+    <mc:Fallback xmlns="">
       <p:transition spd="slow">
         <p:random/>
       </p:transition>
@@ -8868,13 +8890,13 @@
   <p:clrMapOvr>
     <a:masterClrMapping/>
   </p:clrMapOvr>
-  <mc:AlternateContent xmlns:mc="http://schemas.openxmlformats.org/markup-compatibility/2006">
-    <mc:Choice xmlns:p14="http://schemas.microsoft.com/office/powerpoint/2010/main" Requires="p14">
+  <mc:AlternateContent xmlns:mc="http://schemas.openxmlformats.org/markup-compatibility/2006" xmlns:p14="http://schemas.microsoft.com/office/powerpoint/2010/main">
+    <mc:Choice Requires="p14">
       <p:transition spd="slow" p14:dur="1500">
         <p:random/>
       </p:transition>
     </mc:Choice>
-    <mc:Fallback>
+    <mc:Fallback xmlns="">
       <p:transition spd="slow">
         <p:random/>
       </p:transition>
@@ -9172,15 +9194,6 @@
               <a:srgbClr val="C0C0C0"/>
             </a:contourClr>
           </a:sp3d>
-          <a:extLst>
-            <a:ext uri="{909E8E84-426E-40DD-AFC4-6F175D3DCCD1}">
-              <a14:hiddenFill xmlns:a14="http://schemas.microsoft.com/office/drawing/2010/main">
-                <a:solidFill>
-                  <a:srgbClr val="FFFFFF"/>
-                </a:solidFill>
-              </a14:hiddenFill>
-            </a:ext>
-          </a:extLst>
         </p:spPr>
       </p:pic>
       <p:pic>
@@ -9249,13 +9262,13 @@
   <p:clrMapOvr>
     <a:masterClrMapping/>
   </p:clrMapOvr>
-  <mc:AlternateContent xmlns:mc="http://schemas.openxmlformats.org/markup-compatibility/2006">
-    <mc:Choice xmlns:p14="http://schemas.microsoft.com/office/powerpoint/2010/main" Requires="p14">
+  <mc:AlternateContent xmlns:mc="http://schemas.openxmlformats.org/markup-compatibility/2006" xmlns:p14="http://schemas.microsoft.com/office/powerpoint/2010/main">
+    <mc:Choice Requires="p14">
       <p:transition spd="slow" p14:dur="1500">
         <p:random/>
       </p:transition>
     </mc:Choice>
-    <mc:Fallback>
+    <mc:Fallback xmlns="">
       <p:transition spd="slow">
         <p:random/>
       </p:transition>

</xml_diff>

<commit_message>
Diseño login actualizado Heber
</commit_message>
<xml_diff>
--- a/Presentacion asesor uno.pptx
+++ b/Presentacion asesor uno.pptx
@@ -136,7 +136,7 @@
   <pc:docChgLst>
     <pc:chgData name="adelaida.molinar1997@gmail.com" userId="73a9b2cc98479d66" providerId="LiveId" clId="{2F3BDEE8-1B09-4329-B241-C1265B3CF150}"/>
     <pc:docChg chg="undo custSel addSld delSld modSld sldOrd">
-      <pc:chgData name="adelaida.molinar1997@gmail.com" userId="73a9b2cc98479d66" providerId="LiveId" clId="{2F3BDEE8-1B09-4329-B241-C1265B3CF150}" dt="2020-12-04T17:49:30.743" v="369" actId="20577"/>
+      <pc:chgData name="adelaida.molinar1997@gmail.com" userId="73a9b2cc98479d66" providerId="LiveId" clId="{2F3BDEE8-1B09-4329-B241-C1265B3CF150}" dt="2020-12-04T22:48:59.284" v="376" actId="1076"/>
       <pc:docMkLst>
         <pc:docMk/>
       </pc:docMkLst>
@@ -457,6 +457,29 @@
           <pc:docMk/>
           <pc:sldMk cId="3128201199" sldId="266"/>
         </pc:sldMkLst>
+      </pc:sldChg>
+      <pc:sldChg chg="addSp delSp modSp mod">
+        <pc:chgData name="adelaida.molinar1997@gmail.com" userId="73a9b2cc98479d66" providerId="LiveId" clId="{2F3BDEE8-1B09-4329-B241-C1265B3CF150}" dt="2020-12-04T22:48:59.284" v="376" actId="1076"/>
+        <pc:sldMkLst>
+          <pc:docMk/>
+          <pc:sldMk cId="1530181946" sldId="267"/>
+        </pc:sldMkLst>
+        <pc:picChg chg="del mod">
+          <ac:chgData name="adelaida.molinar1997@gmail.com" userId="73a9b2cc98479d66" providerId="LiveId" clId="{2F3BDEE8-1B09-4329-B241-C1265B3CF150}" dt="2020-12-04T22:48:36.910" v="371" actId="478"/>
+          <ac:picMkLst>
+            <pc:docMk/>
+            <pc:sldMk cId="1530181946" sldId="267"/>
+            <ac:picMk id="3" creationId="{FD7A6B68-B8E3-41B8-9EA5-67435B7C44F2}"/>
+          </ac:picMkLst>
+        </pc:picChg>
+        <pc:picChg chg="add mod">
+          <ac:chgData name="adelaida.molinar1997@gmail.com" userId="73a9b2cc98479d66" providerId="LiveId" clId="{2F3BDEE8-1B09-4329-B241-C1265B3CF150}" dt="2020-12-04T22:48:59.284" v="376" actId="1076"/>
+          <ac:picMkLst>
+            <pc:docMk/>
+            <pc:sldMk cId="1530181946" sldId="267"/>
+            <ac:picMk id="4" creationId="{76BF9E89-7F58-45A0-BCE8-9A74F1124195}"/>
+          </ac:picMkLst>
+        </pc:picChg>
       </pc:sldChg>
     </pc:docChg>
   </pc:docChgLst>
@@ -6872,10 +6895,10 @@
       </p:grpSpPr>
       <p:pic>
         <p:nvPicPr>
-          <p:cNvPr id="3" name="Imagen 2">
+          <p:cNvPr id="4" name="Imagen 3">
             <a:extLst>
               <a:ext uri="{FF2B5EF4-FFF2-40B4-BE49-F238E27FC236}">
-                <a16:creationId xmlns:a16="http://schemas.microsoft.com/office/drawing/2014/main" id="{FD7A6B68-B8E3-41B8-9EA5-67435B7C44F2}"/>
+                <a16:creationId xmlns:a16="http://schemas.microsoft.com/office/drawing/2014/main" id="{76BF9E89-7F58-45A0-BCE8-9A74F1124195}"/>
               </a:ext>
             </a:extLst>
           </p:cNvPr>
@@ -6898,8 +6921,8 @@
         </p:blipFill>
         <p:spPr>
           <a:xfrm>
-            <a:off x="1428307" y="0"/>
-            <a:ext cx="9335386" cy="5601232"/>
+            <a:off x="1802295" y="112312"/>
+            <a:ext cx="8946873" cy="5368124"/>
           </a:xfrm>
           <a:prstGeom prst="rect">
             <a:avLst/>

</xml_diff>